<commit_message>
Fix cloning procedure (`clone()`)
Added new `assign()` method to `RelationshipCollection`; `clone()` now generates a valid duplicate `SlidePart` with all required relationships; added new assertions in main test

Signed-off-by: denim2x <denim2x@cyberdude.com>
</commit_message>
<xml_diff>
--- a/tests/test_files/test_slides.pptx
+++ b/tests/test_files/test_slides.pptx
@@ -1,13 +1,16 @@
 
 <file path=ppt/presentation.xml><?xml version="1.0" encoding="utf-8"?>
-<p:presentation xmlns:a="http://schemas.openxmlformats.org/drawingml/2006/main" xmlns:r="http://schemas.openxmlformats.org/officeDocument/2006/relationships" xmlns:p="http://schemas.openxmlformats.org/presentationml/2006/main" saveSubsetFonts="1">
+<p:presentation xmlns:a="http://schemas.openxmlformats.org/drawingml/2006/main" xmlns:r="http://schemas.openxmlformats.org/officeDocument/2006/relationships" xmlns:p="http://schemas.openxmlformats.org/presentationml/2006/main">
   <p:sldMasterIdLst>
     <p:sldMasterId id="2147483648" r:id="rId1"/>
   </p:sldMasterIdLst>
+  <p:notesMasterIdLst>
+    <p:notesMasterId r:id="rId4"/>
+  </p:notesMasterIdLst>
   <p:sldIdLst>
-    <p:sldId id="256" r:id="rId2"/>
+    <p:sldId id="256" r:id="rId3"/>
   </p:sldIdLst>
-  <p:sldSz cx="9144000" cy="6858000" type="screen4x3"/>
+  <p:sldSz cx="12192000" cy="6858000"/>
   <p:notesSz cx="6858000" cy="9144000"/>
   <p:defaultTextStyle>
     <a:defPPr>
@@ -107,6 +110,1435 @@
 </p:presentation>
 </file>
 
+<file path=ppt/commentAuthors.xml><?xml version="1.0" encoding="utf-8"?>
+<p:cmAuthorLst xmlns:a="http://schemas.openxmlformats.org/drawingml/2006/main" xmlns:r="http://schemas.openxmlformats.org/officeDocument/2006/relationships" xmlns:p="http://schemas.openxmlformats.org/presentationml/2006/main">
+  <p:cmAuthor id="1" name="crist" initials="c" lastIdx="4" clrIdx="0"/>
+</p:cmAuthorLst>
+</file>
+
+<file path=ppt/charts/chart1.xml><?xml version="1.0" encoding="utf-8"?>
+<c:chartSpace xmlns:c="http://schemas.openxmlformats.org/drawingml/2006/chart" xmlns:a="http://schemas.openxmlformats.org/drawingml/2006/main" xmlns:r="http://schemas.openxmlformats.org/officeDocument/2006/relationships">
+  <c:date1904 val="0"/>
+  <c:lang val="zh-CN"/>
+  <c:roundedCorners val="0"/>
+  <mc:AlternateContent xmlns:mc="http://schemas.openxmlformats.org/markup-compatibility/2006">
+    <mc:Choice xmlns:c14="http://schemas.microsoft.com/office/drawing/2007/8/2/chart" Requires="c14">
+      <c14:style val="102"/>
+    </mc:Choice>
+    <mc:Fallback>
+      <c:style val="2"/>
+    </mc:Fallback>
+  </mc:AlternateContent>
+  <c:chart>
+    <c:title>
+      <c:tx>
+        <c:rich>
+          <a:bodyPr rot="0" spcFirstLastPara="0" vertOverflow="ellipsis" vert="horz" wrap="square" anchor="ctr" anchorCtr="1"/>
+          <a:lstStyle/>
+          <a:p>
+            <a:pPr defTabSz="914400">
+              <a:defRPr lang="en-US" sz="1400" b="0" i="0" u="none" strike="noStrike" kern="1200" spc="0" baseline="0">
+                <a:solidFill>
+                  <a:schemeClr val="tx1">
+                    <a:lumMod val="65000"/>
+                    <a:lumOff val="35000"/>
+                  </a:schemeClr>
+                </a:solidFill>
+                <a:latin typeface="+mn-lt"/>
+                <a:ea typeface="+mn-ea"/>
+                <a:cs typeface="+mn-cs"/>
+              </a:defRPr>
+            </a:pPr>
+            <a:r>
+              <a:t>Sample chart</a:t>
+            </a:r>
+          </a:p>
+        </c:rich>
+      </c:tx>
+      <c:layout/>
+      <c:overlay val="0"/>
+      <c:spPr>
+        <a:noFill/>
+        <a:ln>
+          <a:noFill/>
+        </a:ln>
+        <a:effectLst/>
+      </c:spPr>
+    </c:title>
+    <c:autoTitleDeleted val="0"/>
+    <c:plotArea>
+      <c:layout/>
+      <c:barChart>
+        <c:barDir val="col"/>
+        <c:grouping val="clustered"/>
+        <c:varyColors val="0"/>
+        <c:ser>
+          <c:idx val="0"/>
+          <c:order val="0"/>
+          <c:tx>
+            <c:strRef>
+              <c:f>Sheet1!$B$1</c:f>
+              <c:strCache>
+                <c:ptCount val="1"/>
+                <c:pt idx="0">
+                  <c:v>Series 1</c:v>
+                </c:pt>
+              </c:strCache>
+            </c:strRef>
+          </c:tx>
+          <c:spPr>
+            <a:solidFill>
+              <a:schemeClr val="accent1"/>
+            </a:solidFill>
+            <a:ln>
+              <a:noFill/>
+            </a:ln>
+            <a:effectLst/>
+          </c:spPr>
+          <c:invertIfNegative val="0"/>
+          <c:dLbls>
+            <c:delete val="1"/>
+          </c:dLbls>
+          <c:cat>
+            <c:strRef>
+              <c:f>Sheet1!$A$2:$A$5</c:f>
+              <c:strCache>
+                <c:ptCount val="4"/>
+                <c:pt idx="0">
+                  <c:v>Category 1</c:v>
+                </c:pt>
+                <c:pt idx="1">
+                  <c:v>Category 2</c:v>
+                </c:pt>
+                <c:pt idx="2">
+                  <c:v>Category 3</c:v>
+                </c:pt>
+                <c:pt idx="3">
+                  <c:v>Category 4</c:v>
+                </c:pt>
+              </c:strCache>
+            </c:strRef>
+          </c:cat>
+          <c:val>
+            <c:numRef>
+              <c:f>Sheet1!$B$2:$B$5</c:f>
+              <c:numCache>
+                <c:formatCode>General</c:formatCode>
+                <c:ptCount val="4"/>
+                <c:pt idx="0">
+                  <c:v>4.3</c:v>
+                </c:pt>
+                <c:pt idx="1">
+                  <c:v>2.5</c:v>
+                </c:pt>
+                <c:pt idx="2">
+                  <c:v>3.5</c:v>
+                </c:pt>
+                <c:pt idx="3">
+                  <c:v>4.5</c:v>
+                </c:pt>
+              </c:numCache>
+            </c:numRef>
+          </c:val>
+        </c:ser>
+        <c:ser>
+          <c:idx val="1"/>
+          <c:order val="1"/>
+          <c:tx>
+            <c:strRef>
+              <c:f>Sheet1!$C$1</c:f>
+              <c:strCache>
+                <c:ptCount val="1"/>
+                <c:pt idx="0">
+                  <c:v>Series 2</c:v>
+                </c:pt>
+              </c:strCache>
+            </c:strRef>
+          </c:tx>
+          <c:spPr>
+            <a:solidFill>
+              <a:schemeClr val="accent2"/>
+            </a:solidFill>
+            <a:ln>
+              <a:noFill/>
+            </a:ln>
+            <a:effectLst/>
+          </c:spPr>
+          <c:invertIfNegative val="0"/>
+          <c:dLbls>
+            <c:delete val="1"/>
+          </c:dLbls>
+          <c:cat>
+            <c:strRef>
+              <c:f>Sheet1!$A$2:$A$5</c:f>
+              <c:strCache>
+                <c:ptCount val="4"/>
+                <c:pt idx="0">
+                  <c:v>Category 1</c:v>
+                </c:pt>
+                <c:pt idx="1">
+                  <c:v>Category 2</c:v>
+                </c:pt>
+                <c:pt idx="2">
+                  <c:v>Category 3</c:v>
+                </c:pt>
+                <c:pt idx="3">
+                  <c:v>Category 4</c:v>
+                </c:pt>
+              </c:strCache>
+            </c:strRef>
+          </c:cat>
+          <c:val>
+            <c:numRef>
+              <c:f>Sheet1!$C$2:$C$5</c:f>
+              <c:numCache>
+                <c:formatCode>General</c:formatCode>
+                <c:ptCount val="4"/>
+                <c:pt idx="0">
+                  <c:v>2.4</c:v>
+                </c:pt>
+                <c:pt idx="1">
+                  <c:v>4.4</c:v>
+                </c:pt>
+                <c:pt idx="2">
+                  <c:v>1.8</c:v>
+                </c:pt>
+                <c:pt idx="3">
+                  <c:v>2.8</c:v>
+                </c:pt>
+              </c:numCache>
+            </c:numRef>
+          </c:val>
+        </c:ser>
+        <c:dLbls>
+          <c:showLegendKey val="0"/>
+          <c:showVal val="0"/>
+          <c:showCatName val="0"/>
+          <c:showSerName val="0"/>
+          <c:showPercent val="0"/>
+          <c:showBubbleSize val="0"/>
+        </c:dLbls>
+        <c:gapWidth val="219"/>
+        <c:overlap val="-27"/>
+        <c:axId val="477119590"/>
+        <c:axId val="487417441"/>
+      </c:barChart>
+      <c:lineChart>
+        <c:grouping val="standard"/>
+        <c:varyColors val="0"/>
+        <c:ser>
+          <c:idx val="2"/>
+          <c:order val="2"/>
+          <c:tx>
+            <c:strRef>
+              <c:f>Sheet1!$D$1</c:f>
+              <c:strCache>
+                <c:ptCount val="1"/>
+                <c:pt idx="0">
+                  <c:v>Series 3</c:v>
+                </c:pt>
+              </c:strCache>
+            </c:strRef>
+          </c:tx>
+          <c:spPr>
+            <a:ln w="28575" cap="rnd">
+              <a:solidFill>
+                <a:schemeClr val="accent3"/>
+              </a:solidFill>
+              <a:round/>
+            </a:ln>
+            <a:effectLst/>
+          </c:spPr>
+          <c:marker>
+            <c:symbol val="none"/>
+          </c:marker>
+          <c:dLbls>
+            <c:delete val="1"/>
+          </c:dLbls>
+          <c:cat>
+            <c:strRef>
+              <c:f>Sheet1!$A$2:$A$5</c:f>
+              <c:strCache>
+                <c:ptCount val="4"/>
+                <c:pt idx="0">
+                  <c:v>Category 1</c:v>
+                </c:pt>
+                <c:pt idx="1">
+                  <c:v>Category 2</c:v>
+                </c:pt>
+                <c:pt idx="2">
+                  <c:v>Category 3</c:v>
+                </c:pt>
+                <c:pt idx="3">
+                  <c:v>Category 4</c:v>
+                </c:pt>
+              </c:strCache>
+            </c:strRef>
+          </c:cat>
+          <c:val>
+            <c:numRef>
+              <c:f>Sheet1!$D$2:$D$5</c:f>
+              <c:numCache>
+                <c:formatCode>General</c:formatCode>
+                <c:ptCount val="4"/>
+                <c:pt idx="0">
+                  <c:v>2</c:v>
+                </c:pt>
+                <c:pt idx="1">
+                  <c:v>2</c:v>
+                </c:pt>
+                <c:pt idx="2">
+                  <c:v>3</c:v>
+                </c:pt>
+                <c:pt idx="3">
+                  <c:v>5</c:v>
+                </c:pt>
+              </c:numCache>
+            </c:numRef>
+          </c:val>
+          <c:smooth val="0"/>
+        </c:ser>
+        <c:dLbls>
+          <c:showLegendKey val="0"/>
+          <c:showVal val="0"/>
+          <c:showCatName val="0"/>
+          <c:showSerName val="0"/>
+          <c:showPercent val="0"/>
+          <c:showBubbleSize val="0"/>
+        </c:dLbls>
+        <c:marker val="0"/>
+        <c:smooth val="0"/>
+        <c:axId val="477119590"/>
+        <c:axId val="487417441"/>
+      </c:lineChart>
+      <c:catAx>
+        <c:axId val="477119590"/>
+        <c:scaling>
+          <c:orientation val="minMax"/>
+        </c:scaling>
+        <c:delete val="0"/>
+        <c:axPos val="b"/>
+        <c:majorTickMark val="none"/>
+        <c:minorTickMark val="none"/>
+        <c:tickLblPos val="nextTo"/>
+        <c:spPr>
+          <a:noFill/>
+          <a:ln w="9525" cap="flat" cmpd="sng" algn="ctr">
+            <a:solidFill>
+              <a:schemeClr val="tx1">
+                <a:lumMod val="15000"/>
+                <a:lumOff val="85000"/>
+              </a:schemeClr>
+            </a:solidFill>
+            <a:round/>
+          </a:ln>
+          <a:effectLst/>
+        </c:spPr>
+        <c:txPr>
+          <a:bodyPr rot="-60000000" spcFirstLastPara="0" vertOverflow="ellipsis" vert="horz" wrap="square" anchor="ctr" anchorCtr="1"/>
+          <a:lstStyle/>
+          <a:p>
+            <a:pPr>
+              <a:defRPr lang="en-US" sz="900" b="0" i="0" u="none" strike="noStrike" kern="1200" baseline="0">
+                <a:solidFill>
+                  <a:schemeClr val="tx1">
+                    <a:lumMod val="65000"/>
+                    <a:lumOff val="35000"/>
+                  </a:schemeClr>
+                </a:solidFill>
+                <a:latin typeface="+mn-lt"/>
+                <a:ea typeface="+mn-ea"/>
+                <a:cs typeface="+mn-cs"/>
+              </a:defRPr>
+            </a:pPr>
+          </a:p>
+        </c:txPr>
+        <c:crossAx val="487417441"/>
+        <c:crosses val="autoZero"/>
+        <c:auto val="1"/>
+        <c:lblAlgn val="ctr"/>
+        <c:lblOffset val="100"/>
+        <c:noMultiLvlLbl val="0"/>
+      </c:catAx>
+      <c:valAx>
+        <c:axId val="487417441"/>
+        <c:scaling>
+          <c:orientation val="minMax"/>
+        </c:scaling>
+        <c:delete val="0"/>
+        <c:axPos val="l"/>
+        <c:majorGridlines>
+          <c:spPr>
+            <a:ln w="9525" cap="flat" cmpd="sng" algn="ctr">
+              <a:solidFill>
+                <a:schemeClr val="tx1">
+                  <a:lumMod val="15000"/>
+                  <a:lumOff val="85000"/>
+                </a:schemeClr>
+              </a:solidFill>
+              <a:round/>
+            </a:ln>
+            <a:effectLst/>
+          </c:spPr>
+        </c:majorGridlines>
+        <c:numFmt formatCode="General" sourceLinked="1"/>
+        <c:majorTickMark val="none"/>
+        <c:minorTickMark val="none"/>
+        <c:tickLblPos val="nextTo"/>
+        <c:spPr>
+          <a:noFill/>
+          <a:ln>
+            <a:noFill/>
+          </a:ln>
+          <a:effectLst/>
+        </c:spPr>
+        <c:txPr>
+          <a:bodyPr rot="-60000000" spcFirstLastPara="0" vertOverflow="ellipsis" vert="horz" wrap="square" anchor="ctr" anchorCtr="1"/>
+          <a:lstStyle/>
+          <a:p>
+            <a:pPr>
+              <a:defRPr lang="en-US" sz="900" b="0" i="0" u="none" strike="noStrike" kern="1200" baseline="0">
+                <a:solidFill>
+                  <a:schemeClr val="tx1">
+                    <a:lumMod val="65000"/>
+                    <a:lumOff val="35000"/>
+                  </a:schemeClr>
+                </a:solidFill>
+                <a:latin typeface="+mn-lt"/>
+                <a:ea typeface="+mn-ea"/>
+                <a:cs typeface="+mn-cs"/>
+              </a:defRPr>
+            </a:pPr>
+          </a:p>
+        </c:txPr>
+        <c:crossAx val="477119590"/>
+        <c:crosses val="autoZero"/>
+        <c:crossBetween val="between"/>
+      </c:valAx>
+      <c:spPr>
+        <a:noFill/>
+        <a:ln>
+          <a:noFill/>
+        </a:ln>
+        <a:effectLst/>
+      </c:spPr>
+    </c:plotArea>
+    <c:legend>
+      <c:legendPos val="b"/>
+      <c:layout/>
+      <c:overlay val="0"/>
+      <c:spPr>
+        <a:noFill/>
+        <a:ln>
+          <a:noFill/>
+        </a:ln>
+        <a:effectLst/>
+      </c:spPr>
+      <c:txPr>
+        <a:bodyPr rot="0" spcFirstLastPara="0" vertOverflow="ellipsis" vert="horz" wrap="square" anchor="ctr" anchorCtr="1"/>
+        <a:lstStyle/>
+        <a:p>
+          <a:pPr>
+            <a:defRPr lang="en-US" sz="900" b="0" i="0" u="none" strike="noStrike" kern="1200" baseline="0">
+              <a:solidFill>
+                <a:schemeClr val="tx1">
+                  <a:lumMod val="65000"/>
+                  <a:lumOff val="35000"/>
+                </a:schemeClr>
+              </a:solidFill>
+              <a:latin typeface="+mn-lt"/>
+              <a:ea typeface="+mn-ea"/>
+              <a:cs typeface="+mn-cs"/>
+            </a:defRPr>
+          </a:pPr>
+        </a:p>
+      </c:txPr>
+    </c:legend>
+    <c:plotVisOnly val="1"/>
+    <c:dispBlanksAs val="gap"/>
+    <c:showDLblsOverMax val="0"/>
+  </c:chart>
+  <c:spPr>
+    <a:noFill/>
+    <a:ln>
+      <a:noFill/>
+    </a:ln>
+    <a:effectLst/>
+  </c:spPr>
+  <c:txPr>
+    <a:bodyPr/>
+    <a:lstStyle/>
+    <a:p>
+      <a:pPr>
+        <a:defRPr lang="en-US"/>
+      </a:pPr>
+    </a:p>
+  </c:txPr>
+  <c:externalData r:id="rId1">
+    <c:autoUpdate val="0"/>
+  </c:externalData>
+</c:chartSpace>
+</file>
+
+<file path=ppt/charts/colors1.xml><?xml version="1.0" encoding="utf-8"?>
+<cs:colorStyle xmlns:cs="http://schemas.microsoft.com/office/drawing/2012/chartStyle" xmlns:a="http://schemas.openxmlformats.org/drawingml/2006/main" meth="cycle" id="10">
+  <a:schemeClr val="accent1"/>
+  <a:schemeClr val="accent2"/>
+  <a:schemeClr val="accent3"/>
+  <a:schemeClr val="accent4"/>
+  <a:schemeClr val="accent5"/>
+  <a:schemeClr val="accent6"/>
+  <cs:variation/>
+  <cs:variation>
+    <a:lumMod val="60000"/>
+  </cs:variation>
+  <cs:variation>
+    <a:lumMod val="80000"/>
+    <a:lumOff val="20000"/>
+  </cs:variation>
+  <cs:variation>
+    <a:lumMod val="80000"/>
+  </cs:variation>
+  <cs:variation>
+    <a:lumMod val="60000"/>
+    <a:lumOff val="40000"/>
+  </cs:variation>
+  <cs:variation>
+    <a:lumMod val="50000"/>
+  </cs:variation>
+  <cs:variation>
+    <a:lumMod val="70000"/>
+    <a:lumOff val="30000"/>
+  </cs:variation>
+  <cs:variation>
+    <a:lumMod val="70000"/>
+  </cs:variation>
+  <cs:variation>
+    <a:lumMod val="50000"/>
+    <a:lumOff val="50000"/>
+  </cs:variation>
+</cs:colorStyle>
+</file>
+
+<file path=ppt/charts/style1.xml><?xml version="1.0" encoding="utf-8"?>
+<cs:chartStyle xmlns:cs="http://schemas.microsoft.com/office/drawing/2012/chartStyle" xmlns:a="http://schemas.openxmlformats.org/drawingml/2006/main" id="201">
+  <cs:axisTitle>
+    <cs:lnRef idx="0"/>
+    <cs:fillRef idx="0"/>
+    <cs:effectRef idx="0"/>
+    <cs:fontRef idx="minor">
+      <a:schemeClr val="tx1">
+        <a:lumMod val="65000"/>
+        <a:lumOff val="35000"/>
+      </a:schemeClr>
+    </cs:fontRef>
+    <cs:defRPr sz="1000" kern="1200"/>
+  </cs:axisTitle>
+  <cs:categoryAxis>
+    <cs:lnRef idx="0"/>
+    <cs:fillRef idx="0"/>
+    <cs:effectRef idx="0"/>
+    <cs:fontRef idx="minor">
+      <a:schemeClr val="tx1">
+        <a:lumMod val="65000"/>
+        <a:lumOff val="35000"/>
+      </a:schemeClr>
+    </cs:fontRef>
+    <cs:spPr>
+      <a:ln w="9525" cap="flat" cmpd="sng" algn="ctr">
+        <a:solidFill>
+          <a:schemeClr val="tx1">
+            <a:lumMod val="15000"/>
+            <a:lumOff val="85000"/>
+          </a:schemeClr>
+        </a:solidFill>
+        <a:round/>
+      </a:ln>
+    </cs:spPr>
+    <cs:defRPr sz="900" kern="1200"/>
+  </cs:categoryAxis>
+  <cs:chartArea mods="allowNoFillOverride allowNoLineOverride">
+    <cs:lnRef idx="0"/>
+    <cs:fillRef idx="0"/>
+    <cs:effectRef idx="0"/>
+    <cs:fontRef idx="minor">
+      <a:schemeClr val="tx1"/>
+    </cs:fontRef>
+    <cs:spPr>
+      <a:solidFill>
+        <a:schemeClr val="bg1"/>
+      </a:solidFill>
+      <a:ln w="9525" cap="flat" cmpd="sng" algn="ctr">
+        <a:solidFill>
+          <a:schemeClr val="tx1">
+            <a:lumMod val="15000"/>
+            <a:lumOff val="85000"/>
+          </a:schemeClr>
+        </a:solidFill>
+        <a:round/>
+      </a:ln>
+    </cs:spPr>
+    <cs:defRPr sz="1000" kern="1200"/>
+  </cs:chartArea>
+  <cs:dataLabel>
+    <cs:lnRef idx="0"/>
+    <cs:fillRef idx="0"/>
+    <cs:effectRef idx="0"/>
+    <cs:fontRef idx="minor">
+      <a:schemeClr val="tx1">
+        <a:lumMod val="75000"/>
+        <a:lumOff val="25000"/>
+      </a:schemeClr>
+    </cs:fontRef>
+    <cs:defRPr sz="900" kern="1200"/>
+  </cs:dataLabel>
+  <cs:dataLabelCallout>
+    <cs:lnRef idx="0"/>
+    <cs:fillRef idx="0"/>
+    <cs:effectRef idx="0"/>
+    <cs:fontRef idx="minor">
+      <a:schemeClr val="dk1">
+        <a:lumMod val="65000"/>
+        <a:lumOff val="35000"/>
+      </a:schemeClr>
+    </cs:fontRef>
+    <cs:spPr>
+      <a:solidFill>
+        <a:schemeClr val="lt1"/>
+      </a:solidFill>
+      <a:ln>
+        <a:solidFill>
+          <a:schemeClr val="dk1">
+            <a:lumMod val="25000"/>
+            <a:lumOff val="75000"/>
+          </a:schemeClr>
+        </a:solidFill>
+      </a:ln>
+    </cs:spPr>
+    <cs:defRPr sz="900" kern="1200"/>
+    <cs:bodyPr rot="0" spcFirstLastPara="1" vertOverflow="clip" horzOverflow="clip" vert="horz" wrap="square" lIns="36576" tIns="18288" rIns="36576" bIns="18288" anchor="ctr" anchorCtr="1">
+      <a:spAutoFit/>
+    </cs:bodyPr>
+  </cs:dataLabelCallout>
+  <cs:dataPoint>
+    <cs:lnRef idx="0"/>
+    <cs:fillRef idx="1">
+      <cs:styleClr val="auto"/>
+    </cs:fillRef>
+    <cs:effectRef idx="0"/>
+    <cs:fontRef idx="minor">
+      <a:schemeClr val="tx1"/>
+    </cs:fontRef>
+  </cs:dataPoint>
+  <cs:dataPoint3D>
+    <cs:lnRef idx="0"/>
+    <cs:fillRef idx="1">
+      <cs:styleClr val="auto"/>
+    </cs:fillRef>
+    <cs:effectRef idx="0"/>
+    <cs:fontRef idx="minor">
+      <a:schemeClr val="tx1"/>
+    </cs:fontRef>
+  </cs:dataPoint3D>
+  <cs:dataPointLine>
+    <cs:lnRef idx="0">
+      <cs:styleClr val="auto"/>
+    </cs:lnRef>
+    <cs:fillRef idx="1"/>
+    <cs:effectRef idx="0"/>
+    <cs:fontRef idx="minor">
+      <a:schemeClr val="tx1"/>
+    </cs:fontRef>
+    <cs:spPr>
+      <a:ln w="28575" cap="rnd">
+        <a:solidFill>
+          <a:schemeClr val="phClr"/>
+        </a:solidFill>
+        <a:round/>
+      </a:ln>
+    </cs:spPr>
+  </cs:dataPointLine>
+  <cs:dataPointMarker>
+    <cs:lnRef idx="0">
+      <cs:styleClr val="auto"/>
+    </cs:lnRef>
+    <cs:fillRef idx="1">
+      <cs:styleClr val="auto"/>
+    </cs:fillRef>
+    <cs:effectRef idx="0"/>
+    <cs:fontRef idx="minor">
+      <a:schemeClr val="tx1"/>
+    </cs:fontRef>
+    <cs:spPr>
+      <a:ln w="9525">
+        <a:solidFill>
+          <a:schemeClr val="phClr"/>
+        </a:solidFill>
+      </a:ln>
+    </cs:spPr>
+  </cs:dataPointMarker>
+  <cs:dataPointMarkerLayout symbol="circle" size="5"/>
+  <cs:dataPointWireframe>
+    <cs:lnRef idx="0">
+      <cs:styleClr val="auto"/>
+    </cs:lnRef>
+    <cs:fillRef idx="1"/>
+    <cs:effectRef idx="0"/>
+    <cs:fontRef idx="minor">
+      <a:schemeClr val="tx1"/>
+    </cs:fontRef>
+    <cs:spPr>
+      <a:ln w="9525" cap="rnd">
+        <a:solidFill>
+          <a:schemeClr val="phClr"/>
+        </a:solidFill>
+        <a:round/>
+      </a:ln>
+    </cs:spPr>
+  </cs:dataPointWireframe>
+  <cs:dataTable>
+    <cs:lnRef idx="0"/>
+    <cs:fillRef idx="0"/>
+    <cs:effectRef idx="0"/>
+    <cs:fontRef idx="minor">
+      <a:schemeClr val="tx1">
+        <a:lumMod val="65000"/>
+        <a:lumOff val="35000"/>
+      </a:schemeClr>
+    </cs:fontRef>
+    <cs:spPr>
+      <a:noFill/>
+      <a:ln w="9525" cap="flat" cmpd="sng" algn="ctr">
+        <a:solidFill>
+          <a:schemeClr val="tx1">
+            <a:lumMod val="15000"/>
+            <a:lumOff val="85000"/>
+          </a:schemeClr>
+        </a:solidFill>
+        <a:round/>
+      </a:ln>
+    </cs:spPr>
+    <cs:defRPr sz="900" kern="1200"/>
+  </cs:dataTable>
+  <cs:downBar>
+    <cs:lnRef idx="0"/>
+    <cs:fillRef idx="0"/>
+    <cs:effectRef idx="0"/>
+    <cs:fontRef idx="minor">
+      <a:schemeClr val="dk1"/>
+    </cs:fontRef>
+    <cs:spPr>
+      <a:solidFill>
+        <a:schemeClr val="dk1">
+          <a:lumMod val="65000"/>
+          <a:lumOff val="35000"/>
+        </a:schemeClr>
+      </a:solidFill>
+      <a:ln w="9525">
+        <a:solidFill>
+          <a:schemeClr val="tx1">
+            <a:lumMod val="65000"/>
+            <a:lumOff val="35000"/>
+          </a:schemeClr>
+        </a:solidFill>
+      </a:ln>
+    </cs:spPr>
+  </cs:downBar>
+  <cs:dropLine>
+    <cs:lnRef idx="0"/>
+    <cs:fillRef idx="0"/>
+    <cs:effectRef idx="0"/>
+    <cs:fontRef idx="minor">
+      <a:schemeClr val="tx1"/>
+    </cs:fontRef>
+    <cs:spPr>
+      <a:ln w="9525" cap="flat" cmpd="sng" algn="ctr">
+        <a:solidFill>
+          <a:schemeClr val="tx1">
+            <a:lumMod val="35000"/>
+            <a:lumOff val="65000"/>
+          </a:schemeClr>
+        </a:solidFill>
+        <a:round/>
+      </a:ln>
+    </cs:spPr>
+  </cs:dropLine>
+  <cs:errorBar>
+    <cs:lnRef idx="0"/>
+    <cs:fillRef idx="0"/>
+    <cs:effectRef idx="0"/>
+    <cs:fontRef idx="minor">
+      <a:schemeClr val="tx1"/>
+    </cs:fontRef>
+    <cs:spPr>
+      <a:ln w="9525" cap="flat" cmpd="sng" algn="ctr">
+        <a:solidFill>
+          <a:schemeClr val="tx1">
+            <a:lumMod val="65000"/>
+            <a:lumOff val="35000"/>
+          </a:schemeClr>
+        </a:solidFill>
+        <a:round/>
+      </a:ln>
+    </cs:spPr>
+  </cs:errorBar>
+  <cs:floor>
+    <cs:lnRef idx="0"/>
+    <cs:fillRef idx="0"/>
+    <cs:effectRef idx="0"/>
+    <cs:fontRef idx="minor">
+      <a:schemeClr val="tx1"/>
+    </cs:fontRef>
+    <cs:spPr>
+      <a:noFill/>
+      <a:ln>
+        <a:noFill/>
+      </a:ln>
+    </cs:spPr>
+  </cs:floor>
+  <cs:gridlineMajor>
+    <cs:lnRef idx="0"/>
+    <cs:fillRef idx="0"/>
+    <cs:effectRef idx="0"/>
+    <cs:fontRef idx="minor">
+      <a:schemeClr val="tx1"/>
+    </cs:fontRef>
+    <cs:spPr>
+      <a:ln w="9525" cap="flat" cmpd="sng" algn="ctr">
+        <a:solidFill>
+          <a:schemeClr val="tx1">
+            <a:lumMod val="15000"/>
+            <a:lumOff val="85000"/>
+          </a:schemeClr>
+        </a:solidFill>
+        <a:round/>
+      </a:ln>
+    </cs:spPr>
+  </cs:gridlineMajor>
+  <cs:gridlineMinor>
+    <cs:lnRef idx="0"/>
+    <cs:fillRef idx="0"/>
+    <cs:effectRef idx="0"/>
+    <cs:fontRef idx="minor">
+      <a:schemeClr val="tx1"/>
+    </cs:fontRef>
+    <cs:spPr>
+      <a:ln w="9525" cap="flat" cmpd="sng" algn="ctr">
+        <a:solidFill>
+          <a:schemeClr val="tx1">
+            <a:lumMod val="5000"/>
+            <a:lumOff val="95000"/>
+          </a:schemeClr>
+        </a:solidFill>
+        <a:round/>
+      </a:ln>
+    </cs:spPr>
+  </cs:gridlineMinor>
+  <cs:hiLoLine>
+    <cs:lnRef idx="0"/>
+    <cs:fillRef idx="0"/>
+    <cs:effectRef idx="0"/>
+    <cs:fontRef idx="minor">
+      <a:schemeClr val="tx1"/>
+    </cs:fontRef>
+    <cs:spPr>
+      <a:ln w="9525" cap="flat" cmpd="sng" algn="ctr">
+        <a:solidFill>
+          <a:schemeClr val="tx1">
+            <a:lumMod val="75000"/>
+            <a:lumOff val="25000"/>
+          </a:schemeClr>
+        </a:solidFill>
+        <a:round/>
+      </a:ln>
+    </cs:spPr>
+  </cs:hiLoLine>
+  <cs:leaderLine>
+    <cs:lnRef idx="0"/>
+    <cs:fillRef idx="0"/>
+    <cs:effectRef idx="0"/>
+    <cs:fontRef idx="minor">
+      <a:schemeClr val="tx1"/>
+    </cs:fontRef>
+    <cs:spPr>
+      <a:ln w="9525" cap="flat" cmpd="sng" algn="ctr">
+        <a:solidFill>
+          <a:schemeClr val="tx1">
+            <a:lumMod val="35000"/>
+            <a:lumOff val="65000"/>
+          </a:schemeClr>
+        </a:solidFill>
+        <a:round/>
+      </a:ln>
+    </cs:spPr>
+  </cs:leaderLine>
+  <cs:legend>
+    <cs:lnRef idx="0"/>
+    <cs:fillRef idx="0"/>
+    <cs:effectRef idx="0"/>
+    <cs:fontRef idx="minor">
+      <a:schemeClr val="tx1">
+        <a:lumMod val="65000"/>
+        <a:lumOff val="35000"/>
+      </a:schemeClr>
+    </cs:fontRef>
+    <cs:defRPr sz="900" kern="1200"/>
+  </cs:legend>
+  <cs:plotArea mods="allowNoFillOverride allowNoLineOverride">
+    <cs:lnRef idx="0"/>
+    <cs:fillRef idx="0"/>
+    <cs:effectRef idx="0"/>
+    <cs:fontRef idx="minor">
+      <a:schemeClr val="tx1"/>
+    </cs:fontRef>
+  </cs:plotArea>
+  <cs:plotArea3D mods="allowNoFillOverride allowNoLineOverride">
+    <cs:lnRef idx="0"/>
+    <cs:fillRef idx="0"/>
+    <cs:effectRef idx="0"/>
+    <cs:fontRef idx="minor">
+      <a:schemeClr val="tx1"/>
+    </cs:fontRef>
+  </cs:plotArea3D>
+  <cs:seriesAxis>
+    <cs:lnRef idx="0"/>
+    <cs:fillRef idx="0"/>
+    <cs:effectRef idx="0"/>
+    <cs:fontRef idx="minor">
+      <a:schemeClr val="tx1">
+        <a:lumMod val="65000"/>
+        <a:lumOff val="35000"/>
+      </a:schemeClr>
+    </cs:fontRef>
+    <cs:defRPr sz="900" kern="1200"/>
+  </cs:seriesAxis>
+  <cs:seriesLine>
+    <cs:lnRef idx="0"/>
+    <cs:fillRef idx="0"/>
+    <cs:effectRef idx="0"/>
+    <cs:fontRef idx="minor">
+      <a:schemeClr val="tx1"/>
+    </cs:fontRef>
+    <cs:spPr>
+      <a:ln w="9525" cap="flat" cmpd="sng" algn="ctr">
+        <a:solidFill>
+          <a:schemeClr val="tx1">
+            <a:lumMod val="35000"/>
+            <a:lumOff val="65000"/>
+          </a:schemeClr>
+        </a:solidFill>
+        <a:round/>
+      </a:ln>
+    </cs:spPr>
+  </cs:seriesLine>
+  <cs:title>
+    <cs:lnRef idx="0"/>
+    <cs:fillRef idx="0"/>
+    <cs:effectRef idx="0"/>
+    <cs:fontRef idx="minor">
+      <a:schemeClr val="tx1">
+        <a:lumMod val="65000"/>
+        <a:lumOff val="35000"/>
+      </a:schemeClr>
+    </cs:fontRef>
+    <cs:defRPr sz="1400" b="0" kern="1200" spc="0" baseline="0"/>
+  </cs:title>
+  <cs:trendline>
+    <cs:lnRef idx="0">
+      <cs:styleClr val="auto"/>
+    </cs:lnRef>
+    <cs:fillRef idx="0"/>
+    <cs:effectRef idx="0"/>
+    <cs:fontRef idx="minor">
+      <a:schemeClr val="tx1"/>
+    </cs:fontRef>
+    <cs:spPr>
+      <a:ln w="19050" cap="rnd">
+        <a:solidFill>
+          <a:schemeClr val="phClr"/>
+        </a:solidFill>
+        <a:prstDash val="sysDot"/>
+      </a:ln>
+    </cs:spPr>
+  </cs:trendline>
+  <cs:trendlineLabel>
+    <cs:lnRef idx="0"/>
+    <cs:fillRef idx="0"/>
+    <cs:effectRef idx="0"/>
+    <cs:fontRef idx="minor">
+      <a:schemeClr val="tx1">
+        <a:lumMod val="65000"/>
+        <a:lumOff val="35000"/>
+      </a:schemeClr>
+    </cs:fontRef>
+    <cs:defRPr sz="900" kern="1200"/>
+  </cs:trendlineLabel>
+  <cs:upBar>
+    <cs:lnRef idx="0"/>
+    <cs:fillRef idx="0"/>
+    <cs:effectRef idx="0"/>
+    <cs:fontRef idx="minor">
+      <a:schemeClr val="dk1"/>
+    </cs:fontRef>
+    <cs:spPr>
+      <a:solidFill>
+        <a:schemeClr val="lt1"/>
+      </a:solidFill>
+      <a:ln w="9525">
+        <a:solidFill>
+          <a:schemeClr val="tx1">
+            <a:lumMod val="15000"/>
+            <a:lumOff val="85000"/>
+          </a:schemeClr>
+        </a:solidFill>
+      </a:ln>
+    </cs:spPr>
+  </cs:upBar>
+  <cs:valueAxis>
+    <cs:lnRef idx="0"/>
+    <cs:fillRef idx="0"/>
+    <cs:effectRef idx="0"/>
+    <cs:fontRef idx="minor">
+      <a:schemeClr val="tx1">
+        <a:lumMod val="65000"/>
+        <a:lumOff val="35000"/>
+      </a:schemeClr>
+    </cs:fontRef>
+    <cs:defRPr sz="900" kern="1200"/>
+  </cs:valueAxis>
+  <cs:wall>
+    <cs:lnRef idx="0"/>
+    <cs:fillRef idx="0"/>
+    <cs:effectRef idx="0"/>
+    <cs:fontRef idx="minor">
+      <a:schemeClr val="tx1"/>
+    </cs:fontRef>
+    <cs:spPr>
+      <a:noFill/>
+      <a:ln>
+        <a:noFill/>
+      </a:ln>
+    </cs:spPr>
+  </cs:wall>
+</cs:chartStyle>
+</file>
+
+<file path=ppt/comments/comment1.xml><?xml version="1.0" encoding="utf-8"?>
+<p:cmLst xmlns:a="http://schemas.openxmlformats.org/drawingml/2006/main" xmlns:r="http://schemas.openxmlformats.org/officeDocument/2006/relationships" xmlns:p="http://schemas.openxmlformats.org/presentationml/2006/main">
+  <p:cm authorId="1" dt="2019-08-10T21:32:25.942" idx="1">
+    <p:pos x="2782" y="1918"/>
+    <p:text>Picture comment</p:text>
+  </p:cm>
+  <p:cm authorId="1" dt="2019-08-10T21:32:43.150" idx="2">
+    <p:pos x="7162" y="1160"/>
+    <p:text>Chart comment</p:text>
+  </p:cm>
+  <p:cm authorId="1" dt="2019-08-10T21:33:06.141" idx="3">
+    <p:pos x="7162" y="240"/>
+    <p:text>Sample title</p:text>
+  </p:cm>
+  <p:cm authorId="1" dt="2019-08-10T21:33:15.812" idx="4">
+    <p:pos x="10" y="10"/>
+    <p:text>Slide title</p:text>
+  </p:cm>
+</p:cmLst>
+</file>
+
+<file path=ppt/notesMasters/notesMaster1.xml><?xml version="1.0" encoding="utf-8"?>
+<p:notesMaster xmlns:a="http://schemas.openxmlformats.org/drawingml/2006/main" xmlns:r="http://schemas.openxmlformats.org/officeDocument/2006/relationships" xmlns:p="http://schemas.openxmlformats.org/presentationml/2006/main">
+  <p:cSld>
+    <p:bg>
+      <p:bgRef idx="1001">
+        <a:schemeClr val="bg1"/>
+      </p:bgRef>
+    </p:bg>
+    <p:spTree>
+      <p:nvGrpSpPr>
+        <p:cNvPr id="1" name=""/>
+        <p:cNvGrpSpPr/>
+        <p:nvPr/>
+      </p:nvGrpSpPr>
+      <p:grpSpPr>
+        <a:xfrm>
+          <a:off x="0" y="0"/>
+          <a:ext cx="0" cy="0"/>
+          <a:chOff x="0" y="0"/>
+          <a:chExt cx="0" cy="0"/>
+        </a:xfrm>
+      </p:grpSpPr>
+      <p:sp>
+        <p:nvSpPr>
+          <p:cNvPr id="2" name="Header Placeholder 1"/>
+          <p:cNvSpPr>
+            <a:spLocks noGrp="1"/>
+          </p:cNvSpPr>
+          <p:nvPr>
+            <p:ph type="hdr" sz="quarter"/>
+          </p:nvPr>
+        </p:nvSpPr>
+        <p:spPr>
+          <a:xfrm>
+            <a:off x="0" y="0"/>
+            <a:ext cx="2971800" cy="458788"/>
+          </a:xfrm>
+          <a:prstGeom prst="rect">
+            <a:avLst/>
+          </a:prstGeom>
+        </p:spPr>
+        <p:txBody>
+          <a:bodyPr vert="horz" lIns="91440" tIns="45720" rIns="91440" bIns="45720" rtlCol="0"/>
+          <a:lstStyle>
+            <a:lvl1pPr algn="l">
+              <a:defRPr sz="1200"/>
+            </a:lvl1pPr>
+          </a:lstStyle>
+          <a:p>
+            <a:endParaRPr lang="en-US"/>
+          </a:p>
+        </p:txBody>
+      </p:sp>
+      <p:sp>
+        <p:nvSpPr>
+          <p:cNvPr id="3" name="Date Placeholder 2"/>
+          <p:cNvSpPr>
+            <a:spLocks noGrp="1"/>
+          </p:cNvSpPr>
+          <p:nvPr>
+            <p:ph type="dt" idx="1"/>
+          </p:nvPr>
+        </p:nvSpPr>
+        <p:spPr>
+          <a:xfrm>
+            <a:off x="3884613" y="0"/>
+            <a:ext cx="2971800" cy="458788"/>
+          </a:xfrm>
+          <a:prstGeom prst="rect">
+            <a:avLst/>
+          </a:prstGeom>
+        </p:spPr>
+        <p:txBody>
+          <a:bodyPr vert="horz" lIns="91440" tIns="45720" rIns="91440" bIns="45720" rtlCol="0"/>
+          <a:lstStyle>
+            <a:lvl1pPr algn="r">
+              <a:defRPr sz="1200"/>
+            </a:lvl1pPr>
+          </a:lstStyle>
+          <a:p>
+            <a:fld id="{3EFD42F7-718C-4B98-AAEC-167E6DDD60A7}" type="datetimeFigureOut">
+              <a:rPr lang="en-US" smtClean="0"/>
+            </a:fld>
+            <a:endParaRPr lang="en-US"/>
+          </a:p>
+        </p:txBody>
+      </p:sp>
+      <p:sp>
+        <p:nvSpPr>
+          <p:cNvPr id="4" name="Slide Image Placeholder 3"/>
+          <p:cNvSpPr>
+            <a:spLocks noGrp="1" noRot="1" noChangeAspect="1"/>
+          </p:cNvSpPr>
+          <p:nvPr>
+            <p:ph type="sldImg" idx="2"/>
+          </p:nvPr>
+        </p:nvSpPr>
+        <p:spPr>
+          <a:xfrm>
+            <a:off x="685800" y="1143000"/>
+            <a:ext cx="5486400" cy="3086100"/>
+          </a:xfrm>
+          <a:prstGeom prst="rect">
+            <a:avLst/>
+          </a:prstGeom>
+          <a:noFill/>
+          <a:ln w="12700">
+            <a:solidFill>
+              <a:prstClr val="black"/>
+            </a:solidFill>
+          </a:ln>
+        </p:spPr>
+        <p:txBody>
+          <a:bodyPr vert="horz" lIns="91440" tIns="45720" rIns="91440" bIns="45720" rtlCol="0" anchor="ctr"/>
+          <a:lstStyle/>
+          <a:p>
+            <a:endParaRPr lang="en-US"/>
+          </a:p>
+        </p:txBody>
+      </p:sp>
+      <p:sp>
+        <p:nvSpPr>
+          <p:cNvPr id="5" name="Notes Placeholder 4"/>
+          <p:cNvSpPr>
+            <a:spLocks noGrp="1"/>
+          </p:cNvSpPr>
+          <p:nvPr>
+            <p:ph type="body" sz="quarter" idx="3"/>
+          </p:nvPr>
+        </p:nvSpPr>
+        <p:spPr>
+          <a:xfrm>
+            <a:off x="685800" y="4400550"/>
+            <a:ext cx="5486400" cy="3600450"/>
+          </a:xfrm>
+          <a:prstGeom prst="rect">
+            <a:avLst/>
+          </a:prstGeom>
+        </p:spPr>
+        <p:txBody>
+          <a:bodyPr vert="horz" lIns="91440" tIns="45720" rIns="91440" bIns="45720" rtlCol="0"/>
+          <a:lstStyle/>
+          <a:p>
+            <a:pPr lvl="0"/>
+            <a:r>
+              <a:rPr lang="en-US" smtClean="0"/>
+              <a:t>Click to edit Master text styles</a:t>
+            </a:r>
+            <a:endParaRPr lang="en-US" smtClean="0"/>
+          </a:p>
+          <a:p>
+            <a:pPr lvl="1"/>
+            <a:r>
+              <a:rPr lang="en-US" smtClean="0"/>
+              <a:t>Second level</a:t>
+            </a:r>
+            <a:endParaRPr lang="en-US" smtClean="0"/>
+          </a:p>
+          <a:p>
+            <a:pPr lvl="2"/>
+            <a:r>
+              <a:rPr lang="en-US" smtClean="0"/>
+              <a:t>Third level</a:t>
+            </a:r>
+            <a:endParaRPr lang="en-US" smtClean="0"/>
+          </a:p>
+          <a:p>
+            <a:pPr lvl="3"/>
+            <a:r>
+              <a:rPr lang="en-US" smtClean="0"/>
+              <a:t>Fourth level</a:t>
+            </a:r>
+            <a:endParaRPr lang="en-US" smtClean="0"/>
+          </a:p>
+          <a:p>
+            <a:pPr lvl="4"/>
+            <a:r>
+              <a:rPr lang="en-US" smtClean="0"/>
+              <a:t>Fifth level</a:t>
+            </a:r>
+            <a:endParaRPr lang="en-US"/>
+          </a:p>
+        </p:txBody>
+      </p:sp>
+      <p:sp>
+        <p:nvSpPr>
+          <p:cNvPr id="6" name="Footer Placeholder 5"/>
+          <p:cNvSpPr>
+            <a:spLocks noGrp="1"/>
+          </p:cNvSpPr>
+          <p:nvPr>
+            <p:ph type="ftr" sz="quarter" idx="4"/>
+          </p:nvPr>
+        </p:nvSpPr>
+        <p:spPr>
+          <a:xfrm>
+            <a:off x="0" y="8685213"/>
+            <a:ext cx="2971800" cy="458787"/>
+          </a:xfrm>
+          <a:prstGeom prst="rect">
+            <a:avLst/>
+          </a:prstGeom>
+        </p:spPr>
+        <p:txBody>
+          <a:bodyPr vert="horz" lIns="91440" tIns="45720" rIns="91440" bIns="45720" rtlCol="0" anchor="b"/>
+          <a:lstStyle>
+            <a:lvl1pPr algn="l">
+              <a:defRPr sz="1200"/>
+            </a:lvl1pPr>
+          </a:lstStyle>
+          <a:p>
+            <a:endParaRPr lang="en-US"/>
+          </a:p>
+        </p:txBody>
+      </p:sp>
+      <p:sp>
+        <p:nvSpPr>
+          <p:cNvPr id="7" name="Slide Number Placeholder 6"/>
+          <p:cNvSpPr>
+            <a:spLocks noGrp="1"/>
+          </p:cNvSpPr>
+          <p:nvPr>
+            <p:ph type="sldNum" sz="quarter" idx="5"/>
+          </p:nvPr>
+        </p:nvSpPr>
+        <p:spPr>
+          <a:xfrm>
+            <a:off x="3884613" y="8685213"/>
+            <a:ext cx="2971800" cy="458787"/>
+          </a:xfrm>
+          <a:prstGeom prst="rect">
+            <a:avLst/>
+          </a:prstGeom>
+        </p:spPr>
+        <p:txBody>
+          <a:bodyPr vert="horz" lIns="91440" tIns="45720" rIns="91440" bIns="45720" rtlCol="0" anchor="b"/>
+          <a:lstStyle>
+            <a:lvl1pPr algn="r">
+              <a:defRPr sz="1200"/>
+            </a:lvl1pPr>
+          </a:lstStyle>
+          <a:p>
+            <a:fld id="{21B2AA4F-B828-4D7C-AFD3-893933DAFCB4}" type="slidenum">
+              <a:rPr lang="en-US" smtClean="0"/>
+            </a:fld>
+            <a:endParaRPr lang="en-US"/>
+          </a:p>
+        </p:txBody>
+      </p:sp>
+    </p:spTree>
+  </p:cSld>
+  <p:clrMap bg1="lt1" tx1="dk1" bg2="lt2" tx2="dk2" accent1="accent1" accent2="accent2" accent3="accent3" accent4="accent4" accent5="accent5" accent6="accent6" hlink="hlink" folHlink="folHlink"/>
+  <p:notesStyle>
+    <a:lvl1pPr marL="0" algn="l" defTabSz="914400" rtl="0" eaLnBrk="1" latinLnBrk="0" hangingPunct="1">
+      <a:defRPr sz="1200" kern="1200">
+        <a:solidFill>
+          <a:schemeClr val="tx1"/>
+        </a:solidFill>
+        <a:latin typeface="+mn-lt"/>
+        <a:ea typeface="+mn-ea"/>
+        <a:cs typeface="+mn-cs"/>
+      </a:defRPr>
+    </a:lvl1pPr>
+    <a:lvl2pPr marL="457200" algn="l" defTabSz="914400" rtl="0" eaLnBrk="1" latinLnBrk="0" hangingPunct="1">
+      <a:defRPr sz="1200" kern="1200">
+        <a:solidFill>
+          <a:schemeClr val="tx1"/>
+        </a:solidFill>
+        <a:latin typeface="+mn-lt"/>
+        <a:ea typeface="+mn-ea"/>
+        <a:cs typeface="+mn-cs"/>
+      </a:defRPr>
+    </a:lvl2pPr>
+    <a:lvl3pPr marL="914400" algn="l" defTabSz="914400" rtl="0" eaLnBrk="1" latinLnBrk="0" hangingPunct="1">
+      <a:defRPr sz="1200" kern="1200">
+        <a:solidFill>
+          <a:schemeClr val="tx1"/>
+        </a:solidFill>
+        <a:latin typeface="+mn-lt"/>
+        <a:ea typeface="+mn-ea"/>
+        <a:cs typeface="+mn-cs"/>
+      </a:defRPr>
+    </a:lvl3pPr>
+    <a:lvl4pPr marL="1371600" algn="l" defTabSz="914400" rtl="0" eaLnBrk="1" latinLnBrk="0" hangingPunct="1">
+      <a:defRPr sz="1200" kern="1200">
+        <a:solidFill>
+          <a:schemeClr val="tx1"/>
+        </a:solidFill>
+        <a:latin typeface="+mn-lt"/>
+        <a:ea typeface="+mn-ea"/>
+        <a:cs typeface="+mn-cs"/>
+      </a:defRPr>
+    </a:lvl4pPr>
+    <a:lvl5pPr marL="1828800" algn="l" defTabSz="914400" rtl="0" eaLnBrk="1" latinLnBrk="0" hangingPunct="1">
+      <a:defRPr sz="1200" kern="1200">
+        <a:solidFill>
+          <a:schemeClr val="tx1"/>
+        </a:solidFill>
+        <a:latin typeface="+mn-lt"/>
+        <a:ea typeface="+mn-ea"/>
+        <a:cs typeface="+mn-cs"/>
+      </a:defRPr>
+    </a:lvl5pPr>
+    <a:lvl6pPr marL="2286000" algn="l" defTabSz="914400" rtl="0" eaLnBrk="1" latinLnBrk="0" hangingPunct="1">
+      <a:defRPr sz="1200" kern="1200">
+        <a:solidFill>
+          <a:schemeClr val="tx1"/>
+        </a:solidFill>
+        <a:latin typeface="+mn-lt"/>
+        <a:ea typeface="+mn-ea"/>
+        <a:cs typeface="+mn-cs"/>
+      </a:defRPr>
+    </a:lvl6pPr>
+    <a:lvl7pPr marL="2743200" algn="l" defTabSz="914400" rtl="0" eaLnBrk="1" latinLnBrk="0" hangingPunct="1">
+      <a:defRPr sz="1200" kern="1200">
+        <a:solidFill>
+          <a:schemeClr val="tx1"/>
+        </a:solidFill>
+        <a:latin typeface="+mn-lt"/>
+        <a:ea typeface="+mn-ea"/>
+        <a:cs typeface="+mn-cs"/>
+      </a:defRPr>
+    </a:lvl7pPr>
+    <a:lvl8pPr marL="3200400" algn="l" defTabSz="914400" rtl="0" eaLnBrk="1" latinLnBrk="0" hangingPunct="1">
+      <a:defRPr sz="1200" kern="1200">
+        <a:solidFill>
+          <a:schemeClr val="tx1"/>
+        </a:solidFill>
+        <a:latin typeface="+mn-lt"/>
+        <a:ea typeface="+mn-ea"/>
+        <a:cs typeface="+mn-cs"/>
+      </a:defRPr>
+    </a:lvl8pPr>
+    <a:lvl9pPr marL="3657600" algn="l" defTabSz="914400" rtl="0" eaLnBrk="1" latinLnBrk="0" hangingPunct="1">
+      <a:defRPr sz="1200" kern="1200">
+        <a:solidFill>
+          <a:schemeClr val="tx1"/>
+        </a:solidFill>
+        <a:latin typeface="+mn-lt"/>
+        <a:ea typeface="+mn-ea"/>
+        <a:cs typeface="+mn-cs"/>
+      </a:defRPr>
+    </a:lvl9pPr>
+  </p:notesStyle>
+</p:notesMaster>
+</file>
+
+<file path=ppt/notesSlides/notesSlide1.xml><?xml version="1.0" encoding="utf-8"?>
+<p:notes xmlns:a="http://schemas.openxmlformats.org/drawingml/2006/main" xmlns:r="http://schemas.openxmlformats.org/officeDocument/2006/relationships" xmlns:p="http://schemas.openxmlformats.org/presentationml/2006/main">
+  <p:cSld>
+    <p:spTree>
+      <p:nvGrpSpPr>
+        <p:cNvPr id="1" name=""/>
+        <p:cNvGrpSpPr/>
+        <p:nvPr/>
+      </p:nvGrpSpPr>
+      <p:grpSpPr/>
+      <p:sp>
+        <p:nvSpPr>
+          <p:cNvPr id="2" name="Slide Image Placeholder 1"/>
+          <p:cNvSpPr/>
+          <p:nvPr>
+            <p:ph type="sldImg" idx="2"/>
+          </p:nvPr>
+        </p:nvSpPr>
+        <p:spPr/>
+      </p:sp>
+      <p:sp>
+        <p:nvSpPr>
+          <p:cNvPr id="3" name="Text Placeholder 2"/>
+          <p:cNvSpPr/>
+          <p:nvPr>
+            <p:ph type="body" idx="3"/>
+          </p:nvPr>
+        </p:nvSpPr>
+        <p:spPr/>
+        <p:txBody>
+          <a:bodyPr/>
+          <a:p>
+            <a:r>
+              <a:rPr lang="en-US"/>
+              <a:t>Sample slide notes</a:t>
+            </a:r>
+            <a:endParaRPr lang="en-US"/>
+          </a:p>
+        </p:txBody>
+      </p:sp>
+    </p:spTree>
+  </p:cSld>
+  <p:clrMapOvr>
+    <a:masterClrMapping/>
+  </p:clrMapOvr>
+</p:notes>
+</file>
+
 <file path=ppt/slideLayouts/slideLayout1.xml><?xml version="1.0" encoding="utf-8"?>
 <p:sldLayout xmlns:a="http://schemas.openxmlformats.org/drawingml/2006/main" xmlns:r="http://schemas.openxmlformats.org/officeDocument/2006/relationships" xmlns:p="http://schemas.openxmlformats.org/presentationml/2006/main" type="title" preserve="1">
   <p:cSld name="Title Slide">
@@ -136,19 +1568,23 @@
         </p:nvSpPr>
         <p:spPr>
           <a:xfrm>
-            <a:off x="685800" y="2130425"/>
-            <a:ext cx="7772400" cy="1470025"/>
+            <a:off x="1524000" y="1122363"/>
+            <a:ext cx="9144000" cy="2387600"/>
           </a:xfrm>
         </p:spPr>
         <p:txBody>
-          <a:bodyPr/>
-          <a:lstStyle/>
+          <a:bodyPr anchor="b"/>
+          <a:lstStyle>
+            <a:lvl1pPr algn="ctr">
+              <a:defRPr sz="6000"/>
+            </a:lvl1pPr>
+          </a:lstStyle>
           <a:p>
             <a:r>
               <a:rPr lang="en-US" smtClean="0"/>
               <a:t>Click to edit Master title style</a:t>
             </a:r>
-            <a:endParaRPr lang="en-GB"/>
+            <a:endParaRPr lang="en-US"/>
           </a:p>
         </p:txBody>
       </p:sp>
@@ -164,8 +1600,8 @@
         </p:nvSpPr>
         <p:spPr>
           <a:xfrm>
-            <a:off x="1371600" y="3886200"/>
-            <a:ext cx="6400800" cy="1752600"/>
+            <a:off x="1524000" y="3602038"/>
+            <a:ext cx="9144000" cy="1655762"/>
           </a:xfrm>
         </p:spPr>
         <p:txBody>
@@ -173,93 +1609,39 @@
           <a:lstStyle>
             <a:lvl1pPr marL="0" indent="0" algn="ctr">
               <a:buNone/>
-              <a:defRPr>
-                <a:solidFill>
-                  <a:schemeClr val="tx1">
-                    <a:tint val="75000"/>
-                  </a:schemeClr>
-                </a:solidFill>
-              </a:defRPr>
+              <a:defRPr sz="2400"/>
             </a:lvl1pPr>
             <a:lvl2pPr marL="457200" indent="0" algn="ctr">
               <a:buNone/>
-              <a:defRPr>
-                <a:solidFill>
-                  <a:schemeClr val="tx1">
-                    <a:tint val="75000"/>
-                  </a:schemeClr>
-                </a:solidFill>
-              </a:defRPr>
+              <a:defRPr sz="2000"/>
             </a:lvl2pPr>
             <a:lvl3pPr marL="914400" indent="0" algn="ctr">
               <a:buNone/>
-              <a:defRPr>
-                <a:solidFill>
-                  <a:schemeClr val="tx1">
-                    <a:tint val="75000"/>
-                  </a:schemeClr>
-                </a:solidFill>
-              </a:defRPr>
+              <a:defRPr sz="1800"/>
             </a:lvl3pPr>
             <a:lvl4pPr marL="1371600" indent="0" algn="ctr">
               <a:buNone/>
-              <a:defRPr>
-                <a:solidFill>
-                  <a:schemeClr val="tx1">
-                    <a:tint val="75000"/>
-                  </a:schemeClr>
-                </a:solidFill>
-              </a:defRPr>
+              <a:defRPr sz="1600"/>
             </a:lvl4pPr>
             <a:lvl5pPr marL="1828800" indent="0" algn="ctr">
               <a:buNone/>
-              <a:defRPr>
-                <a:solidFill>
-                  <a:schemeClr val="tx1">
-                    <a:tint val="75000"/>
-                  </a:schemeClr>
-                </a:solidFill>
-              </a:defRPr>
+              <a:defRPr sz="1600"/>
             </a:lvl5pPr>
             <a:lvl6pPr marL="2286000" indent="0" algn="ctr">
               <a:buNone/>
-              <a:defRPr>
-                <a:solidFill>
-                  <a:schemeClr val="tx1">
-                    <a:tint val="75000"/>
-                  </a:schemeClr>
-                </a:solidFill>
-              </a:defRPr>
+              <a:defRPr sz="1600"/>
             </a:lvl6pPr>
             <a:lvl7pPr marL="2743200" indent="0" algn="ctr">
               <a:buNone/>
-              <a:defRPr>
-                <a:solidFill>
-                  <a:schemeClr val="tx1">
-                    <a:tint val="75000"/>
-                  </a:schemeClr>
-                </a:solidFill>
-              </a:defRPr>
+              <a:defRPr sz="1600"/>
             </a:lvl7pPr>
             <a:lvl8pPr marL="3200400" indent="0" algn="ctr">
               <a:buNone/>
-              <a:defRPr>
-                <a:solidFill>
-                  <a:schemeClr val="tx1">
-                    <a:tint val="75000"/>
-                  </a:schemeClr>
-                </a:solidFill>
-              </a:defRPr>
+              <a:defRPr sz="1600"/>
             </a:lvl8pPr>
             <a:lvl9pPr marL="3657600" indent="0" algn="ctr">
               <a:buNone/>
-              <a:defRPr>
-                <a:solidFill>
-                  <a:schemeClr val="tx1">
-                    <a:tint val="75000"/>
-                  </a:schemeClr>
-                </a:solidFill>
-              </a:defRPr>
+              <a:defRPr sz="1600"/>
             </a:lvl9pPr>
           </a:lstStyle>
           <a:p>
@@ -267,7 +1649,7 @@
               <a:rPr lang="en-US" smtClean="0"/>
               <a:t>Click to edit Master subtitle style</a:t>
             </a:r>
-            <a:endParaRPr lang="en-GB"/>
+            <a:endParaRPr lang="en-US"/>
           </a:p>
         </p:txBody>
       </p:sp>
@@ -286,12 +1668,10 @@
           <a:bodyPr/>
           <a:lstStyle/>
           <a:p>
-            <a:fld id="{9B72A71B-5A03-4006-A249-88022B89F593}" type="datetimeFigureOut">
-              <a:rPr lang="en-GB" smtClean="0"/>
-              <a:pPr/>
-              <a:t>12/31/12</a:t>
+            <a:fld id="{63A1C593-65D0-4073-BCC9-577B9352EA97}" type="datetimeFigureOut">
+              <a:rPr lang="en-US" smtClean="0"/>
             </a:fld>
-            <a:endParaRPr lang="en-GB"/>
+            <a:endParaRPr lang="en-US"/>
           </a:p>
         </p:txBody>
       </p:sp>
@@ -310,7 +1690,7 @@
           <a:bodyPr/>
           <a:lstStyle/>
           <a:p>
-            <a:endParaRPr lang="en-GB"/>
+            <a:endParaRPr lang="en-US"/>
           </a:p>
         </p:txBody>
       </p:sp>
@@ -329,12 +1709,10 @@
           <a:bodyPr/>
           <a:lstStyle/>
           <a:p>
-            <a:fld id="{EBA744C6-313F-4EA9-AC01-045AFA194E53}" type="slidenum">
-              <a:rPr lang="en-GB" smtClean="0"/>
-              <a:pPr/>
-              <a:t>‹#›</a:t>
+            <a:fld id="{9B618960-8005-486C-9A75-10CB2AAC16F9}" type="slidenum">
+              <a:rPr lang="en-US" smtClean="0"/>
             </a:fld>
-            <a:endParaRPr lang="en-GB"/>
+            <a:endParaRPr lang="en-US"/>
           </a:p>
         </p:txBody>
       </p:sp>
@@ -382,7 +1760,7 @@
               <a:rPr lang="en-US" smtClean="0"/>
               <a:t>Click to edit Master title style</a:t>
             </a:r>
-            <a:endParaRPr lang="en-GB"/>
+            <a:endParaRPr lang="en-US"/>
           </a:p>
         </p:txBody>
       </p:sp>
@@ -406,6 +1784,7 @@
               <a:rPr lang="en-US" smtClean="0"/>
               <a:t>Click to edit Master text styles</a:t>
             </a:r>
+            <a:endParaRPr lang="en-US" smtClean="0"/>
           </a:p>
           <a:p>
             <a:pPr lvl="1"/>
@@ -413,6 +1792,7 @@
               <a:rPr lang="en-US" smtClean="0"/>
               <a:t>Second level</a:t>
             </a:r>
+            <a:endParaRPr lang="en-US" smtClean="0"/>
           </a:p>
           <a:p>
             <a:pPr lvl="2"/>
@@ -420,6 +1800,7 @@
               <a:rPr lang="en-US" smtClean="0"/>
               <a:t>Third level</a:t>
             </a:r>
+            <a:endParaRPr lang="en-US" smtClean="0"/>
           </a:p>
           <a:p>
             <a:pPr lvl="3"/>
@@ -427,6 +1808,7 @@
               <a:rPr lang="en-US" smtClean="0"/>
               <a:t>Fourth level</a:t>
             </a:r>
+            <a:endParaRPr lang="en-US" smtClean="0"/>
           </a:p>
           <a:p>
             <a:pPr lvl="4"/>
@@ -434,7 +1816,7 @@
               <a:rPr lang="en-US" smtClean="0"/>
               <a:t>Fifth level</a:t>
             </a:r>
-            <a:endParaRPr lang="en-GB"/>
+            <a:endParaRPr lang="en-US"/>
           </a:p>
         </p:txBody>
       </p:sp>
@@ -453,12 +1835,10 @@
           <a:bodyPr/>
           <a:lstStyle/>
           <a:p>
-            <a:fld id="{9B72A71B-5A03-4006-A249-88022B89F593}" type="datetimeFigureOut">
-              <a:rPr lang="en-GB" smtClean="0"/>
-              <a:pPr/>
-              <a:t>12/31/12</a:t>
+            <a:fld id="{63A1C593-65D0-4073-BCC9-577B9352EA97}" type="datetimeFigureOut">
+              <a:rPr lang="en-US" smtClean="0"/>
             </a:fld>
-            <a:endParaRPr lang="en-GB"/>
+            <a:endParaRPr lang="en-US"/>
           </a:p>
         </p:txBody>
       </p:sp>
@@ -477,7 +1857,7 @@
           <a:bodyPr/>
           <a:lstStyle/>
           <a:p>
-            <a:endParaRPr lang="en-GB"/>
+            <a:endParaRPr lang="en-US"/>
           </a:p>
         </p:txBody>
       </p:sp>
@@ -496,12 +1876,10 @@
           <a:bodyPr/>
           <a:lstStyle/>
           <a:p>
-            <a:fld id="{EBA744C6-313F-4EA9-AC01-045AFA194E53}" type="slidenum">
-              <a:rPr lang="en-GB" smtClean="0"/>
-              <a:pPr/>
-              <a:t>‹#›</a:t>
+            <a:fld id="{9B618960-8005-486C-9A75-10CB2AAC16F9}" type="slidenum">
+              <a:rPr lang="en-US" smtClean="0"/>
             </a:fld>
-            <a:endParaRPr lang="en-GB"/>
+            <a:endParaRPr lang="en-US"/>
           </a:p>
         </p:txBody>
       </p:sp>
@@ -542,8 +1920,8 @@
         </p:nvSpPr>
         <p:spPr>
           <a:xfrm>
-            <a:off x="6629400" y="274638"/>
-            <a:ext cx="2057400" cy="5851525"/>
+            <a:off x="8724900" y="365125"/>
+            <a:ext cx="2628900" cy="5811838"/>
           </a:xfrm>
         </p:spPr>
         <p:txBody>
@@ -554,7 +1932,7 @@
               <a:rPr lang="en-US" smtClean="0"/>
               <a:t>Click to edit Master title style</a:t>
             </a:r>
-            <a:endParaRPr lang="en-GB"/>
+            <a:endParaRPr lang="en-US"/>
           </a:p>
         </p:txBody>
       </p:sp>
@@ -570,8 +1948,8 @@
         </p:nvSpPr>
         <p:spPr>
           <a:xfrm>
-            <a:off x="457200" y="274638"/>
-            <a:ext cx="6019800" cy="5851525"/>
+            <a:off x="838200" y="365125"/>
+            <a:ext cx="7734300" cy="5811838"/>
           </a:xfrm>
         </p:spPr>
         <p:txBody>
@@ -583,6 +1961,7 @@
               <a:rPr lang="en-US" smtClean="0"/>
               <a:t>Click to edit Master text styles</a:t>
             </a:r>
+            <a:endParaRPr lang="en-US" smtClean="0"/>
           </a:p>
           <a:p>
             <a:pPr lvl="1"/>
@@ -590,6 +1969,7 @@
               <a:rPr lang="en-US" smtClean="0"/>
               <a:t>Second level</a:t>
             </a:r>
+            <a:endParaRPr lang="en-US" smtClean="0"/>
           </a:p>
           <a:p>
             <a:pPr lvl="2"/>
@@ -597,6 +1977,7 @@
               <a:rPr lang="en-US" smtClean="0"/>
               <a:t>Third level</a:t>
             </a:r>
+            <a:endParaRPr lang="en-US" smtClean="0"/>
           </a:p>
           <a:p>
             <a:pPr lvl="3"/>
@@ -604,6 +1985,7 @@
               <a:rPr lang="en-US" smtClean="0"/>
               <a:t>Fourth level</a:t>
             </a:r>
+            <a:endParaRPr lang="en-US" smtClean="0"/>
           </a:p>
           <a:p>
             <a:pPr lvl="4"/>
@@ -611,7 +1993,7 @@
               <a:rPr lang="en-US" smtClean="0"/>
               <a:t>Fifth level</a:t>
             </a:r>
-            <a:endParaRPr lang="en-GB"/>
+            <a:endParaRPr lang="en-US"/>
           </a:p>
         </p:txBody>
       </p:sp>
@@ -630,12 +2012,10 @@
           <a:bodyPr/>
           <a:lstStyle/>
           <a:p>
-            <a:fld id="{9B72A71B-5A03-4006-A249-88022B89F593}" type="datetimeFigureOut">
-              <a:rPr lang="en-GB" smtClean="0"/>
-              <a:pPr/>
-              <a:t>12/31/12</a:t>
+            <a:fld id="{63A1C593-65D0-4073-BCC9-577B9352EA97}" type="datetimeFigureOut">
+              <a:rPr lang="en-US" smtClean="0"/>
             </a:fld>
-            <a:endParaRPr lang="en-GB"/>
+            <a:endParaRPr lang="en-US"/>
           </a:p>
         </p:txBody>
       </p:sp>
@@ -654,7 +2034,7 @@
           <a:bodyPr/>
           <a:lstStyle/>
           <a:p>
-            <a:endParaRPr lang="en-GB"/>
+            <a:endParaRPr lang="en-US"/>
           </a:p>
         </p:txBody>
       </p:sp>
@@ -673,12 +2053,10 @@
           <a:bodyPr/>
           <a:lstStyle/>
           <a:p>
-            <a:fld id="{EBA744C6-313F-4EA9-AC01-045AFA194E53}" type="slidenum">
-              <a:rPr lang="en-GB" smtClean="0"/>
-              <a:pPr/>
-              <a:t>‹#›</a:t>
+            <a:fld id="{9B618960-8005-486C-9A75-10CB2AAC16F9}" type="slidenum">
+              <a:rPr lang="en-US" smtClean="0"/>
             </a:fld>
-            <a:endParaRPr lang="en-GB"/>
+            <a:endParaRPr lang="en-US"/>
           </a:p>
         </p:txBody>
       </p:sp>
@@ -726,7 +2104,7 @@
               <a:rPr lang="en-US" smtClean="0"/>
               <a:t>Click to edit Master title style</a:t>
             </a:r>
-            <a:endParaRPr lang="en-GB"/>
+            <a:endParaRPr lang="en-US"/>
           </a:p>
         </p:txBody>
       </p:sp>
@@ -750,6 +2128,7 @@
               <a:rPr lang="en-US" smtClean="0"/>
               <a:t>Click to edit Master text styles</a:t>
             </a:r>
+            <a:endParaRPr lang="en-US" smtClean="0"/>
           </a:p>
           <a:p>
             <a:pPr lvl="1"/>
@@ -757,6 +2136,7 @@
               <a:rPr lang="en-US" smtClean="0"/>
               <a:t>Second level</a:t>
             </a:r>
+            <a:endParaRPr lang="en-US" smtClean="0"/>
           </a:p>
           <a:p>
             <a:pPr lvl="2"/>
@@ -764,6 +2144,7 @@
               <a:rPr lang="en-US" smtClean="0"/>
               <a:t>Third level</a:t>
             </a:r>
+            <a:endParaRPr lang="en-US" smtClean="0"/>
           </a:p>
           <a:p>
             <a:pPr lvl="3"/>
@@ -771,6 +2152,7 @@
               <a:rPr lang="en-US" smtClean="0"/>
               <a:t>Fourth level</a:t>
             </a:r>
+            <a:endParaRPr lang="en-US" smtClean="0"/>
           </a:p>
           <a:p>
             <a:pPr lvl="4"/>
@@ -778,7 +2160,7 @@
               <a:rPr lang="en-US" smtClean="0"/>
               <a:t>Fifth level</a:t>
             </a:r>
-            <a:endParaRPr lang="en-GB"/>
+            <a:endParaRPr lang="en-US"/>
           </a:p>
         </p:txBody>
       </p:sp>
@@ -797,12 +2179,10 @@
           <a:bodyPr/>
           <a:lstStyle/>
           <a:p>
-            <a:fld id="{9B72A71B-5A03-4006-A249-88022B89F593}" type="datetimeFigureOut">
-              <a:rPr lang="en-GB" smtClean="0"/>
-              <a:pPr/>
-              <a:t>12/31/12</a:t>
+            <a:fld id="{63A1C593-65D0-4073-BCC9-577B9352EA97}" type="datetimeFigureOut">
+              <a:rPr lang="en-US" smtClean="0"/>
             </a:fld>
-            <a:endParaRPr lang="en-GB"/>
+            <a:endParaRPr lang="en-US"/>
           </a:p>
         </p:txBody>
       </p:sp>
@@ -821,7 +2201,7 @@
           <a:bodyPr/>
           <a:lstStyle/>
           <a:p>
-            <a:endParaRPr lang="en-GB"/>
+            <a:endParaRPr lang="en-US"/>
           </a:p>
         </p:txBody>
       </p:sp>
@@ -840,12 +2220,10 @@
           <a:bodyPr/>
           <a:lstStyle/>
           <a:p>
-            <a:fld id="{EBA744C6-313F-4EA9-AC01-045AFA194E53}" type="slidenum">
-              <a:rPr lang="en-GB" smtClean="0"/>
-              <a:pPr/>
-              <a:t>‹#›</a:t>
+            <a:fld id="{9B618960-8005-486C-9A75-10CB2AAC16F9}" type="slidenum">
+              <a:rPr lang="en-US" smtClean="0"/>
             </a:fld>
-            <a:endParaRPr lang="en-GB"/>
+            <a:endParaRPr lang="en-US"/>
           </a:p>
         </p:txBody>
       </p:sp>
@@ -886,15 +2264,15 @@
         </p:nvSpPr>
         <p:spPr>
           <a:xfrm>
-            <a:off x="722313" y="4406900"/>
-            <a:ext cx="7772400" cy="1362075"/>
+            <a:off x="831850" y="1709738"/>
+            <a:ext cx="10515600" cy="2852737"/>
           </a:xfrm>
         </p:spPr>
         <p:txBody>
-          <a:bodyPr anchor="t"/>
+          <a:bodyPr anchor="b"/>
           <a:lstStyle>
-            <a:lvl1pPr algn="l">
-              <a:defRPr sz="4000" b="1" cap="all"/>
+            <a:lvl1pPr>
+              <a:defRPr sz="6000"/>
             </a:lvl1pPr>
           </a:lstStyle>
           <a:p>
@@ -902,7 +2280,7 @@
               <a:rPr lang="en-US" smtClean="0"/>
               <a:t>Click to edit Master title style</a:t>
             </a:r>
-            <a:endParaRPr lang="en-GB"/>
+            <a:endParaRPr lang="en-US"/>
           </a:p>
         </p:txBody>
       </p:sp>
@@ -918,16 +2296,16 @@
         </p:nvSpPr>
         <p:spPr>
           <a:xfrm>
-            <a:off x="722313" y="2906713"/>
-            <a:ext cx="7772400" cy="1500187"/>
+            <a:off x="831850" y="4589463"/>
+            <a:ext cx="10515600" cy="1500187"/>
           </a:xfrm>
         </p:spPr>
         <p:txBody>
-          <a:bodyPr anchor="b"/>
+          <a:bodyPr/>
           <a:lstStyle>
             <a:lvl1pPr marL="0" indent="0">
               <a:buNone/>
-              <a:defRPr sz="2000">
+              <a:defRPr sz="2400">
                 <a:solidFill>
                   <a:schemeClr val="tx1">
                     <a:tint val="75000"/>
@@ -937,7 +2315,7 @@
             </a:lvl1pPr>
             <a:lvl2pPr marL="457200" indent="0">
               <a:buNone/>
-              <a:defRPr sz="1800">
+              <a:defRPr sz="2000">
                 <a:solidFill>
                   <a:schemeClr val="tx1">
                     <a:tint val="75000"/>
@@ -947,7 +2325,7 @@
             </a:lvl2pPr>
             <a:lvl3pPr marL="914400" indent="0">
               <a:buNone/>
-              <a:defRPr sz="1600">
+              <a:defRPr sz="1800">
                 <a:solidFill>
                   <a:schemeClr val="tx1">
                     <a:tint val="75000"/>
@@ -957,7 +2335,7 @@
             </a:lvl3pPr>
             <a:lvl4pPr marL="1371600" indent="0">
               <a:buNone/>
-              <a:defRPr sz="1400">
+              <a:defRPr sz="1600">
                 <a:solidFill>
                   <a:schemeClr val="tx1">
                     <a:tint val="75000"/>
@@ -967,7 +2345,7 @@
             </a:lvl4pPr>
             <a:lvl5pPr marL="1828800" indent="0">
               <a:buNone/>
-              <a:defRPr sz="1400">
+              <a:defRPr sz="1600">
                 <a:solidFill>
                   <a:schemeClr val="tx1">
                     <a:tint val="75000"/>
@@ -977,7 +2355,7 @@
             </a:lvl5pPr>
             <a:lvl6pPr marL="2286000" indent="0">
               <a:buNone/>
-              <a:defRPr sz="1400">
+              <a:defRPr sz="1600">
                 <a:solidFill>
                   <a:schemeClr val="tx1">
                     <a:tint val="75000"/>
@@ -987,7 +2365,7 @@
             </a:lvl6pPr>
             <a:lvl7pPr marL="2743200" indent="0">
               <a:buNone/>
-              <a:defRPr sz="1400">
+              <a:defRPr sz="1600">
                 <a:solidFill>
                   <a:schemeClr val="tx1">
                     <a:tint val="75000"/>
@@ -997,7 +2375,7 @@
             </a:lvl7pPr>
             <a:lvl8pPr marL="3200400" indent="0">
               <a:buNone/>
-              <a:defRPr sz="1400">
+              <a:defRPr sz="1600">
                 <a:solidFill>
                   <a:schemeClr val="tx1">
                     <a:tint val="75000"/>
@@ -1007,7 +2385,7 @@
             </a:lvl8pPr>
             <a:lvl9pPr marL="3657600" indent="0">
               <a:buNone/>
-              <a:defRPr sz="1400">
+              <a:defRPr sz="1600">
                 <a:solidFill>
                   <a:schemeClr val="tx1">
                     <a:tint val="75000"/>
@@ -1022,6 +2400,7 @@
               <a:rPr lang="en-US" smtClean="0"/>
               <a:t>Click to edit Master text styles</a:t>
             </a:r>
+            <a:endParaRPr lang="en-US" smtClean="0"/>
           </a:p>
         </p:txBody>
       </p:sp>
@@ -1040,12 +2419,10 @@
           <a:bodyPr/>
           <a:lstStyle/>
           <a:p>
-            <a:fld id="{9B72A71B-5A03-4006-A249-88022B89F593}" type="datetimeFigureOut">
-              <a:rPr lang="en-GB" smtClean="0"/>
-              <a:pPr/>
-              <a:t>12/31/12</a:t>
+            <a:fld id="{63A1C593-65D0-4073-BCC9-577B9352EA97}" type="datetimeFigureOut">
+              <a:rPr lang="en-US" smtClean="0"/>
             </a:fld>
-            <a:endParaRPr lang="en-GB"/>
+            <a:endParaRPr lang="en-US"/>
           </a:p>
         </p:txBody>
       </p:sp>
@@ -1064,7 +2441,7 @@
           <a:bodyPr/>
           <a:lstStyle/>
           <a:p>
-            <a:endParaRPr lang="en-GB"/>
+            <a:endParaRPr lang="en-US"/>
           </a:p>
         </p:txBody>
       </p:sp>
@@ -1083,12 +2460,10 @@
           <a:bodyPr/>
           <a:lstStyle/>
           <a:p>
-            <a:fld id="{EBA744C6-313F-4EA9-AC01-045AFA194E53}" type="slidenum">
-              <a:rPr lang="en-GB" smtClean="0"/>
-              <a:pPr/>
-              <a:t>‹#›</a:t>
+            <a:fld id="{9B618960-8005-486C-9A75-10CB2AAC16F9}" type="slidenum">
+              <a:rPr lang="en-US" smtClean="0"/>
             </a:fld>
-            <a:endParaRPr lang="en-GB"/>
+            <a:endParaRPr lang="en-US"/>
           </a:p>
         </p:txBody>
       </p:sp>
@@ -1136,7 +2511,7 @@
               <a:rPr lang="en-US" smtClean="0"/>
               <a:t>Click to edit Master title style</a:t>
             </a:r>
-            <a:endParaRPr lang="en-GB"/>
+            <a:endParaRPr lang="en-US"/>
           </a:p>
         </p:txBody>
       </p:sp>
@@ -1152,47 +2527,20 @@
         </p:nvSpPr>
         <p:spPr>
           <a:xfrm>
-            <a:off x="457200" y="1600200"/>
-            <a:ext cx="4038600" cy="4525963"/>
+            <a:off x="838200" y="1825625"/>
+            <a:ext cx="5181600" cy="4351338"/>
           </a:xfrm>
         </p:spPr>
         <p:txBody>
           <a:bodyPr/>
-          <a:lstStyle>
-            <a:lvl1pPr>
-              <a:defRPr sz="2800"/>
-            </a:lvl1pPr>
-            <a:lvl2pPr>
-              <a:defRPr sz="2400"/>
-            </a:lvl2pPr>
-            <a:lvl3pPr>
-              <a:defRPr sz="2000"/>
-            </a:lvl3pPr>
-            <a:lvl4pPr>
-              <a:defRPr sz="1800"/>
-            </a:lvl4pPr>
-            <a:lvl5pPr>
-              <a:defRPr sz="1800"/>
-            </a:lvl5pPr>
-            <a:lvl6pPr>
-              <a:defRPr sz="1800"/>
-            </a:lvl6pPr>
-            <a:lvl7pPr>
-              <a:defRPr sz="1800"/>
-            </a:lvl7pPr>
-            <a:lvl8pPr>
-              <a:defRPr sz="1800"/>
-            </a:lvl8pPr>
-            <a:lvl9pPr>
-              <a:defRPr sz="1800"/>
-            </a:lvl9pPr>
-          </a:lstStyle>
+          <a:lstStyle/>
           <a:p>
             <a:pPr lvl="0"/>
             <a:r>
               <a:rPr lang="en-US" smtClean="0"/>
               <a:t>Click to edit Master text styles</a:t>
             </a:r>
+            <a:endParaRPr lang="en-US" smtClean="0"/>
           </a:p>
           <a:p>
             <a:pPr lvl="1"/>
@@ -1200,6 +2548,7 @@
               <a:rPr lang="en-US" smtClean="0"/>
               <a:t>Second level</a:t>
             </a:r>
+            <a:endParaRPr lang="en-US" smtClean="0"/>
           </a:p>
           <a:p>
             <a:pPr lvl="2"/>
@@ -1207,6 +2556,7 @@
               <a:rPr lang="en-US" smtClean="0"/>
               <a:t>Third level</a:t>
             </a:r>
+            <a:endParaRPr lang="en-US" smtClean="0"/>
           </a:p>
           <a:p>
             <a:pPr lvl="3"/>
@@ -1214,6 +2564,7 @@
               <a:rPr lang="en-US" smtClean="0"/>
               <a:t>Fourth level</a:t>
             </a:r>
+            <a:endParaRPr lang="en-US" smtClean="0"/>
           </a:p>
           <a:p>
             <a:pPr lvl="4"/>
@@ -1221,7 +2572,7 @@
               <a:rPr lang="en-US" smtClean="0"/>
               <a:t>Fifth level</a:t>
             </a:r>
-            <a:endParaRPr lang="en-GB"/>
+            <a:endParaRPr lang="en-US"/>
           </a:p>
         </p:txBody>
       </p:sp>
@@ -1237,47 +2588,20 @@
         </p:nvSpPr>
         <p:spPr>
           <a:xfrm>
-            <a:off x="4648200" y="1600200"/>
-            <a:ext cx="4038600" cy="4525963"/>
+            <a:off x="6172200" y="1825625"/>
+            <a:ext cx="5181600" cy="4351338"/>
           </a:xfrm>
         </p:spPr>
         <p:txBody>
           <a:bodyPr/>
-          <a:lstStyle>
-            <a:lvl1pPr>
-              <a:defRPr sz="2800"/>
-            </a:lvl1pPr>
-            <a:lvl2pPr>
-              <a:defRPr sz="2400"/>
-            </a:lvl2pPr>
-            <a:lvl3pPr>
-              <a:defRPr sz="2000"/>
-            </a:lvl3pPr>
-            <a:lvl4pPr>
-              <a:defRPr sz="1800"/>
-            </a:lvl4pPr>
-            <a:lvl5pPr>
-              <a:defRPr sz="1800"/>
-            </a:lvl5pPr>
-            <a:lvl6pPr>
-              <a:defRPr sz="1800"/>
-            </a:lvl6pPr>
-            <a:lvl7pPr>
-              <a:defRPr sz="1800"/>
-            </a:lvl7pPr>
-            <a:lvl8pPr>
-              <a:defRPr sz="1800"/>
-            </a:lvl8pPr>
-            <a:lvl9pPr>
-              <a:defRPr sz="1800"/>
-            </a:lvl9pPr>
-          </a:lstStyle>
+          <a:lstStyle/>
           <a:p>
             <a:pPr lvl="0"/>
             <a:r>
               <a:rPr lang="en-US" smtClean="0"/>
               <a:t>Click to edit Master text styles</a:t>
             </a:r>
+            <a:endParaRPr lang="en-US" smtClean="0"/>
           </a:p>
           <a:p>
             <a:pPr lvl="1"/>
@@ -1285,6 +2609,7 @@
               <a:rPr lang="en-US" smtClean="0"/>
               <a:t>Second level</a:t>
             </a:r>
+            <a:endParaRPr lang="en-US" smtClean="0"/>
           </a:p>
           <a:p>
             <a:pPr lvl="2"/>
@@ -1292,6 +2617,7 @@
               <a:rPr lang="en-US" smtClean="0"/>
               <a:t>Third level</a:t>
             </a:r>
+            <a:endParaRPr lang="en-US" smtClean="0"/>
           </a:p>
           <a:p>
             <a:pPr lvl="3"/>
@@ -1299,6 +2625,7 @@
               <a:rPr lang="en-US" smtClean="0"/>
               <a:t>Fourth level</a:t>
             </a:r>
+            <a:endParaRPr lang="en-US" smtClean="0"/>
           </a:p>
           <a:p>
             <a:pPr lvl="4"/>
@@ -1306,7 +2633,7 @@
               <a:rPr lang="en-US" smtClean="0"/>
               <a:t>Fifth level</a:t>
             </a:r>
-            <a:endParaRPr lang="en-GB"/>
+            <a:endParaRPr lang="en-US"/>
           </a:p>
         </p:txBody>
       </p:sp>
@@ -1325,12 +2652,10 @@
           <a:bodyPr/>
           <a:lstStyle/>
           <a:p>
-            <a:fld id="{9B72A71B-5A03-4006-A249-88022B89F593}" type="datetimeFigureOut">
-              <a:rPr lang="en-GB" smtClean="0"/>
-              <a:pPr/>
-              <a:t>12/31/12</a:t>
+            <a:fld id="{63A1C593-65D0-4073-BCC9-577B9352EA97}" type="datetimeFigureOut">
+              <a:rPr lang="en-US" smtClean="0"/>
             </a:fld>
-            <a:endParaRPr lang="en-GB"/>
+            <a:endParaRPr lang="en-US"/>
           </a:p>
         </p:txBody>
       </p:sp>
@@ -1349,7 +2674,7 @@
           <a:bodyPr/>
           <a:lstStyle/>
           <a:p>
-            <a:endParaRPr lang="en-GB"/>
+            <a:endParaRPr lang="en-US"/>
           </a:p>
         </p:txBody>
       </p:sp>
@@ -1368,12 +2693,10 @@
           <a:bodyPr/>
           <a:lstStyle/>
           <a:p>
-            <a:fld id="{EBA744C6-313F-4EA9-AC01-045AFA194E53}" type="slidenum">
-              <a:rPr lang="en-GB" smtClean="0"/>
-              <a:pPr/>
-              <a:t>‹#›</a:t>
+            <a:fld id="{9B618960-8005-486C-9A75-10CB2AAC16F9}" type="slidenum">
+              <a:rPr lang="en-US" smtClean="0"/>
             </a:fld>
-            <a:endParaRPr lang="en-GB"/>
+            <a:endParaRPr lang="en-US"/>
           </a:p>
         </p:txBody>
       </p:sp>
@@ -1412,37 +2735,38 @@
             <p:ph type="title"/>
           </p:nvPr>
         </p:nvSpPr>
-        <p:spPr/>
-        <p:txBody>
-          <a:bodyPr/>
-          <a:lstStyle>
-            <a:lvl1pPr>
-              <a:defRPr/>
-            </a:lvl1pPr>
-          </a:lstStyle>
-          <a:p>
-            <a:r>
-              <a:rPr lang="en-US" smtClean="0"/>
-              <a:t>Click to edit Master title style</a:t>
-            </a:r>
-            <a:endParaRPr lang="en-GB"/>
-          </a:p>
-        </p:txBody>
-      </p:sp>
-      <p:sp>
-        <p:nvSpPr>
-          <p:cNvPr id="3" name="Text Placeholder 2"/>
-          <p:cNvSpPr>
-            <a:spLocks noGrp="1"/>
-          </p:cNvSpPr>
-          <p:nvPr>
-            <p:ph type="body" idx="1"/>
-          </p:nvPr>
-        </p:nvSpPr>
         <p:spPr>
           <a:xfrm>
-            <a:off x="457200" y="1535113"/>
-            <a:ext cx="4040188" cy="639762"/>
+            <a:off x="839788" y="365125"/>
+            <a:ext cx="10515600" cy="1325563"/>
+          </a:xfrm>
+        </p:spPr>
+        <p:txBody>
+          <a:bodyPr/>
+          <a:lstStyle/>
+          <a:p>
+            <a:r>
+              <a:rPr lang="en-US" smtClean="0"/>
+              <a:t>Click to edit Master title style</a:t>
+            </a:r>
+            <a:endParaRPr lang="en-US"/>
+          </a:p>
+        </p:txBody>
+      </p:sp>
+      <p:sp>
+        <p:nvSpPr>
+          <p:cNvPr id="3" name="Text Placeholder 2"/>
+          <p:cNvSpPr>
+            <a:spLocks noGrp="1"/>
+          </p:cNvSpPr>
+          <p:nvPr>
+            <p:ph type="body" idx="1"/>
+          </p:nvPr>
+        </p:nvSpPr>
+        <p:spPr>
+          <a:xfrm>
+            <a:off x="839788" y="1681163"/>
+            <a:ext cx="5157787" cy="823912"/>
           </a:xfrm>
         </p:spPr>
         <p:txBody>
@@ -1491,6 +2815,7 @@
               <a:rPr lang="en-US" smtClean="0"/>
               <a:t>Click to edit Master text styles</a:t>
             </a:r>
+            <a:endParaRPr lang="en-US" smtClean="0"/>
           </a:p>
         </p:txBody>
       </p:sp>
@@ -1506,47 +2831,20 @@
         </p:nvSpPr>
         <p:spPr>
           <a:xfrm>
-            <a:off x="457200" y="2174875"/>
-            <a:ext cx="4040188" cy="3951288"/>
+            <a:off x="839788" y="2505075"/>
+            <a:ext cx="5157787" cy="3684588"/>
           </a:xfrm>
         </p:spPr>
         <p:txBody>
           <a:bodyPr/>
-          <a:lstStyle>
-            <a:lvl1pPr>
-              <a:defRPr sz="2400"/>
-            </a:lvl1pPr>
-            <a:lvl2pPr>
-              <a:defRPr sz="2000"/>
-            </a:lvl2pPr>
-            <a:lvl3pPr>
-              <a:defRPr sz="1800"/>
-            </a:lvl3pPr>
-            <a:lvl4pPr>
-              <a:defRPr sz="1600"/>
-            </a:lvl4pPr>
-            <a:lvl5pPr>
-              <a:defRPr sz="1600"/>
-            </a:lvl5pPr>
-            <a:lvl6pPr>
-              <a:defRPr sz="1600"/>
-            </a:lvl6pPr>
-            <a:lvl7pPr>
-              <a:defRPr sz="1600"/>
-            </a:lvl7pPr>
-            <a:lvl8pPr>
-              <a:defRPr sz="1600"/>
-            </a:lvl8pPr>
-            <a:lvl9pPr>
-              <a:defRPr sz="1600"/>
-            </a:lvl9pPr>
-          </a:lstStyle>
+          <a:lstStyle/>
           <a:p>
             <a:pPr lvl="0"/>
             <a:r>
               <a:rPr lang="en-US" smtClean="0"/>
               <a:t>Click to edit Master text styles</a:t>
             </a:r>
+            <a:endParaRPr lang="en-US" smtClean="0"/>
           </a:p>
           <a:p>
             <a:pPr lvl="1"/>
@@ -1554,6 +2852,7 @@
               <a:rPr lang="en-US" smtClean="0"/>
               <a:t>Second level</a:t>
             </a:r>
+            <a:endParaRPr lang="en-US" smtClean="0"/>
           </a:p>
           <a:p>
             <a:pPr lvl="2"/>
@@ -1561,6 +2860,7 @@
               <a:rPr lang="en-US" smtClean="0"/>
               <a:t>Third level</a:t>
             </a:r>
+            <a:endParaRPr lang="en-US" smtClean="0"/>
           </a:p>
           <a:p>
             <a:pPr lvl="3"/>
@@ -1568,6 +2868,7 @@
               <a:rPr lang="en-US" smtClean="0"/>
               <a:t>Fourth level</a:t>
             </a:r>
+            <a:endParaRPr lang="en-US" smtClean="0"/>
           </a:p>
           <a:p>
             <a:pPr lvl="4"/>
@@ -1575,7 +2876,7 @@
               <a:rPr lang="en-US" smtClean="0"/>
               <a:t>Fifth level</a:t>
             </a:r>
-            <a:endParaRPr lang="en-GB"/>
+            <a:endParaRPr lang="en-US"/>
           </a:p>
         </p:txBody>
       </p:sp>
@@ -1591,8 +2892,8 @@
         </p:nvSpPr>
         <p:spPr>
           <a:xfrm>
-            <a:off x="4645025" y="1535113"/>
-            <a:ext cx="4041775" cy="639762"/>
+            <a:off x="6172200" y="1681163"/>
+            <a:ext cx="5183188" cy="823912"/>
           </a:xfrm>
         </p:spPr>
         <p:txBody>
@@ -1641,6 +2942,7 @@
               <a:rPr lang="en-US" smtClean="0"/>
               <a:t>Click to edit Master text styles</a:t>
             </a:r>
+            <a:endParaRPr lang="en-US" smtClean="0"/>
           </a:p>
         </p:txBody>
       </p:sp>
@@ -1656,47 +2958,20 @@
         </p:nvSpPr>
         <p:spPr>
           <a:xfrm>
-            <a:off x="4645025" y="2174875"/>
-            <a:ext cx="4041775" cy="3951288"/>
+            <a:off x="6172200" y="2505075"/>
+            <a:ext cx="5183188" cy="3684588"/>
           </a:xfrm>
         </p:spPr>
         <p:txBody>
           <a:bodyPr/>
-          <a:lstStyle>
-            <a:lvl1pPr>
-              <a:defRPr sz="2400"/>
-            </a:lvl1pPr>
-            <a:lvl2pPr>
-              <a:defRPr sz="2000"/>
-            </a:lvl2pPr>
-            <a:lvl3pPr>
-              <a:defRPr sz="1800"/>
-            </a:lvl3pPr>
-            <a:lvl4pPr>
-              <a:defRPr sz="1600"/>
-            </a:lvl4pPr>
-            <a:lvl5pPr>
-              <a:defRPr sz="1600"/>
-            </a:lvl5pPr>
-            <a:lvl6pPr>
-              <a:defRPr sz="1600"/>
-            </a:lvl6pPr>
-            <a:lvl7pPr>
-              <a:defRPr sz="1600"/>
-            </a:lvl7pPr>
-            <a:lvl8pPr>
-              <a:defRPr sz="1600"/>
-            </a:lvl8pPr>
-            <a:lvl9pPr>
-              <a:defRPr sz="1600"/>
-            </a:lvl9pPr>
-          </a:lstStyle>
+          <a:lstStyle/>
           <a:p>
             <a:pPr lvl="0"/>
             <a:r>
               <a:rPr lang="en-US" smtClean="0"/>
               <a:t>Click to edit Master text styles</a:t>
             </a:r>
+            <a:endParaRPr lang="en-US" smtClean="0"/>
           </a:p>
           <a:p>
             <a:pPr lvl="1"/>
@@ -1704,6 +2979,7 @@
               <a:rPr lang="en-US" smtClean="0"/>
               <a:t>Second level</a:t>
             </a:r>
+            <a:endParaRPr lang="en-US" smtClean="0"/>
           </a:p>
           <a:p>
             <a:pPr lvl="2"/>
@@ -1711,6 +2987,7 @@
               <a:rPr lang="en-US" smtClean="0"/>
               <a:t>Third level</a:t>
             </a:r>
+            <a:endParaRPr lang="en-US" smtClean="0"/>
           </a:p>
           <a:p>
             <a:pPr lvl="3"/>
@@ -1718,6 +2995,7 @@
               <a:rPr lang="en-US" smtClean="0"/>
               <a:t>Fourth level</a:t>
             </a:r>
+            <a:endParaRPr lang="en-US" smtClean="0"/>
           </a:p>
           <a:p>
             <a:pPr lvl="4"/>
@@ -1725,7 +3003,7 @@
               <a:rPr lang="en-US" smtClean="0"/>
               <a:t>Fifth level</a:t>
             </a:r>
-            <a:endParaRPr lang="en-GB"/>
+            <a:endParaRPr lang="en-US"/>
           </a:p>
         </p:txBody>
       </p:sp>
@@ -1744,12 +3022,10 @@
           <a:bodyPr/>
           <a:lstStyle/>
           <a:p>
-            <a:fld id="{9B72A71B-5A03-4006-A249-88022B89F593}" type="datetimeFigureOut">
-              <a:rPr lang="en-GB" smtClean="0"/>
-              <a:pPr/>
-              <a:t>12/31/12</a:t>
+            <a:fld id="{63A1C593-65D0-4073-BCC9-577B9352EA97}" type="datetimeFigureOut">
+              <a:rPr lang="en-US" smtClean="0"/>
             </a:fld>
-            <a:endParaRPr lang="en-GB"/>
+            <a:endParaRPr lang="en-US"/>
           </a:p>
         </p:txBody>
       </p:sp>
@@ -1768,7 +3044,7 @@
           <a:bodyPr/>
           <a:lstStyle/>
           <a:p>
-            <a:endParaRPr lang="en-GB"/>
+            <a:endParaRPr lang="en-US"/>
           </a:p>
         </p:txBody>
       </p:sp>
@@ -1787,12 +3063,10 @@
           <a:bodyPr/>
           <a:lstStyle/>
           <a:p>
-            <a:fld id="{EBA744C6-313F-4EA9-AC01-045AFA194E53}" type="slidenum">
-              <a:rPr lang="en-GB" smtClean="0"/>
-              <a:pPr/>
-              <a:t>‹#›</a:t>
+            <a:fld id="{9B618960-8005-486C-9A75-10CB2AAC16F9}" type="slidenum">
+              <a:rPr lang="en-US" smtClean="0"/>
             </a:fld>
-            <a:endParaRPr lang="en-GB"/>
+            <a:endParaRPr lang="en-US"/>
           </a:p>
         </p:txBody>
       </p:sp>
@@ -1840,7 +3114,7 @@
               <a:rPr lang="en-US" smtClean="0"/>
               <a:t>Click to edit Master title style</a:t>
             </a:r>
-            <a:endParaRPr lang="en-GB"/>
+            <a:endParaRPr lang="en-US"/>
           </a:p>
         </p:txBody>
       </p:sp>
@@ -1859,12 +3133,10 @@
           <a:bodyPr/>
           <a:lstStyle/>
           <a:p>
-            <a:fld id="{9B72A71B-5A03-4006-A249-88022B89F593}" type="datetimeFigureOut">
-              <a:rPr lang="en-GB" smtClean="0"/>
-              <a:pPr/>
-              <a:t>12/31/12</a:t>
+            <a:fld id="{63A1C593-65D0-4073-BCC9-577B9352EA97}" type="datetimeFigureOut">
+              <a:rPr lang="en-US" smtClean="0"/>
             </a:fld>
-            <a:endParaRPr lang="en-GB"/>
+            <a:endParaRPr lang="en-US"/>
           </a:p>
         </p:txBody>
       </p:sp>
@@ -1883,7 +3155,7 @@
           <a:bodyPr/>
           <a:lstStyle/>
           <a:p>
-            <a:endParaRPr lang="en-GB"/>
+            <a:endParaRPr lang="en-US"/>
           </a:p>
         </p:txBody>
       </p:sp>
@@ -1902,12 +3174,10 @@
           <a:bodyPr/>
           <a:lstStyle/>
           <a:p>
-            <a:fld id="{EBA744C6-313F-4EA9-AC01-045AFA194E53}" type="slidenum">
-              <a:rPr lang="en-GB" smtClean="0"/>
-              <a:pPr/>
-              <a:t>‹#›</a:t>
+            <a:fld id="{9B618960-8005-486C-9A75-10CB2AAC16F9}" type="slidenum">
+              <a:rPr lang="en-US" smtClean="0"/>
             </a:fld>
-            <a:endParaRPr lang="en-GB"/>
+            <a:endParaRPr lang="en-US"/>
           </a:p>
         </p:txBody>
       </p:sp>
@@ -1951,12 +3221,10 @@
           <a:bodyPr/>
           <a:lstStyle/>
           <a:p>
-            <a:fld id="{9B72A71B-5A03-4006-A249-88022B89F593}" type="datetimeFigureOut">
-              <a:rPr lang="en-GB" smtClean="0"/>
-              <a:pPr/>
-              <a:t>12/31/12</a:t>
+            <a:fld id="{63A1C593-65D0-4073-BCC9-577B9352EA97}" type="datetimeFigureOut">
+              <a:rPr lang="en-US" smtClean="0"/>
             </a:fld>
-            <a:endParaRPr lang="en-GB"/>
+            <a:endParaRPr lang="en-US"/>
           </a:p>
         </p:txBody>
       </p:sp>
@@ -1975,7 +3243,7 @@
           <a:bodyPr/>
           <a:lstStyle/>
           <a:p>
-            <a:endParaRPr lang="en-GB"/>
+            <a:endParaRPr lang="en-US"/>
           </a:p>
         </p:txBody>
       </p:sp>
@@ -1994,12 +3262,10 @@
           <a:bodyPr/>
           <a:lstStyle/>
           <a:p>
-            <a:fld id="{EBA744C6-313F-4EA9-AC01-045AFA194E53}" type="slidenum">
-              <a:rPr lang="en-GB" smtClean="0"/>
-              <a:pPr/>
-              <a:t>‹#›</a:t>
+            <a:fld id="{9B618960-8005-486C-9A75-10CB2AAC16F9}" type="slidenum">
+              <a:rPr lang="en-US" smtClean="0"/>
             </a:fld>
-            <a:endParaRPr lang="en-GB"/>
+            <a:endParaRPr lang="en-US"/>
           </a:p>
         </p:txBody>
       </p:sp>
@@ -2040,15 +3306,15 @@
         </p:nvSpPr>
         <p:spPr>
           <a:xfrm>
-            <a:off x="457200" y="273050"/>
-            <a:ext cx="3008313" cy="1162050"/>
+            <a:off x="839788" y="457200"/>
+            <a:ext cx="3932237" cy="1600200"/>
           </a:xfrm>
         </p:spPr>
         <p:txBody>
           <a:bodyPr anchor="b"/>
           <a:lstStyle>
-            <a:lvl1pPr algn="l">
-              <a:defRPr sz="2000" b="1"/>
+            <a:lvl1pPr>
+              <a:defRPr sz="3200"/>
             </a:lvl1pPr>
           </a:lstStyle>
           <a:p>
@@ -2056,7 +3322,7 @@
               <a:rPr lang="en-US" smtClean="0"/>
               <a:t>Click to edit Master title style</a:t>
             </a:r>
-            <a:endParaRPr lang="en-GB"/>
+            <a:endParaRPr lang="en-US"/>
           </a:p>
         </p:txBody>
       </p:sp>
@@ -2072,8 +3338,8 @@
         </p:nvSpPr>
         <p:spPr>
           <a:xfrm>
-            <a:off x="3575050" y="273050"/>
-            <a:ext cx="5111750" cy="5853113"/>
+            <a:off x="5183188" y="987425"/>
+            <a:ext cx="6172200" cy="4873625"/>
           </a:xfrm>
         </p:spPr>
         <p:txBody>
@@ -2113,6 +3379,7 @@
               <a:rPr lang="en-US" smtClean="0"/>
               <a:t>Click to edit Master text styles</a:t>
             </a:r>
+            <a:endParaRPr lang="en-US" smtClean="0"/>
           </a:p>
           <a:p>
             <a:pPr lvl="1"/>
@@ -2120,6 +3387,7 @@
               <a:rPr lang="en-US" smtClean="0"/>
               <a:t>Second level</a:t>
             </a:r>
+            <a:endParaRPr lang="en-US" smtClean="0"/>
           </a:p>
           <a:p>
             <a:pPr lvl="2"/>
@@ -2127,6 +3395,7 @@
               <a:rPr lang="en-US" smtClean="0"/>
               <a:t>Third level</a:t>
             </a:r>
+            <a:endParaRPr lang="en-US" smtClean="0"/>
           </a:p>
           <a:p>
             <a:pPr lvl="3"/>
@@ -2134,6 +3403,7 @@
               <a:rPr lang="en-US" smtClean="0"/>
               <a:t>Fourth level</a:t>
             </a:r>
+            <a:endParaRPr lang="en-US" smtClean="0"/>
           </a:p>
           <a:p>
             <a:pPr lvl="4"/>
@@ -2141,7 +3411,7 @@
               <a:rPr lang="en-US" smtClean="0"/>
               <a:t>Fifth level</a:t>
             </a:r>
-            <a:endParaRPr lang="en-GB"/>
+            <a:endParaRPr lang="en-US"/>
           </a:p>
         </p:txBody>
       </p:sp>
@@ -2157,8 +3427,8 @@
         </p:nvSpPr>
         <p:spPr>
           <a:xfrm>
-            <a:off x="457200" y="1435100"/>
-            <a:ext cx="3008313" cy="4691063"/>
+            <a:off x="839788" y="2057400"/>
+            <a:ext cx="3932237" cy="3811588"/>
           </a:xfrm>
         </p:spPr>
         <p:txBody>
@@ -2166,39 +3436,39 @@
           <a:lstStyle>
             <a:lvl1pPr marL="0" indent="0">
               <a:buNone/>
-              <a:defRPr sz="1400"/>
+              <a:defRPr sz="1600"/>
             </a:lvl1pPr>
             <a:lvl2pPr marL="457200" indent="0">
               <a:buNone/>
-              <a:defRPr sz="1200"/>
+              <a:defRPr sz="1400"/>
             </a:lvl2pPr>
             <a:lvl3pPr marL="914400" indent="0">
               <a:buNone/>
-              <a:defRPr sz="1000"/>
+              <a:defRPr sz="1200"/>
             </a:lvl3pPr>
             <a:lvl4pPr marL="1371600" indent="0">
               <a:buNone/>
-              <a:defRPr sz="900"/>
+              <a:defRPr sz="1000"/>
             </a:lvl4pPr>
             <a:lvl5pPr marL="1828800" indent="0">
               <a:buNone/>
-              <a:defRPr sz="900"/>
+              <a:defRPr sz="1000"/>
             </a:lvl5pPr>
             <a:lvl6pPr marL="2286000" indent="0">
               <a:buNone/>
-              <a:defRPr sz="900"/>
+              <a:defRPr sz="1000"/>
             </a:lvl6pPr>
             <a:lvl7pPr marL="2743200" indent="0">
               <a:buNone/>
-              <a:defRPr sz="900"/>
+              <a:defRPr sz="1000"/>
             </a:lvl7pPr>
             <a:lvl8pPr marL="3200400" indent="0">
               <a:buNone/>
-              <a:defRPr sz="900"/>
+              <a:defRPr sz="1000"/>
             </a:lvl8pPr>
             <a:lvl9pPr marL="3657600" indent="0">
               <a:buNone/>
-              <a:defRPr sz="900"/>
+              <a:defRPr sz="1000"/>
             </a:lvl9pPr>
           </a:lstStyle>
           <a:p>
@@ -2207,6 +3477,7 @@
               <a:rPr lang="en-US" smtClean="0"/>
               <a:t>Click to edit Master text styles</a:t>
             </a:r>
+            <a:endParaRPr lang="en-US" smtClean="0"/>
           </a:p>
         </p:txBody>
       </p:sp>
@@ -2225,12 +3496,10 @@
           <a:bodyPr/>
           <a:lstStyle/>
           <a:p>
-            <a:fld id="{9B72A71B-5A03-4006-A249-88022B89F593}" type="datetimeFigureOut">
-              <a:rPr lang="en-GB" smtClean="0"/>
-              <a:pPr/>
-              <a:t>12/31/12</a:t>
+            <a:fld id="{63A1C593-65D0-4073-BCC9-577B9352EA97}" type="datetimeFigureOut">
+              <a:rPr lang="en-US" smtClean="0"/>
             </a:fld>
-            <a:endParaRPr lang="en-GB"/>
+            <a:endParaRPr lang="en-US"/>
           </a:p>
         </p:txBody>
       </p:sp>
@@ -2249,7 +3518,7 @@
           <a:bodyPr/>
           <a:lstStyle/>
           <a:p>
-            <a:endParaRPr lang="en-GB"/>
+            <a:endParaRPr lang="en-US"/>
           </a:p>
         </p:txBody>
       </p:sp>
@@ -2268,12 +3537,10 @@
           <a:bodyPr/>
           <a:lstStyle/>
           <a:p>
-            <a:fld id="{EBA744C6-313F-4EA9-AC01-045AFA194E53}" type="slidenum">
-              <a:rPr lang="en-GB" smtClean="0"/>
-              <a:pPr/>
-              <a:t>‹#›</a:t>
+            <a:fld id="{9B618960-8005-486C-9A75-10CB2AAC16F9}" type="slidenum">
+              <a:rPr lang="en-US" smtClean="0"/>
             </a:fld>
-            <a:endParaRPr lang="en-GB"/>
+            <a:endParaRPr lang="en-US"/>
           </a:p>
         </p:txBody>
       </p:sp>
@@ -2314,15 +3581,15 @@
         </p:nvSpPr>
         <p:spPr>
           <a:xfrm>
-            <a:off x="1792288" y="4800600"/>
-            <a:ext cx="5486400" cy="566738"/>
+            <a:off x="839788" y="457200"/>
+            <a:ext cx="3932237" cy="1600200"/>
           </a:xfrm>
         </p:spPr>
         <p:txBody>
           <a:bodyPr anchor="b"/>
           <a:lstStyle>
-            <a:lvl1pPr algn="l">
-              <a:defRPr sz="2000" b="1"/>
+            <a:lvl1pPr>
+              <a:defRPr sz="3200"/>
             </a:lvl1pPr>
           </a:lstStyle>
           <a:p>
@@ -2330,7 +3597,7 @@
               <a:rPr lang="en-US" smtClean="0"/>
               <a:t>Click to edit Master title style</a:t>
             </a:r>
-            <a:endParaRPr lang="en-GB"/>
+            <a:endParaRPr lang="en-US"/>
           </a:p>
         </p:txBody>
       </p:sp>
@@ -2346,8 +3613,8 @@
         </p:nvSpPr>
         <p:spPr>
           <a:xfrm>
-            <a:off x="1792288" y="612775"/>
-            <a:ext cx="5486400" cy="4114800"/>
+            <a:off x="5183188" y="987425"/>
+            <a:ext cx="6172200" cy="4873625"/>
           </a:xfrm>
         </p:spPr>
         <p:txBody>
@@ -2391,7 +3658,7 @@
             </a:lvl9pPr>
           </a:lstStyle>
           <a:p>
-            <a:endParaRPr lang="en-GB"/>
+            <a:endParaRPr lang="en-US"/>
           </a:p>
         </p:txBody>
       </p:sp>
@@ -2407,8 +3674,8 @@
         </p:nvSpPr>
         <p:spPr>
           <a:xfrm>
-            <a:off x="1792288" y="5367338"/>
-            <a:ext cx="5486400" cy="804862"/>
+            <a:off x="839788" y="2057400"/>
+            <a:ext cx="3932237" cy="3811588"/>
           </a:xfrm>
         </p:spPr>
         <p:txBody>
@@ -2416,39 +3683,39 @@
           <a:lstStyle>
             <a:lvl1pPr marL="0" indent="0">
               <a:buNone/>
-              <a:defRPr sz="1400"/>
+              <a:defRPr sz="1600"/>
             </a:lvl1pPr>
             <a:lvl2pPr marL="457200" indent="0">
               <a:buNone/>
-              <a:defRPr sz="1200"/>
+              <a:defRPr sz="1400"/>
             </a:lvl2pPr>
             <a:lvl3pPr marL="914400" indent="0">
               <a:buNone/>
-              <a:defRPr sz="1000"/>
+              <a:defRPr sz="1200"/>
             </a:lvl3pPr>
             <a:lvl4pPr marL="1371600" indent="0">
               <a:buNone/>
-              <a:defRPr sz="900"/>
+              <a:defRPr sz="1000"/>
             </a:lvl4pPr>
             <a:lvl5pPr marL="1828800" indent="0">
               <a:buNone/>
-              <a:defRPr sz="900"/>
+              <a:defRPr sz="1000"/>
             </a:lvl5pPr>
             <a:lvl6pPr marL="2286000" indent="0">
               <a:buNone/>
-              <a:defRPr sz="900"/>
+              <a:defRPr sz="1000"/>
             </a:lvl6pPr>
             <a:lvl7pPr marL="2743200" indent="0">
               <a:buNone/>
-              <a:defRPr sz="900"/>
+              <a:defRPr sz="1000"/>
             </a:lvl7pPr>
             <a:lvl8pPr marL="3200400" indent="0">
               <a:buNone/>
-              <a:defRPr sz="900"/>
+              <a:defRPr sz="1000"/>
             </a:lvl8pPr>
             <a:lvl9pPr marL="3657600" indent="0">
               <a:buNone/>
-              <a:defRPr sz="900"/>
+              <a:defRPr sz="1000"/>
             </a:lvl9pPr>
           </a:lstStyle>
           <a:p>
@@ -2457,6 +3724,7 @@
               <a:rPr lang="en-US" smtClean="0"/>
               <a:t>Click to edit Master text styles</a:t>
             </a:r>
+            <a:endParaRPr lang="en-US" smtClean="0"/>
           </a:p>
         </p:txBody>
       </p:sp>
@@ -2475,12 +3743,10 @@
           <a:bodyPr/>
           <a:lstStyle/>
           <a:p>
-            <a:fld id="{9B72A71B-5A03-4006-A249-88022B89F593}" type="datetimeFigureOut">
-              <a:rPr lang="en-GB" smtClean="0"/>
-              <a:pPr/>
-              <a:t>12/31/12</a:t>
+            <a:fld id="{63A1C593-65D0-4073-BCC9-577B9352EA97}" type="datetimeFigureOut">
+              <a:rPr lang="en-US" smtClean="0"/>
             </a:fld>
-            <a:endParaRPr lang="en-GB"/>
+            <a:endParaRPr lang="en-US"/>
           </a:p>
         </p:txBody>
       </p:sp>
@@ -2499,7 +3765,7 @@
           <a:bodyPr/>
           <a:lstStyle/>
           <a:p>
-            <a:endParaRPr lang="en-GB"/>
+            <a:endParaRPr lang="en-US"/>
           </a:p>
         </p:txBody>
       </p:sp>
@@ -2518,12 +3784,10 @@
           <a:bodyPr/>
           <a:lstStyle/>
           <a:p>
-            <a:fld id="{EBA744C6-313F-4EA9-AC01-045AFA194E53}" type="slidenum">
-              <a:rPr lang="en-GB" smtClean="0"/>
-              <a:pPr/>
-              <a:t>‹#›</a:t>
+            <a:fld id="{9B618960-8005-486C-9A75-10CB2AAC16F9}" type="slidenum">
+              <a:rPr lang="en-US" smtClean="0"/>
             </a:fld>
-            <a:endParaRPr lang="en-GB"/>
+            <a:endParaRPr lang="en-US"/>
           </a:p>
         </p:txBody>
       </p:sp>
@@ -2539,9 +3803,20 @@
 <p:sldMaster xmlns:a="http://schemas.openxmlformats.org/drawingml/2006/main" xmlns:r="http://schemas.openxmlformats.org/officeDocument/2006/relationships" xmlns:p="http://schemas.openxmlformats.org/presentationml/2006/main">
   <p:cSld>
     <p:bg>
-      <p:bgRef idx="1001">
-        <a:schemeClr val="bg1"/>
-      </p:bgRef>
+      <p:bgPr>
+        <a:gradFill>
+          <a:gsLst>
+            <a:gs pos="0">
+              <a:srgbClr val="007BD3"/>
+            </a:gs>
+            <a:gs pos="100000">
+              <a:srgbClr val="034373"/>
+            </a:gs>
+          </a:gsLst>
+          <a:lin scaled="0"/>
+        </a:gradFill>
+        <a:effectLst/>
+      </p:bgPr>
     </p:bg>
     <p:spTree>
       <p:nvGrpSpPr>
@@ -2569,8 +3844,8 @@
         </p:nvSpPr>
         <p:spPr>
           <a:xfrm>
-            <a:off x="457200" y="274638"/>
-            <a:ext cx="8229600" cy="1143000"/>
+            <a:off x="838200" y="365125"/>
+            <a:ext cx="10515600" cy="1325563"/>
           </a:xfrm>
           <a:prstGeom prst="rect">
             <a:avLst/>
@@ -2586,7 +3861,7 @@
               <a:rPr lang="en-US" smtClean="0"/>
               <a:t>Click to edit Master title style</a:t>
             </a:r>
-            <a:endParaRPr lang="en-GB"/>
+            <a:endParaRPr lang="en-US"/>
           </a:p>
         </p:txBody>
       </p:sp>
@@ -2602,8 +3877,8 @@
         </p:nvSpPr>
         <p:spPr>
           <a:xfrm>
-            <a:off x="457200" y="1600200"/>
-            <a:ext cx="8229600" cy="4525963"/>
+            <a:off x="838200" y="1825625"/>
+            <a:ext cx="10515600" cy="4351338"/>
           </a:xfrm>
           <a:prstGeom prst="rect">
             <a:avLst/>
@@ -2620,6 +3895,7 @@
               <a:rPr lang="en-US" smtClean="0"/>
               <a:t>Click to edit Master text styles</a:t>
             </a:r>
+            <a:endParaRPr lang="en-US" smtClean="0"/>
           </a:p>
           <a:p>
             <a:pPr lvl="1"/>
@@ -2627,6 +3903,7 @@
               <a:rPr lang="en-US" smtClean="0"/>
               <a:t>Second level</a:t>
             </a:r>
+            <a:endParaRPr lang="en-US" smtClean="0"/>
           </a:p>
           <a:p>
             <a:pPr lvl="2"/>
@@ -2634,6 +3911,7 @@
               <a:rPr lang="en-US" smtClean="0"/>
               <a:t>Third level</a:t>
             </a:r>
+            <a:endParaRPr lang="en-US" smtClean="0"/>
           </a:p>
           <a:p>
             <a:pPr lvl="3"/>
@@ -2641,6 +3919,7 @@
               <a:rPr lang="en-US" smtClean="0"/>
               <a:t>Fourth level</a:t>
             </a:r>
+            <a:endParaRPr lang="en-US" smtClean="0"/>
           </a:p>
           <a:p>
             <a:pPr lvl="4"/>
@@ -2648,7 +3927,7 @@
               <a:rPr lang="en-US" smtClean="0"/>
               <a:t>Fifth level</a:t>
             </a:r>
-            <a:endParaRPr lang="en-GB"/>
+            <a:endParaRPr lang="en-US"/>
           </a:p>
         </p:txBody>
       </p:sp>
@@ -2664,8 +3943,8 @@
         </p:nvSpPr>
         <p:spPr>
           <a:xfrm>
-            <a:off x="457200" y="6356350"/>
-            <a:ext cx="2133600" cy="365125"/>
+            <a:off x="838200" y="6356350"/>
+            <a:ext cx="2743200" cy="365125"/>
           </a:xfrm>
           <a:prstGeom prst="rect">
             <a:avLst/>
@@ -2685,12 +3964,10 @@
             </a:lvl1pPr>
           </a:lstStyle>
           <a:p>
-            <a:fld id="{9B72A71B-5A03-4006-A249-88022B89F593}" type="datetimeFigureOut">
-              <a:rPr lang="en-GB" smtClean="0"/>
-              <a:pPr/>
-              <a:t>12/31/12</a:t>
+            <a:fld id="{63A1C593-65D0-4073-BCC9-577B9352EA97}" type="datetimeFigureOut">
+              <a:rPr lang="en-US" smtClean="0"/>
             </a:fld>
-            <a:endParaRPr lang="en-GB"/>
+            <a:endParaRPr lang="en-US"/>
           </a:p>
         </p:txBody>
       </p:sp>
@@ -2706,8 +3983,8 @@
         </p:nvSpPr>
         <p:spPr>
           <a:xfrm>
-            <a:off x="3124200" y="6356350"/>
-            <a:ext cx="2895600" cy="365125"/>
+            <a:off x="4038600" y="6356350"/>
+            <a:ext cx="4114800" cy="365125"/>
           </a:xfrm>
           <a:prstGeom prst="rect">
             <a:avLst/>
@@ -2727,7 +4004,7 @@
             </a:lvl1pPr>
           </a:lstStyle>
           <a:p>
-            <a:endParaRPr lang="en-GB"/>
+            <a:endParaRPr lang="en-US"/>
           </a:p>
         </p:txBody>
       </p:sp>
@@ -2743,8 +4020,8 @@
         </p:nvSpPr>
         <p:spPr>
           <a:xfrm>
-            <a:off x="6553200" y="6356350"/>
-            <a:ext cx="2133600" cy="365125"/>
+            <a:off x="8610600" y="6356350"/>
+            <a:ext cx="2743200" cy="365125"/>
           </a:xfrm>
           <a:prstGeom prst="rect">
             <a:avLst/>
@@ -2764,12 +4041,10 @@
             </a:lvl1pPr>
           </a:lstStyle>
           <a:p>
-            <a:fld id="{EBA744C6-313F-4EA9-AC01-045AFA194E53}" type="slidenum">
-              <a:rPr lang="en-GB" smtClean="0"/>
-              <a:pPr/>
-              <a:t>‹#›</a:t>
+            <a:fld id="{9B618960-8005-486C-9A75-10CB2AAC16F9}" type="slidenum">
+              <a:rPr lang="en-US" smtClean="0"/>
             </a:fld>
-            <a:endParaRPr lang="en-GB"/>
+            <a:endParaRPr lang="en-US"/>
           </a:p>
         </p:txBody>
       </p:sp>
@@ -2791,7 +4066,10 @@
   </p:sldLayoutIdLst>
   <p:txStyles>
     <p:titleStyle>
-      <a:lvl1pPr algn="ctr" defTabSz="914400" rtl="0" eaLnBrk="1" latinLnBrk="0" hangingPunct="1">
+      <a:lvl1pPr algn="l" defTabSz="914400" rtl="0" eaLnBrk="1" latinLnBrk="0" hangingPunct="1">
+        <a:lnSpc>
+          <a:spcPct val="90000"/>
+        </a:lnSpc>
         <a:spcBef>
           <a:spcPct val="0"/>
         </a:spcBef>
@@ -2807,13 +4085,16 @@
       </a:lvl1pPr>
     </p:titleStyle>
     <p:bodyStyle>
-      <a:lvl1pPr marL="342900" indent="-342900" algn="l" defTabSz="914400" rtl="0" eaLnBrk="1" latinLnBrk="0" hangingPunct="1">
+      <a:lvl1pPr marL="228600" indent="-228600" algn="l" defTabSz="914400" rtl="0" eaLnBrk="1" latinLnBrk="0" hangingPunct="1">
+        <a:lnSpc>
+          <a:spcPct val="90000"/>
+        </a:lnSpc>
         <a:spcBef>
-          <a:spcPct val="20000"/>
+          <a:spcPts val="1000"/>
         </a:spcBef>
-        <a:buFont typeface="Arial" pitchFamily="34" charset="0"/>
+        <a:buFont typeface="Arial" panose="020B0604020202020204" pitchFamily="34" charset="0"/>
         <a:buChar char="•"/>
-        <a:defRPr sz="3200" kern="1200">
+        <a:defRPr sz="2800" kern="1200">
           <a:solidFill>
             <a:schemeClr val="tx1"/>
           </a:solidFill>
@@ -2822,13 +4103,16 @@
           <a:cs typeface="+mn-cs"/>
         </a:defRPr>
       </a:lvl1pPr>
-      <a:lvl2pPr marL="742950" indent="-285750" algn="l" defTabSz="914400" rtl="0" eaLnBrk="1" latinLnBrk="0" hangingPunct="1">
+      <a:lvl2pPr marL="685800" indent="-228600" algn="l" defTabSz="914400" rtl="0" eaLnBrk="1" latinLnBrk="0" hangingPunct="1">
+        <a:lnSpc>
+          <a:spcPct val="90000"/>
+        </a:lnSpc>
         <a:spcBef>
-          <a:spcPct val="20000"/>
+          <a:spcPts val="500"/>
         </a:spcBef>
-        <a:buFont typeface="Arial" pitchFamily="34" charset="0"/>
-        <a:buChar char="–"/>
-        <a:defRPr sz="2800" kern="1200">
+        <a:buFont typeface="Arial" panose="020B0604020202020204" pitchFamily="34" charset="0"/>
+        <a:buChar char="•"/>
+        <a:defRPr sz="2400" kern="1200">
           <a:solidFill>
             <a:schemeClr val="tx1"/>
           </a:solidFill>
@@ -2838,12 +4122,15 @@
         </a:defRPr>
       </a:lvl2pPr>
       <a:lvl3pPr marL="1143000" indent="-228600" algn="l" defTabSz="914400" rtl="0" eaLnBrk="1" latinLnBrk="0" hangingPunct="1">
+        <a:lnSpc>
+          <a:spcPct val="90000"/>
+        </a:lnSpc>
         <a:spcBef>
-          <a:spcPct val="20000"/>
+          <a:spcPts val="500"/>
         </a:spcBef>
-        <a:buFont typeface="Arial" pitchFamily="34" charset="0"/>
+        <a:buFont typeface="Arial" panose="020B0604020202020204" pitchFamily="34" charset="0"/>
         <a:buChar char="•"/>
-        <a:defRPr sz="2400" kern="1200">
+        <a:defRPr sz="2000" kern="1200">
           <a:solidFill>
             <a:schemeClr val="tx1"/>
           </a:solidFill>
@@ -2853,12 +4140,15 @@
         </a:defRPr>
       </a:lvl3pPr>
       <a:lvl4pPr marL="1600200" indent="-228600" algn="l" defTabSz="914400" rtl="0" eaLnBrk="1" latinLnBrk="0" hangingPunct="1">
+        <a:lnSpc>
+          <a:spcPct val="90000"/>
+        </a:lnSpc>
         <a:spcBef>
-          <a:spcPct val="20000"/>
+          <a:spcPts val="500"/>
         </a:spcBef>
-        <a:buFont typeface="Arial" pitchFamily="34" charset="0"/>
-        <a:buChar char="–"/>
-        <a:defRPr sz="2000" kern="1200">
+        <a:buFont typeface="Arial" panose="020B0604020202020204" pitchFamily="34" charset="0"/>
+        <a:buChar char="•"/>
+        <a:defRPr sz="1800" kern="1200">
           <a:solidFill>
             <a:schemeClr val="tx1"/>
           </a:solidFill>
@@ -2868,12 +4158,15 @@
         </a:defRPr>
       </a:lvl4pPr>
       <a:lvl5pPr marL="2057400" indent="-228600" algn="l" defTabSz="914400" rtl="0" eaLnBrk="1" latinLnBrk="0" hangingPunct="1">
+        <a:lnSpc>
+          <a:spcPct val="90000"/>
+        </a:lnSpc>
         <a:spcBef>
-          <a:spcPct val="20000"/>
+          <a:spcPts val="500"/>
         </a:spcBef>
-        <a:buFont typeface="Arial" pitchFamily="34" charset="0"/>
-        <a:buChar char="»"/>
-        <a:defRPr sz="2000" kern="1200">
+        <a:buFont typeface="Arial" panose="020B0604020202020204" pitchFamily="34" charset="0"/>
+        <a:buChar char="•"/>
+        <a:defRPr sz="1800" kern="1200">
           <a:solidFill>
             <a:schemeClr val="tx1"/>
           </a:solidFill>
@@ -2883,12 +4176,15 @@
         </a:defRPr>
       </a:lvl5pPr>
       <a:lvl6pPr marL="2514600" indent="-228600" algn="l" defTabSz="914400" rtl="0" eaLnBrk="1" latinLnBrk="0" hangingPunct="1">
+        <a:lnSpc>
+          <a:spcPct val="90000"/>
+        </a:lnSpc>
         <a:spcBef>
-          <a:spcPct val="20000"/>
+          <a:spcPts val="500"/>
         </a:spcBef>
-        <a:buFont typeface="Arial" pitchFamily="34" charset="0"/>
+        <a:buFont typeface="Arial" panose="020B0604020202020204" pitchFamily="34" charset="0"/>
         <a:buChar char="•"/>
-        <a:defRPr sz="2000" kern="1200">
+        <a:defRPr sz="1800" kern="1200">
           <a:solidFill>
             <a:schemeClr val="tx1"/>
           </a:solidFill>
@@ -2898,12 +4194,15 @@
         </a:defRPr>
       </a:lvl6pPr>
       <a:lvl7pPr marL="2971800" indent="-228600" algn="l" defTabSz="914400" rtl="0" eaLnBrk="1" latinLnBrk="0" hangingPunct="1">
+        <a:lnSpc>
+          <a:spcPct val="90000"/>
+        </a:lnSpc>
         <a:spcBef>
-          <a:spcPct val="20000"/>
+          <a:spcPts val="500"/>
         </a:spcBef>
-        <a:buFont typeface="Arial" pitchFamily="34" charset="0"/>
+        <a:buFont typeface="Arial" panose="020B0604020202020204" pitchFamily="34" charset="0"/>
         <a:buChar char="•"/>
-        <a:defRPr sz="2000" kern="1200">
+        <a:defRPr sz="1800" kern="1200">
           <a:solidFill>
             <a:schemeClr val="tx1"/>
           </a:solidFill>
@@ -2913,12 +4212,15 @@
         </a:defRPr>
       </a:lvl7pPr>
       <a:lvl8pPr marL="3429000" indent="-228600" algn="l" defTabSz="914400" rtl="0" eaLnBrk="1" latinLnBrk="0" hangingPunct="1">
+        <a:lnSpc>
+          <a:spcPct val="90000"/>
+        </a:lnSpc>
         <a:spcBef>
-          <a:spcPct val="20000"/>
+          <a:spcPts val="500"/>
         </a:spcBef>
-        <a:buFont typeface="Arial" pitchFamily="34" charset="0"/>
+        <a:buFont typeface="Arial" panose="020B0604020202020204" pitchFamily="34" charset="0"/>
         <a:buChar char="•"/>
-        <a:defRPr sz="2000" kern="1200">
+        <a:defRPr sz="1800" kern="1200">
           <a:solidFill>
             <a:schemeClr val="tx1"/>
           </a:solidFill>
@@ -2928,12 +4230,15 @@
         </a:defRPr>
       </a:lvl8pPr>
       <a:lvl9pPr marL="3886200" indent="-228600" algn="l" defTabSz="914400" rtl="0" eaLnBrk="1" latinLnBrk="0" hangingPunct="1">
+        <a:lnSpc>
+          <a:spcPct val="90000"/>
+        </a:lnSpc>
         <a:spcBef>
-          <a:spcPct val="20000"/>
+          <a:spcPts val="500"/>
         </a:spcBef>
-        <a:buFont typeface="Arial" pitchFamily="34" charset="0"/>
+        <a:buFont typeface="Arial" panose="020B0604020202020204" pitchFamily="34" charset="0"/>
         <a:buChar char="•"/>
-        <a:defRPr sz="2000" kern="1200">
+        <a:defRPr sz="1800" kern="1200">
           <a:solidFill>
             <a:schemeClr val="tx1"/>
           </a:solidFill>
@@ -3045,6 +4350,28 @@
 <file path=ppt/slides/slide1.xml><?xml version="1.0" encoding="utf-8"?>
 <p:sld xmlns:a="http://schemas.openxmlformats.org/drawingml/2006/main" xmlns:r="http://schemas.openxmlformats.org/officeDocument/2006/relationships" xmlns:p="http://schemas.openxmlformats.org/presentationml/2006/main">
   <p:cSld>
+    <p:bg>
+      <p:bgPr>
+        <a:gradFill>
+          <a:gsLst>
+            <a:gs pos="0">
+              <a:schemeClr val="accent1">
+                <a:lumMod val="20000"/>
+                <a:lumOff val="80000"/>
+              </a:schemeClr>
+            </a:gs>
+            <a:gs pos="100000">
+              <a:schemeClr val="accent1">
+                <a:lumMod val="60000"/>
+                <a:lumOff val="40000"/>
+              </a:schemeClr>
+            </a:gs>
+          </a:gsLst>
+          <a:lin ang="5400000" scaled="0"/>
+        </a:gradFill>
+        <a:effectLst/>
+      </p:bgPr>
+    </p:bg>
     <p:spTree>
       <p:nvGrpSpPr>
         <p:cNvPr id="1" name=""/>
@@ -3061,7 +4388,7 @@
       </p:grpSpPr>
       <p:sp>
         <p:nvSpPr>
-          <p:cNvPr id="2" name="Title 1"/>
+          <p:cNvPr id="4" name="Title 3"/>
           <p:cNvSpPr>
             <a:spLocks noGrp="1"/>
           </p:cNvSpPr>
@@ -3072,410 +4399,60 @@
         <p:spPr/>
         <p:txBody>
           <a:bodyPr/>
-          <a:lstStyle/>
-          <a:p>
-            <a:endParaRPr lang="en-US"/>
-          </a:p>
-        </p:txBody>
-      </p:sp>
-      <p:sp>
-        <p:nvSpPr>
-          <p:cNvPr id="3" name="Content Placeholder 2"/>
-          <p:cNvSpPr>
-            <a:spLocks noGrp="1"/>
-          </p:cNvSpPr>
-          <p:nvPr>
-            <p:ph idx="1"/>
-          </p:nvPr>
-        </p:nvSpPr>
-        <p:spPr>
-          <a:xfrm>
-            <a:off x="457200" y="1600201"/>
-            <a:ext cx="4114800" cy="1756792"/>
-          </a:xfrm>
-        </p:spPr>
-        <p:txBody>
-          <a:bodyPr/>
-          <a:lstStyle/>
-          <a:p>
-            <a:endParaRPr lang="en-US" dirty="0"/>
+          <a:p>
+            <a:r>
+              <a:rPr lang="en-US"/>
+              <a:t>Sample contents</a:t>
+            </a:r>
+            <a:endParaRPr lang="en-US"/>
           </a:p>
         </p:txBody>
       </p:sp>
       <p:pic>
         <p:nvPicPr>
-          <p:cNvPr id="6" name="Picture 5" descr="python-logo.gif"/>
+          <p:cNvPr id="7" name="Content Placeholder 6" descr="python-icon"/>
           <p:cNvPicPr>
             <a:picLocks noChangeAspect="1"/>
           </p:cNvPicPr>
-          <p:nvPr/>
+          <p:nvPr>
+            <p:ph sz="half" idx="1"/>
+          </p:nvPr>
         </p:nvPicPr>
         <p:blipFill>
-          <a:blip r:embed="rId2">
-            <a:extLst>
-              <a:ext uri="{28A0092B-C50C-407E-A947-70E740481C1C}">
-                <a14:useLocalDpi xmlns:a14="http://schemas.microsoft.com/office/drawing/2010/main" val="0"/>
-              </a:ext>
-            </a:extLst>
-          </a:blip>
+          <a:blip r:embed="rId2"/>
           <a:stretch>
             <a:fillRect/>
           </a:stretch>
         </p:blipFill>
         <p:spPr>
           <a:xfrm>
-            <a:off x="5580112" y="1988840"/>
-            <a:ext cx="2679700" cy="901700"/>
+            <a:off x="2456815" y="3029585"/>
+            <a:ext cx="1943100" cy="1943100"/>
           </a:xfrm>
           <a:prstGeom prst="rect">
             <a:avLst/>
           </a:prstGeom>
-          <a:ln>
-            <a:solidFill>
-              <a:schemeClr val="bg1">
-                <a:lumMod val="85000"/>
-              </a:schemeClr>
-            </a:solidFill>
-          </a:ln>
         </p:spPr>
       </p:pic>
-      <p:sp>
-        <p:nvSpPr>
-          <p:cNvPr id="7" name="TextBox 6"/>
-          <p:cNvSpPr txBox="1"/>
-          <p:nvPr/>
-        </p:nvSpPr>
-        <p:spPr>
-          <a:xfrm>
-            <a:off x="5580112" y="2924944"/>
-            <a:ext cx="1005403" cy="369332"/>
-          </a:xfrm>
-          <a:prstGeom prst="rect">
-            <a:avLst/>
-          </a:prstGeom>
-          <a:noFill/>
-          <a:ln>
-            <a:solidFill>
-              <a:srgbClr val="D9D9D9"/>
-            </a:solidFill>
-          </a:ln>
-        </p:spPr>
-        <p:txBody>
-          <a:bodyPr wrap="none" rtlCol="0">
-            <a:spAutoFit/>
-          </a:bodyPr>
-          <a:lstStyle/>
-          <a:p>
-            <a:r>
-              <a:rPr lang="en-US" dirty="0" smtClean="0"/>
-              <a:t>Test text</a:t>
-            </a:r>
-          </a:p>
-        </p:txBody>
-      </p:sp>
-      <p:grpSp>
-        <p:nvGrpSpPr>
-          <p:cNvPr id="11" name="Group 10"/>
-          <p:cNvGrpSpPr/>
-          <p:nvPr/>
-        </p:nvGrpSpPr>
-        <p:grpSpPr>
-          <a:xfrm>
-            <a:off x="5580112" y="3645024"/>
-            <a:ext cx="1608659" cy="1305436"/>
-            <a:chOff x="5580112" y="3645024"/>
-            <a:chExt cx="1608659" cy="1305436"/>
-          </a:xfrm>
-        </p:grpSpPr>
-        <p:pic>
-          <p:nvPicPr>
-            <p:cNvPr id="9" name="Picture 8" descr="python-icon.jpeg"/>
-            <p:cNvPicPr>
-              <a:picLocks noChangeAspect="1"/>
-            </p:cNvPicPr>
-            <p:nvPr/>
-          </p:nvPicPr>
-          <p:blipFill>
-            <a:blip r:embed="rId3">
-              <a:extLst>
-                <a:ext uri="{28A0092B-C50C-407E-A947-70E740481C1C}">
-                  <a14:useLocalDpi xmlns:a14="http://schemas.microsoft.com/office/drawing/2010/main" val="0"/>
-                </a:ext>
-              </a:extLst>
-            </a:blip>
-            <a:stretch>
-              <a:fillRect/>
-            </a:stretch>
-          </p:blipFill>
-          <p:spPr>
-            <a:xfrm>
-              <a:off x="5580112" y="3645024"/>
-              <a:ext cx="864096" cy="864096"/>
-            </a:xfrm>
-            <a:prstGeom prst="rect">
-              <a:avLst/>
-            </a:prstGeom>
-            <a:ln>
-              <a:solidFill>
-                <a:srgbClr val="D9D9D9"/>
-              </a:solidFill>
-            </a:ln>
-          </p:spPr>
-        </p:pic>
-        <p:sp>
-          <p:nvSpPr>
-            <p:cNvPr id="10" name="TextBox 9"/>
-            <p:cNvSpPr txBox="1"/>
-            <p:nvPr/>
-          </p:nvSpPr>
-          <p:spPr>
-            <a:xfrm>
-              <a:off x="5580112" y="4581128"/>
-              <a:ext cx="1608659" cy="369332"/>
-            </a:xfrm>
-            <a:prstGeom prst="rect">
-              <a:avLst/>
-            </a:prstGeom>
-            <a:noFill/>
-            <a:ln>
-              <a:solidFill>
-                <a:srgbClr val="D9D9D9"/>
-              </a:solidFill>
-            </a:ln>
-          </p:spPr>
-          <p:txBody>
-            <a:bodyPr wrap="none" rtlCol="0">
-              <a:spAutoFit/>
-            </a:bodyPr>
-            <a:lstStyle/>
-            <a:p>
-              <a:r>
-                <a:rPr lang="en-US" dirty="0" smtClean="0"/>
-                <a:t>Group test text</a:t>
-              </a:r>
-              <a:endParaRPr lang="en-US" dirty="0"/>
-            </a:p>
-          </p:txBody>
-        </p:sp>
-      </p:grpSp>
-      <p:sp>
-        <p:nvSpPr>
-          <p:cNvPr id="12" name="Rounded Rectangle 11"/>
-          <p:cNvSpPr/>
-          <p:nvPr/>
-        </p:nvSpPr>
-        <p:spPr>
-          <a:xfrm>
-            <a:off x="5652120" y="5517232"/>
-            <a:ext cx="914400" cy="914400"/>
-          </a:xfrm>
-          <a:prstGeom prst="roundRect">
-            <a:avLst/>
-          </a:prstGeom>
-        </p:spPr>
-        <p:style>
-          <a:lnRef idx="1">
-            <a:schemeClr val="accent1"/>
-          </a:lnRef>
-          <a:fillRef idx="3">
-            <a:schemeClr val="accent1"/>
-          </a:fillRef>
-          <a:effectRef idx="2">
-            <a:schemeClr val="accent1"/>
-          </a:effectRef>
-          <a:fontRef idx="minor">
-            <a:schemeClr val="lt1"/>
-          </a:fontRef>
-        </p:style>
-        <p:txBody>
-          <a:bodyPr rtlCol="0" anchor="ctr"/>
-          <a:lstStyle/>
-          <a:p>
-            <a:pPr algn="ctr"/>
-            <a:r>
-              <a:rPr lang="en-US" dirty="0" smtClean="0"/>
-              <a:t>Box 1</a:t>
-            </a:r>
-            <a:endParaRPr lang="en-US" dirty="0"/>
-          </a:p>
-        </p:txBody>
-      </p:sp>
-      <p:sp>
-        <p:nvSpPr>
-          <p:cNvPr id="13" name="Rounded Rectangle 12"/>
-          <p:cNvSpPr/>
-          <p:nvPr/>
-        </p:nvSpPr>
-        <p:spPr>
-          <a:xfrm>
-            <a:off x="7668344" y="5517232"/>
-            <a:ext cx="914400" cy="914400"/>
-          </a:xfrm>
-          <a:prstGeom prst="roundRect">
-            <a:avLst/>
-          </a:prstGeom>
-        </p:spPr>
-        <p:style>
-          <a:lnRef idx="1">
-            <a:schemeClr val="accent1"/>
-          </a:lnRef>
-          <a:fillRef idx="3">
-            <a:schemeClr val="accent1"/>
-          </a:fillRef>
-          <a:effectRef idx="2">
-            <a:schemeClr val="accent1"/>
-          </a:effectRef>
-          <a:fontRef idx="minor">
-            <a:schemeClr val="lt1"/>
-          </a:fontRef>
-        </p:style>
-        <p:txBody>
-          <a:bodyPr rtlCol="0" anchor="ctr"/>
-          <a:lstStyle/>
-          <a:p>
-            <a:pPr algn="ctr"/>
-            <a:r>
-              <a:rPr lang="en-US" dirty="0" smtClean="0"/>
-              <a:t>Box 2</a:t>
-            </a:r>
-            <a:endParaRPr lang="en-US" dirty="0"/>
-          </a:p>
-        </p:txBody>
-      </p:sp>
-      <p:cxnSp>
-        <p:nvCxnSpPr>
-          <p:cNvPr id="15" name="Straight Arrow Connector 14"/>
-          <p:cNvCxnSpPr>
-            <a:stCxn id="12" idx="3"/>
-            <a:endCxn id="13" idx="1"/>
-          </p:cNvCxnSpPr>
-          <p:nvPr/>
-        </p:nvCxnSpPr>
-        <p:spPr>
-          <a:xfrm>
-            <a:off x="6566520" y="5974432"/>
-            <a:ext cx="1101824" cy="0"/>
-          </a:xfrm>
-          <a:prstGeom prst="straightConnector1">
-            <a:avLst/>
-          </a:prstGeom>
-          <a:ln>
-            <a:tailEnd type="arrow"/>
-          </a:ln>
-        </p:spPr>
-        <p:style>
-          <a:lnRef idx="2">
-            <a:schemeClr val="accent1"/>
-          </a:lnRef>
-          <a:fillRef idx="0">
-            <a:schemeClr val="accent1"/>
-          </a:fillRef>
-          <a:effectRef idx="1">
-            <a:schemeClr val="accent1"/>
-          </a:effectRef>
-          <a:fontRef idx="minor">
-            <a:schemeClr val="tx1"/>
-          </a:fontRef>
-        </p:style>
-      </p:cxnSp>
       <p:graphicFrame>
         <p:nvGraphicFramePr>
-          <p:cNvPr id="16" name="Table 15"/>
-          <p:cNvGraphicFramePr>
-            <a:graphicFrameLocks noGrp="1"/>
-          </p:cNvGraphicFramePr>
-          <p:nvPr>
-            <p:extLst>
-              <p:ext uri="{D42A27DB-BD31-4B8C-83A1-F6EECF244321}">
-                <p14:modId xmlns:p14="http://schemas.microsoft.com/office/powerpoint/2010/main" val="1439792151"/>
-              </p:ext>
-            </p:extLst>
+          <p:cNvPr id="8" name="Content Placeholder 7"/>
+          <p:cNvGraphicFramePr/>
+          <p:nvPr>
+            <p:ph sz="half" idx="2"/>
           </p:nvPr>
         </p:nvGraphicFramePr>
         <p:xfrm>
-          <a:off x="467544" y="4149080"/>
-          <a:ext cx="4104456" cy="741680"/>
+          <a:off x="6172200" y="1825625"/>
+          <a:ext cx="5181600" cy="4351338"/>
         </p:xfrm>
         <a:graphic>
-          <a:graphicData uri="http://schemas.openxmlformats.org/drawingml/2006/table">
-            <a:tbl>
-              <a:tblPr firstRow="1" bandRow="1">
-                <a:tableStyleId>{5C22544A-7EE6-4342-B048-85BDC9FD1C3A}</a:tableStyleId>
-              </a:tblPr>
-              <a:tblGrid>
-                <a:gridCol w="2052228"/>
-                <a:gridCol w="2052228"/>
-              </a:tblGrid>
-              <a:tr h="370840">
-                <a:tc>
-                  <a:txBody>
-                    <a:bodyPr/>
-                    <a:lstStyle/>
-                    <a:p>
-                      <a:r>
-                        <a:rPr lang="en-US" dirty="0" smtClean="0"/>
-                        <a:t>Col head 1</a:t>
-                      </a:r>
-                      <a:endParaRPr lang="en-US" dirty="0"/>
-                    </a:p>
-                  </a:txBody>
-                  <a:tcPr/>
-                </a:tc>
-                <a:tc>
-                  <a:txBody>
-                    <a:bodyPr/>
-                    <a:lstStyle/>
-                    <a:p>
-                      <a:r>
-                        <a:rPr lang="en-US" dirty="0" smtClean="0"/>
-                        <a:t>Col head 2</a:t>
-                      </a:r>
-                      <a:endParaRPr lang="en-US" dirty="0"/>
-                    </a:p>
-                  </a:txBody>
-                  <a:tcPr/>
-                </a:tc>
-              </a:tr>
-              <a:tr h="370840">
-                <a:tc>
-                  <a:txBody>
-                    <a:bodyPr/>
-                    <a:lstStyle/>
-                    <a:p>
-                      <a:r>
-                        <a:rPr lang="en-US" dirty="0" smtClean="0"/>
-                        <a:t>Cell text 1</a:t>
-                      </a:r>
-                      <a:endParaRPr lang="en-US" dirty="0"/>
-                    </a:p>
-                  </a:txBody>
-                  <a:tcPr/>
-                </a:tc>
-                <a:tc>
-                  <a:txBody>
-                    <a:bodyPr/>
-                    <a:lstStyle/>
-                    <a:p>
-                      <a:r>
-                        <a:rPr lang="en-US" dirty="0" smtClean="0"/>
-                        <a:t>Cell text 2</a:t>
-                      </a:r>
-                      <a:endParaRPr lang="en-US" dirty="0"/>
-                    </a:p>
-                  </a:txBody>
-                  <a:tcPr/>
-                </a:tc>
-              </a:tr>
-            </a:tbl>
+          <a:graphicData uri="http://schemas.openxmlformats.org/drawingml/2006/chart">
+            <c:chart xmlns:c="http://schemas.openxmlformats.org/drawingml/2006/chart" xmlns:r="http://schemas.openxmlformats.org/officeDocument/2006/relationships" r:id="rId1"/>
           </a:graphicData>
         </a:graphic>
       </p:graphicFrame>
     </p:spTree>
-    <p:extLst>
-      <p:ext uri="{BB962C8B-B14F-4D97-AF65-F5344CB8AC3E}">
-        <p14:creationId xmlns:p14="http://schemas.microsoft.com/office/powerpoint/2010/main" val="82472580"/>
-      </p:ext>
-    </p:extLst>
   </p:cSld>
   <p:clrMapOvr>
     <a:masterClrMapping/>
@@ -3494,39 +4471,39 @@
         <a:sysClr val="window" lastClr="FFFFFF"/>
       </a:lt1>
       <a:dk2>
-        <a:srgbClr val="1F497D"/>
+        <a:srgbClr val="44546A"/>
       </a:dk2>
       <a:lt2>
-        <a:srgbClr val="EEECE1"/>
+        <a:srgbClr val="E7E6E6"/>
       </a:lt2>
       <a:accent1>
-        <a:srgbClr val="4F81BD"/>
+        <a:srgbClr val="5B9BD5"/>
       </a:accent1>
       <a:accent2>
-        <a:srgbClr val="C0504D"/>
+        <a:srgbClr val="ED7D31"/>
       </a:accent2>
       <a:accent3>
-        <a:srgbClr val="9BBB59"/>
+        <a:srgbClr val="A5A5A5"/>
       </a:accent3>
       <a:accent4>
-        <a:srgbClr val="8064A2"/>
+        <a:srgbClr val="FFC000"/>
       </a:accent4>
       <a:accent5>
-        <a:srgbClr val="4BACC6"/>
+        <a:srgbClr val="4472C4"/>
       </a:accent5>
       <a:accent6>
-        <a:srgbClr val="F79646"/>
+        <a:srgbClr val="70AD47"/>
       </a:accent6>
       <a:hlink>
-        <a:srgbClr val="0000FF"/>
+        <a:srgbClr val="0563C1"/>
       </a:hlink>
       <a:folHlink>
-        <a:srgbClr val="800080"/>
+        <a:srgbClr val="954F72"/>
       </a:folHlink>
     </a:clrScheme>
     <a:fontScheme name="Office">
       <a:majorFont>
-        <a:latin typeface="Calibri"/>
+        <a:latin typeface="Calibri Light"/>
         <a:ea typeface=""/>
         <a:cs typeface=""/>
         <a:font script="Jpan" typeface="ＭＳ Ｐゴシック"/>
@@ -3558,6 +4535,7 @@
         <a:font script="Mong" typeface="Mongolian Baiti"/>
         <a:font script="Viet" typeface="Times New Roman"/>
         <a:font script="Uigh" typeface="Microsoft Uighur"/>
+        <a:font script="Geor" typeface="Sylfaen"/>
       </a:majorFont>
       <a:minorFont>
         <a:latin typeface="Calibri"/>
@@ -3592,6 +4570,7 @@
         <a:font script="Mong" typeface="Mongolian Baiti"/>
         <a:font script="Viet" typeface="Arial"/>
         <a:font script="Uigh" typeface="Microsoft Uighur"/>
+        <a:font script="Geor" typeface="Sylfaen"/>
       </a:minorFont>
     </a:fontScheme>
     <a:fmtScheme name="Office">
@@ -3603,113 +4582,258 @@
           <a:gsLst>
             <a:gs pos="0">
               <a:schemeClr val="phClr">
-                <a:tint val="50000"/>
-                <a:satMod val="300000"/>
+                <a:lumMod val="110000"/>
+                <a:satMod val="105000"/>
+                <a:tint val="67000"/>
               </a:schemeClr>
             </a:gs>
-            <a:gs pos="35000">
+            <a:gs pos="50000">
               <a:schemeClr val="phClr">
-                <a:tint val="37000"/>
-                <a:satMod val="300000"/>
+                <a:lumMod val="105000"/>
+                <a:satMod val="103000"/>
+                <a:tint val="73000"/>
               </a:schemeClr>
             </a:gs>
             <a:gs pos="100000">
               <a:schemeClr val="phClr">
-                <a:tint val="15000"/>
-                <a:satMod val="350000"/>
+                <a:lumMod val="105000"/>
+                <a:satMod val="109000"/>
+                <a:tint val="81000"/>
               </a:schemeClr>
             </a:gs>
           </a:gsLst>
-          <a:lin ang="16200000" scaled="1"/>
+          <a:lin ang="5400000" scaled="0"/>
         </a:gradFill>
         <a:gradFill rotWithShape="1">
           <a:gsLst>
             <a:gs pos="0">
               <a:schemeClr val="phClr">
-                <a:shade val="51000"/>
-                <a:satMod val="130000"/>
+                <a:satMod val="103000"/>
+                <a:lumMod val="102000"/>
+                <a:tint val="94000"/>
               </a:schemeClr>
             </a:gs>
-            <a:gs pos="80000">
+            <a:gs pos="50000">
               <a:schemeClr val="phClr">
-                <a:shade val="93000"/>
-                <a:satMod val="130000"/>
+                <a:satMod val="110000"/>
+                <a:lumMod val="100000"/>
+                <a:shade val="100000"/>
               </a:schemeClr>
             </a:gs>
             <a:gs pos="100000">
               <a:schemeClr val="phClr">
-                <a:shade val="94000"/>
-                <a:satMod val="135000"/>
+                <a:lumMod val="99000"/>
+                <a:satMod val="120000"/>
+                <a:shade val="78000"/>
               </a:schemeClr>
             </a:gs>
           </a:gsLst>
-          <a:lin ang="16200000" scaled="0"/>
+          <a:lin ang="5400000" scaled="0"/>
         </a:gradFill>
       </a:fillStyleLst>
       <a:lnStyleLst>
-        <a:ln w="9525" cap="flat" cmpd="sng" algn="ctr">
-          <a:solidFill>
-            <a:schemeClr val="phClr">
-              <a:shade val="95000"/>
-              <a:satMod val="105000"/>
-            </a:schemeClr>
-          </a:solidFill>
-          <a:prstDash val="solid"/>
-        </a:ln>
-        <a:ln w="25400" cap="flat" cmpd="sng" algn="ctr">
+        <a:ln w="6350" cap="flat" cmpd="sng" algn="ctr">
           <a:solidFill>
             <a:schemeClr val="phClr"/>
           </a:solidFill>
           <a:prstDash val="solid"/>
+          <a:miter lim="800000"/>
         </a:ln>
-        <a:ln w="38100" cap="flat" cmpd="sng" algn="ctr">
+        <a:ln w="12700" cap="flat" cmpd="sng" algn="ctr">
           <a:solidFill>
             <a:schemeClr val="phClr"/>
           </a:solidFill>
           <a:prstDash val="solid"/>
+          <a:miter lim="800000"/>
+        </a:ln>
+        <a:ln w="19050" cap="flat" cmpd="sng" algn="ctr">
+          <a:solidFill>
+            <a:schemeClr val="phClr"/>
+          </a:solidFill>
+          <a:prstDash val="solid"/>
+          <a:miter lim="800000"/>
         </a:ln>
       </a:lnStyleLst>
       <a:effectStyleLst>
         <a:effectStyle>
+          <a:effectLst/>
+        </a:effectStyle>
+        <a:effectStyle>
+          <a:effectLst/>
+        </a:effectStyle>
+        <a:effectStyle>
           <a:effectLst>
-            <a:outerShdw blurRad="40000" dist="20000" dir="5400000" rotWithShape="0">
+            <a:outerShdw blurRad="57150" dist="19050" dir="5400000" algn="ctr" rotWithShape="0">
               <a:srgbClr val="000000">
-                <a:alpha val="38000"/>
+                <a:alpha val="63000"/>
               </a:srgbClr>
             </a:outerShdw>
           </a:effectLst>
         </a:effectStyle>
-        <a:effectStyle>
-          <a:effectLst>
-            <a:outerShdw blurRad="40000" dist="23000" dir="5400000" rotWithShape="0">
-              <a:srgbClr val="000000">
-                <a:alpha val="35000"/>
-              </a:srgbClr>
-            </a:outerShdw>
-          </a:effectLst>
-        </a:effectStyle>
-        <a:effectStyle>
-          <a:effectLst>
-            <a:outerShdw blurRad="40000" dist="23000" dir="5400000" rotWithShape="0">
-              <a:srgbClr val="000000">
-                <a:alpha val="35000"/>
-              </a:srgbClr>
-            </a:outerShdw>
-          </a:effectLst>
-          <a:scene3d>
-            <a:camera prst="orthographicFront">
-              <a:rot lat="0" lon="0" rev="0"/>
-            </a:camera>
-            <a:lightRig rig="threePt" dir="t">
-              <a:rot lat="0" lon="0" rev="1200000"/>
-            </a:lightRig>
-          </a:scene3d>
-          <a:sp3d>
-            <a:bevelT w="63500" h="25400"/>
-          </a:sp3d>
-        </a:effectStyle>
       </a:effectStyleLst>
       <a:bgFillStyleLst>
+        <a:solidFill>
+          <a:schemeClr val="phClr"/>
+        </a:solidFill>
+        <a:solidFill>
+          <a:schemeClr val="phClr">
+            <a:tint val="95000"/>
+            <a:satMod val="170000"/>
+          </a:schemeClr>
+        </a:solidFill>
+        <a:gradFill rotWithShape="1">
+          <a:gsLst>
+            <a:gs pos="0">
+              <a:schemeClr val="phClr">
+                <a:tint val="93000"/>
+                <a:satMod val="150000"/>
+                <a:shade val="98000"/>
+                <a:lumMod val="102000"/>
+              </a:schemeClr>
+            </a:gs>
+            <a:gs pos="50000">
+              <a:schemeClr val="phClr">
+                <a:tint val="98000"/>
+                <a:satMod val="130000"/>
+                <a:shade val="90000"/>
+                <a:lumMod val="103000"/>
+              </a:schemeClr>
+            </a:gs>
+            <a:gs pos="100000">
+              <a:schemeClr val="phClr">
+                <a:shade val="63000"/>
+                <a:satMod val="120000"/>
+              </a:schemeClr>
+            </a:gs>
+          </a:gsLst>
+          <a:lin ang="5400000" scaled="0"/>
+        </a:gradFill>
+      </a:bgFillStyleLst>
+    </a:fmtScheme>
+  </a:themeElements>
+  <a:extLst>
+    <a:ext uri="{05A4C25C-085E-4340-85A3-A5531E510DB2}">
+      <thm15:themeFamily xmlns:thm15="http://schemas.microsoft.com/office/thememl/2012/main" name="Office Theme" id="{62F939B6-93AF-4DB8-9C6B-D6C7DFDC589F}" vid="{4A3C46E8-61CC-4603-A589-7422A47A8E4A}"/>
+    </a:ext>
+  </a:extLst>
+</a:theme>
+</file>
+
+<file path=ppt/theme/theme2.xml><?xml version="1.0" encoding="utf-8"?>
+<a:theme xmlns:a="http://schemas.openxmlformats.org/drawingml/2006/main" name="Office Theme">
+  <a:themeElements>
+    <a:clrScheme name="Office">
+      <a:dk1>
+        <a:sysClr val="windowText" lastClr="000000"/>
+      </a:dk1>
+      <a:lt1>
+        <a:sysClr val="window" lastClr="FFFFFF"/>
+      </a:lt1>
+      <a:dk2>
+        <a:srgbClr val="44546A"/>
+      </a:dk2>
+      <a:lt2>
+        <a:srgbClr val="E7E6E6"/>
+      </a:lt2>
+      <a:accent1>
+        <a:srgbClr val="5B9BD5"/>
+      </a:accent1>
+      <a:accent2>
+        <a:srgbClr val="ED7D31"/>
+      </a:accent2>
+      <a:accent3>
+        <a:srgbClr val="A5A5A5"/>
+      </a:accent3>
+      <a:accent4>
+        <a:srgbClr val="FFC000"/>
+      </a:accent4>
+      <a:accent5>
+        <a:srgbClr val="4472C4"/>
+      </a:accent5>
+      <a:accent6>
+        <a:srgbClr val="70AD47"/>
+      </a:accent6>
+      <a:hlink>
+        <a:srgbClr val="0563C1"/>
+      </a:hlink>
+      <a:folHlink>
+        <a:srgbClr val="954F72"/>
+      </a:folHlink>
+    </a:clrScheme>
+    <a:fontScheme name="Office">
+      <a:majorFont>
+        <a:latin typeface="Calibri Light"/>
+        <a:ea typeface=""/>
+        <a:cs typeface=""/>
+        <a:font script="Jpan" typeface="ＭＳ Ｐゴシック"/>
+        <a:font script="Hang" typeface="맑은 고딕"/>
+        <a:font script="Hans" typeface="宋体"/>
+        <a:font script="Hant" typeface="新細明體"/>
+        <a:font script="Arab" typeface="Times New Roman"/>
+        <a:font script="Hebr" typeface="Times New Roman"/>
+        <a:font script="Thai" typeface="Angsana New"/>
+        <a:font script="Ethi" typeface="Nyala"/>
+        <a:font script="Beng" typeface="Vrinda"/>
+        <a:font script="Gujr" typeface="Shruti"/>
+        <a:font script="Khmr" typeface="MoolBoran"/>
+        <a:font script="Knda" typeface="Tunga"/>
+        <a:font script="Guru" typeface="Raavi"/>
+        <a:font script="Cans" typeface="Euphemia"/>
+        <a:font script="Cher" typeface="Plantagenet Cherokee"/>
+        <a:font script="Yiii" typeface="Microsoft Yi Baiti"/>
+        <a:font script="Tibt" typeface="Microsoft Himalaya"/>
+        <a:font script="Thaa" typeface="MV Boli"/>
+        <a:font script="Deva" typeface="Mangal"/>
+        <a:font script="Telu" typeface="Gautami"/>
+        <a:font script="Taml" typeface="Latha"/>
+        <a:font script="Syrc" typeface="Estrangelo Edessa"/>
+        <a:font script="Orya" typeface="Kalinga"/>
+        <a:font script="Mlym" typeface="Kartika"/>
+        <a:font script="Laoo" typeface="DokChampa"/>
+        <a:font script="Sinh" typeface="Iskoola Pota"/>
+        <a:font script="Mong" typeface="Mongolian Baiti"/>
+        <a:font script="Viet" typeface="Times New Roman"/>
+        <a:font script="Uigh" typeface="Microsoft Uighur"/>
+        <a:font script="Geor" typeface="Sylfaen"/>
+      </a:majorFont>
+      <a:minorFont>
+        <a:latin typeface="Calibri"/>
+        <a:ea typeface=""/>
+        <a:cs typeface=""/>
+        <a:font script="Jpan" typeface="ＭＳ Ｐゴシック"/>
+        <a:font script="Hang" typeface="맑은 고딕"/>
+        <a:font script="Hans" typeface="宋体"/>
+        <a:font script="Hant" typeface="新細明體"/>
+        <a:font script="Arab" typeface="Arial"/>
+        <a:font script="Hebr" typeface="Arial"/>
+        <a:font script="Thai" typeface="Cordia New"/>
+        <a:font script="Ethi" typeface="Nyala"/>
+        <a:font script="Beng" typeface="Vrinda"/>
+        <a:font script="Gujr" typeface="Shruti"/>
+        <a:font script="Khmr" typeface="DaunPenh"/>
+        <a:font script="Knda" typeface="Tunga"/>
+        <a:font script="Guru" typeface="Raavi"/>
+        <a:font script="Cans" typeface="Euphemia"/>
+        <a:font script="Cher" typeface="Plantagenet Cherokee"/>
+        <a:font script="Yiii" typeface="Microsoft Yi Baiti"/>
+        <a:font script="Tibt" typeface="Microsoft Himalaya"/>
+        <a:font script="Thaa" typeface="MV Boli"/>
+        <a:font script="Deva" typeface="Mangal"/>
+        <a:font script="Telu" typeface="Gautami"/>
+        <a:font script="Taml" typeface="Latha"/>
+        <a:font script="Syrc" typeface="Estrangelo Edessa"/>
+        <a:font script="Orya" typeface="Kalinga"/>
+        <a:font script="Mlym" typeface="Kartika"/>
+        <a:font script="Laoo" typeface="DokChampa"/>
+        <a:font script="Sinh" typeface="Iskoola Pota"/>
+        <a:font script="Mong" typeface="Mongolian Baiti"/>
+        <a:font script="Viet" typeface="Arial"/>
+        <a:font script="Uigh" typeface="Microsoft Uighur"/>
+        <a:font script="Geor" typeface="Sylfaen"/>
+      </a:minorFont>
+    </a:fontScheme>
+    <a:fmtScheme name="Office">
+      <a:fillStyleLst>
         <a:solidFill>
           <a:schemeClr val="phClr"/>
         </a:solidFill>
@@ -3717,51 +4841,139 @@
           <a:gsLst>
             <a:gs pos="0">
               <a:schemeClr val="phClr">
-                <a:tint val="40000"/>
-                <a:satMod val="350000"/>
+                <a:lumMod val="110000"/>
+                <a:satMod val="105000"/>
+                <a:tint val="67000"/>
               </a:schemeClr>
             </a:gs>
-            <a:gs pos="40000">
+            <a:gs pos="50000">
               <a:schemeClr val="phClr">
-                <a:tint val="45000"/>
-                <a:shade val="99000"/>
-                <a:satMod val="350000"/>
+                <a:lumMod val="105000"/>
+                <a:satMod val="103000"/>
+                <a:tint val="73000"/>
               </a:schemeClr>
             </a:gs>
             <a:gs pos="100000">
               <a:schemeClr val="phClr">
-                <a:shade val="20000"/>
-                <a:satMod val="255000"/>
+                <a:lumMod val="105000"/>
+                <a:satMod val="109000"/>
+                <a:tint val="81000"/>
               </a:schemeClr>
             </a:gs>
           </a:gsLst>
-          <a:path path="circle">
-            <a:fillToRect l="50000" t="-80000" r="50000" b="180000"/>
-          </a:path>
+          <a:lin ang="5400000" scaled="0"/>
         </a:gradFill>
         <a:gradFill rotWithShape="1">
           <a:gsLst>
             <a:gs pos="0">
               <a:schemeClr val="phClr">
-                <a:tint val="80000"/>
-                <a:satMod val="300000"/>
+                <a:satMod val="103000"/>
+                <a:lumMod val="102000"/>
+                <a:tint val="94000"/>
+              </a:schemeClr>
+            </a:gs>
+            <a:gs pos="50000">
+              <a:schemeClr val="phClr">
+                <a:satMod val="110000"/>
+                <a:lumMod val="100000"/>
+                <a:shade val="100000"/>
               </a:schemeClr>
             </a:gs>
             <a:gs pos="100000">
               <a:schemeClr val="phClr">
-                <a:shade val="30000"/>
-                <a:satMod val="200000"/>
+                <a:lumMod val="99000"/>
+                <a:satMod val="120000"/>
+                <a:shade val="78000"/>
               </a:schemeClr>
             </a:gs>
           </a:gsLst>
-          <a:path path="circle">
-            <a:fillToRect l="50000" t="50000" r="50000" b="50000"/>
-          </a:path>
+          <a:lin ang="5400000" scaled="0"/>
+        </a:gradFill>
+      </a:fillStyleLst>
+      <a:lnStyleLst>
+        <a:ln w="6350" cap="flat" cmpd="sng" algn="ctr">
+          <a:solidFill>
+            <a:schemeClr val="phClr"/>
+          </a:solidFill>
+          <a:prstDash val="solid"/>
+          <a:miter lim="800000"/>
+        </a:ln>
+        <a:ln w="12700" cap="flat" cmpd="sng" algn="ctr">
+          <a:solidFill>
+            <a:schemeClr val="phClr"/>
+          </a:solidFill>
+          <a:prstDash val="solid"/>
+          <a:miter lim="800000"/>
+        </a:ln>
+        <a:ln w="19050" cap="flat" cmpd="sng" algn="ctr">
+          <a:solidFill>
+            <a:schemeClr val="phClr"/>
+          </a:solidFill>
+          <a:prstDash val="solid"/>
+          <a:miter lim="800000"/>
+        </a:ln>
+      </a:lnStyleLst>
+      <a:effectStyleLst>
+        <a:effectStyle>
+          <a:effectLst/>
+        </a:effectStyle>
+        <a:effectStyle>
+          <a:effectLst/>
+        </a:effectStyle>
+        <a:effectStyle>
+          <a:effectLst>
+            <a:outerShdw blurRad="57150" dist="19050" dir="5400000" algn="ctr" rotWithShape="0">
+              <a:srgbClr val="000000">
+                <a:alpha val="63000"/>
+              </a:srgbClr>
+            </a:outerShdw>
+          </a:effectLst>
+        </a:effectStyle>
+      </a:effectStyleLst>
+      <a:bgFillStyleLst>
+        <a:solidFill>
+          <a:schemeClr val="phClr"/>
+        </a:solidFill>
+        <a:solidFill>
+          <a:schemeClr val="phClr">
+            <a:tint val="95000"/>
+            <a:satMod val="170000"/>
+          </a:schemeClr>
+        </a:solidFill>
+        <a:gradFill rotWithShape="1">
+          <a:gsLst>
+            <a:gs pos="0">
+              <a:schemeClr val="phClr">
+                <a:tint val="93000"/>
+                <a:satMod val="150000"/>
+                <a:shade val="98000"/>
+                <a:lumMod val="102000"/>
+              </a:schemeClr>
+            </a:gs>
+            <a:gs pos="50000">
+              <a:schemeClr val="phClr">
+                <a:tint val="98000"/>
+                <a:satMod val="130000"/>
+                <a:shade val="90000"/>
+                <a:lumMod val="103000"/>
+              </a:schemeClr>
+            </a:gs>
+            <a:gs pos="100000">
+              <a:schemeClr val="phClr">
+                <a:shade val="63000"/>
+                <a:satMod val="120000"/>
+              </a:schemeClr>
+            </a:gs>
+          </a:gsLst>
+          <a:lin ang="5400000" scaled="0"/>
         </a:gradFill>
       </a:bgFillStyleLst>
     </a:fmtScheme>
   </a:themeElements>
-  <a:objectDefaults/>
-  <a:extraClrSchemeLst/>
+  <a:extLst>
+    <a:ext uri="{05A4C25C-085E-4340-85A3-A5531E510DB2}">
+      <thm15:themeFamily xmlns:thm15="http://schemas.microsoft.com/office/thememl/2012/main" name="Office Theme" id="{62F939B6-93AF-4DB8-9C6B-D6C7DFDC589F}" vid="{4A3C46E8-61CC-4603-A589-7422A47A8E4A}"/>
+    </a:ext>
+  </a:extLst>
 </a:theme>
 </file>
</xml_diff>

<commit_message>
Handle non-static slide relationships
Rels.assign() now handles non-static relationships by cloning their target parts

Signed-off-by: denim2x <denim2x@cyberdude.com>
</commit_message>
<xml_diff>
--- a/tests/test_files/test_slides.pptx
+++ b/tests/test_files/test_slides.pptx
@@ -1144,6 +1144,2659 @@
 </p:cmLst>
 </file>
 
+<file path=ppt/diagrams/colors1.xml><?xml version="1.0" encoding="utf-8"?>
+<dgm:colorsDef xmlns:dgm="http://schemas.openxmlformats.org/drawingml/2006/diagram" xmlns:a="http://schemas.openxmlformats.org/drawingml/2006/main" uniqueId="urn:microsoft.com/office/officeart/2005/8/colors/accent1_2">
+  <dgm:title val=""/>
+  <dgm:desc val=""/>
+  <dgm:catLst>
+    <dgm:cat type="accent1" pri="11200"/>
+  </dgm:catLst>
+  <dgm:styleLbl name="alignAcc1">
+    <dgm:fillClrLst meth="repeat">
+      <a:schemeClr val="lt1">
+        <a:alpha val="90000"/>
+      </a:schemeClr>
+    </dgm:fillClrLst>
+    <dgm:linClrLst meth="repeat">
+      <a:schemeClr val="accent1"/>
+    </dgm:linClrLst>
+    <dgm:effectClrLst/>
+    <dgm:txLinClrLst/>
+    <dgm:txFillClrLst meth="repeat">
+      <a:schemeClr val="dk1"/>
+    </dgm:txFillClrLst>
+    <dgm:txEffectClrLst/>
+  </dgm:styleLbl>
+  <dgm:styleLbl name="alignAccFollowNode1">
+    <dgm:fillClrLst meth="repeat">
+      <a:schemeClr val="accent1">
+        <a:alpha val="90000"/>
+        <a:tint val="40000"/>
+      </a:schemeClr>
+    </dgm:fillClrLst>
+    <dgm:linClrLst meth="repeat">
+      <a:schemeClr val="accent1">
+        <a:alpha val="90000"/>
+        <a:tint val="40000"/>
+      </a:schemeClr>
+    </dgm:linClrLst>
+    <dgm:effectClrLst/>
+    <dgm:txLinClrLst/>
+    <dgm:txFillClrLst meth="repeat">
+      <a:schemeClr val="dk1"/>
+    </dgm:txFillClrLst>
+    <dgm:txEffectClrLst/>
+  </dgm:styleLbl>
+  <dgm:styleLbl name="alignImgPlace1">
+    <dgm:fillClrLst meth="repeat">
+      <a:schemeClr val="accent1">
+        <a:tint val="50000"/>
+      </a:schemeClr>
+    </dgm:fillClrLst>
+    <dgm:linClrLst meth="repeat">
+      <a:schemeClr val="lt1"/>
+    </dgm:linClrLst>
+    <dgm:effectClrLst/>
+    <dgm:txLinClrLst/>
+    <dgm:txFillClrLst meth="repeat">
+      <a:schemeClr val="lt1"/>
+    </dgm:txFillClrLst>
+    <dgm:txEffectClrLst/>
+  </dgm:styleLbl>
+  <dgm:styleLbl name="alignNode1">
+    <dgm:fillClrLst meth="repeat">
+      <a:schemeClr val="accent1"/>
+    </dgm:fillClrLst>
+    <dgm:linClrLst meth="repeat">
+      <a:schemeClr val="accent1"/>
+    </dgm:linClrLst>
+    <dgm:effectClrLst/>
+    <dgm:txLinClrLst/>
+    <dgm:txFillClrLst/>
+    <dgm:txEffectClrLst/>
+  </dgm:styleLbl>
+  <dgm:styleLbl name="asst0">
+    <dgm:fillClrLst meth="repeat">
+      <a:schemeClr val="accent1"/>
+    </dgm:fillClrLst>
+    <dgm:linClrLst meth="repeat">
+      <a:schemeClr val="lt1"/>
+    </dgm:linClrLst>
+    <dgm:effectClrLst/>
+    <dgm:txLinClrLst/>
+    <dgm:txFillClrLst/>
+    <dgm:txEffectClrLst/>
+  </dgm:styleLbl>
+  <dgm:styleLbl name="asst1">
+    <dgm:fillClrLst meth="repeat">
+      <a:schemeClr val="accent1"/>
+    </dgm:fillClrLst>
+    <dgm:linClrLst meth="repeat">
+      <a:schemeClr val="lt1"/>
+    </dgm:linClrLst>
+    <dgm:effectClrLst/>
+    <dgm:txLinClrLst/>
+    <dgm:txFillClrLst/>
+    <dgm:txEffectClrLst/>
+  </dgm:styleLbl>
+  <dgm:styleLbl name="asst2">
+    <dgm:fillClrLst meth="repeat">
+      <a:schemeClr val="accent1"/>
+    </dgm:fillClrLst>
+    <dgm:linClrLst meth="repeat">
+      <a:schemeClr val="lt1"/>
+    </dgm:linClrLst>
+    <dgm:effectClrLst/>
+    <dgm:txLinClrLst/>
+    <dgm:txFillClrLst/>
+    <dgm:txEffectClrLst/>
+  </dgm:styleLbl>
+  <dgm:styleLbl name="asst3">
+    <dgm:fillClrLst meth="repeat">
+      <a:schemeClr val="accent1"/>
+    </dgm:fillClrLst>
+    <dgm:linClrLst meth="repeat">
+      <a:schemeClr val="lt1"/>
+    </dgm:linClrLst>
+    <dgm:effectClrLst/>
+    <dgm:txLinClrLst/>
+    <dgm:txFillClrLst/>
+    <dgm:txEffectClrLst/>
+  </dgm:styleLbl>
+  <dgm:styleLbl name="asst4">
+    <dgm:fillClrLst meth="repeat">
+      <a:schemeClr val="accent1"/>
+    </dgm:fillClrLst>
+    <dgm:linClrLst meth="repeat">
+      <a:schemeClr val="lt1"/>
+    </dgm:linClrLst>
+    <dgm:effectClrLst/>
+    <dgm:txLinClrLst/>
+    <dgm:txFillClrLst/>
+    <dgm:txEffectClrLst/>
+  </dgm:styleLbl>
+  <dgm:styleLbl name="bgAcc1">
+    <dgm:fillClrLst meth="repeat">
+      <a:schemeClr val="lt1">
+        <a:alpha val="90000"/>
+      </a:schemeClr>
+    </dgm:fillClrLst>
+    <dgm:linClrLst meth="repeat">
+      <a:schemeClr val="accent1"/>
+    </dgm:linClrLst>
+    <dgm:effectClrLst/>
+    <dgm:txLinClrLst/>
+    <dgm:txFillClrLst meth="repeat">
+      <a:schemeClr val="dk1"/>
+    </dgm:txFillClrLst>
+    <dgm:txEffectClrLst/>
+  </dgm:styleLbl>
+  <dgm:styleLbl name="bgAccFollowNode1">
+    <dgm:fillClrLst meth="repeat">
+      <a:schemeClr val="accent1">
+        <a:alpha val="90000"/>
+        <a:tint val="40000"/>
+      </a:schemeClr>
+    </dgm:fillClrLst>
+    <dgm:linClrLst meth="repeat">
+      <a:schemeClr val="accent1">
+        <a:alpha val="90000"/>
+        <a:tint val="40000"/>
+      </a:schemeClr>
+    </dgm:linClrLst>
+    <dgm:effectClrLst/>
+    <dgm:txLinClrLst/>
+    <dgm:txFillClrLst meth="repeat">
+      <a:schemeClr val="dk1"/>
+    </dgm:txFillClrLst>
+    <dgm:txEffectClrLst/>
+  </dgm:styleLbl>
+  <dgm:styleLbl name="bgImgPlace1">
+    <dgm:fillClrLst meth="repeat">
+      <a:schemeClr val="accent1">
+        <a:tint val="50000"/>
+      </a:schemeClr>
+    </dgm:fillClrLst>
+    <dgm:linClrLst meth="repeat">
+      <a:schemeClr val="lt1"/>
+    </dgm:linClrLst>
+    <dgm:effectClrLst/>
+    <dgm:txLinClrLst/>
+    <dgm:txFillClrLst meth="repeat">
+      <a:schemeClr val="lt1"/>
+    </dgm:txFillClrLst>
+    <dgm:txEffectClrLst/>
+  </dgm:styleLbl>
+  <dgm:styleLbl name="bgShp">
+    <dgm:fillClrLst meth="repeat">
+      <a:schemeClr val="accent1">
+        <a:tint val="40000"/>
+      </a:schemeClr>
+    </dgm:fillClrLst>
+    <dgm:linClrLst meth="repeat">
+      <a:schemeClr val="accent1"/>
+    </dgm:linClrLst>
+    <dgm:effectClrLst/>
+    <dgm:txLinClrLst/>
+    <dgm:txFillClrLst meth="repeat">
+      <a:schemeClr val="dk1"/>
+    </dgm:txFillClrLst>
+    <dgm:txEffectClrLst/>
+  </dgm:styleLbl>
+  <dgm:styleLbl name="bgSibTrans2D1">
+    <dgm:fillClrLst meth="repeat">
+      <a:schemeClr val="accent1">
+        <a:tint val="60000"/>
+      </a:schemeClr>
+    </dgm:fillClrLst>
+    <dgm:linClrLst meth="repeat">
+      <a:schemeClr val="accent1">
+        <a:tint val="60000"/>
+      </a:schemeClr>
+    </dgm:linClrLst>
+    <dgm:effectClrLst/>
+    <dgm:txLinClrLst/>
+    <dgm:txFillClrLst/>
+    <dgm:txEffectClrLst/>
+  </dgm:styleLbl>
+  <dgm:styleLbl name="callout">
+    <dgm:fillClrLst meth="repeat">
+      <a:schemeClr val="accent1"/>
+    </dgm:fillClrLst>
+    <dgm:linClrLst meth="repeat">
+      <a:schemeClr val="accent1">
+        <a:tint val="50000"/>
+      </a:schemeClr>
+    </dgm:linClrLst>
+    <dgm:effectClrLst/>
+    <dgm:txLinClrLst/>
+    <dgm:txFillClrLst meth="repeat">
+      <a:schemeClr val="tx1"/>
+    </dgm:txFillClrLst>
+    <dgm:txEffectClrLst/>
+  </dgm:styleLbl>
+  <dgm:styleLbl name="conFgAcc1">
+    <dgm:fillClrLst meth="repeat">
+      <a:schemeClr val="lt1">
+        <a:alpha val="90000"/>
+      </a:schemeClr>
+    </dgm:fillClrLst>
+    <dgm:linClrLst meth="repeat">
+      <a:schemeClr val="accent1"/>
+    </dgm:linClrLst>
+    <dgm:effectClrLst/>
+    <dgm:txLinClrLst/>
+    <dgm:txFillClrLst meth="repeat">
+      <a:schemeClr val="dk1"/>
+    </dgm:txFillClrLst>
+    <dgm:txEffectClrLst/>
+  </dgm:styleLbl>
+  <dgm:styleLbl name="dkBgShp">
+    <dgm:fillClrLst meth="repeat">
+      <a:schemeClr val="accent1">
+        <a:shade val="80000"/>
+      </a:schemeClr>
+    </dgm:fillClrLst>
+    <dgm:linClrLst meth="repeat">
+      <a:schemeClr val="accent1"/>
+    </dgm:linClrLst>
+    <dgm:effectClrLst/>
+    <dgm:txLinClrLst/>
+    <dgm:txFillClrLst meth="repeat">
+      <a:schemeClr val="lt1"/>
+    </dgm:txFillClrLst>
+    <dgm:txEffectClrLst/>
+  </dgm:styleLbl>
+  <dgm:styleLbl name="fgAcc0">
+    <dgm:fillClrLst meth="repeat">
+      <a:schemeClr val="lt1">
+        <a:alpha val="90000"/>
+      </a:schemeClr>
+    </dgm:fillClrLst>
+    <dgm:linClrLst meth="repeat">
+      <a:schemeClr val="accent1"/>
+    </dgm:linClrLst>
+    <dgm:effectClrLst/>
+    <dgm:txLinClrLst/>
+    <dgm:txFillClrLst meth="repeat">
+      <a:schemeClr val="dk1"/>
+    </dgm:txFillClrLst>
+    <dgm:txEffectClrLst/>
+  </dgm:styleLbl>
+  <dgm:styleLbl name="fgAcc1">
+    <dgm:fillClrLst meth="repeat">
+      <a:schemeClr val="lt1">
+        <a:alpha val="90000"/>
+      </a:schemeClr>
+    </dgm:fillClrLst>
+    <dgm:linClrLst meth="repeat">
+      <a:schemeClr val="accent1"/>
+    </dgm:linClrLst>
+    <dgm:effectClrLst/>
+    <dgm:txLinClrLst/>
+    <dgm:txFillClrLst meth="repeat">
+      <a:schemeClr val="dk1"/>
+    </dgm:txFillClrLst>
+    <dgm:txEffectClrLst/>
+  </dgm:styleLbl>
+  <dgm:styleLbl name="fgAcc2">
+    <dgm:fillClrLst meth="repeat">
+      <a:schemeClr val="lt1">
+        <a:alpha val="90000"/>
+      </a:schemeClr>
+    </dgm:fillClrLst>
+    <dgm:linClrLst meth="repeat">
+      <a:schemeClr val="accent1"/>
+    </dgm:linClrLst>
+    <dgm:effectClrLst/>
+    <dgm:txLinClrLst/>
+    <dgm:txFillClrLst meth="repeat">
+      <a:schemeClr val="dk1"/>
+    </dgm:txFillClrLst>
+    <dgm:txEffectClrLst/>
+  </dgm:styleLbl>
+  <dgm:styleLbl name="fgAcc3">
+    <dgm:fillClrLst meth="repeat">
+      <a:schemeClr val="lt1">
+        <a:alpha val="90000"/>
+      </a:schemeClr>
+    </dgm:fillClrLst>
+    <dgm:linClrLst meth="repeat">
+      <a:schemeClr val="accent1"/>
+    </dgm:linClrLst>
+    <dgm:effectClrLst/>
+    <dgm:txLinClrLst/>
+    <dgm:txFillClrLst meth="repeat">
+      <a:schemeClr val="dk1"/>
+    </dgm:txFillClrLst>
+    <dgm:txEffectClrLst/>
+  </dgm:styleLbl>
+  <dgm:styleLbl name="fgAcc4">
+    <dgm:fillClrLst meth="repeat">
+      <a:schemeClr val="lt1">
+        <a:alpha val="90000"/>
+      </a:schemeClr>
+    </dgm:fillClrLst>
+    <dgm:linClrLst meth="repeat">
+      <a:schemeClr val="accent1"/>
+    </dgm:linClrLst>
+    <dgm:effectClrLst/>
+    <dgm:txLinClrLst/>
+    <dgm:txFillClrLst meth="repeat">
+      <a:schemeClr val="dk1"/>
+    </dgm:txFillClrLst>
+    <dgm:txEffectClrLst/>
+  </dgm:styleLbl>
+  <dgm:styleLbl name="fgAccFollowNode1">
+    <dgm:fillClrLst meth="repeat">
+      <a:schemeClr val="accent1">
+        <a:alpha val="90000"/>
+        <a:tint val="40000"/>
+      </a:schemeClr>
+    </dgm:fillClrLst>
+    <dgm:linClrLst meth="repeat">
+      <a:schemeClr val="accent1">
+        <a:alpha val="90000"/>
+        <a:tint val="40000"/>
+      </a:schemeClr>
+    </dgm:linClrLst>
+    <dgm:effectClrLst/>
+    <dgm:txLinClrLst/>
+    <dgm:txFillClrLst meth="repeat">
+      <a:schemeClr val="dk1"/>
+    </dgm:txFillClrLst>
+    <dgm:txEffectClrLst/>
+  </dgm:styleLbl>
+  <dgm:styleLbl name="fgImgPlace1">
+    <dgm:fillClrLst meth="repeat">
+      <a:schemeClr val="accent1">
+        <a:tint val="50000"/>
+      </a:schemeClr>
+    </dgm:fillClrLst>
+    <dgm:linClrLst meth="repeat">
+      <a:schemeClr val="lt1"/>
+    </dgm:linClrLst>
+    <dgm:effectClrLst/>
+    <dgm:txLinClrLst/>
+    <dgm:txFillClrLst meth="repeat">
+      <a:schemeClr val="lt1"/>
+    </dgm:txFillClrLst>
+    <dgm:txEffectClrLst/>
+  </dgm:styleLbl>
+  <dgm:styleLbl name="fgShp">
+    <dgm:fillClrLst meth="repeat">
+      <a:schemeClr val="accent1">
+        <a:tint val="60000"/>
+      </a:schemeClr>
+    </dgm:fillClrLst>
+    <dgm:linClrLst meth="repeat">
+      <a:schemeClr val="lt1"/>
+    </dgm:linClrLst>
+    <dgm:effectClrLst/>
+    <dgm:txLinClrLst/>
+    <dgm:txFillClrLst meth="repeat">
+      <a:schemeClr val="dk1"/>
+    </dgm:txFillClrLst>
+    <dgm:txEffectClrLst/>
+  </dgm:styleLbl>
+  <dgm:styleLbl name="fgSibTrans2D1">
+    <dgm:fillClrLst meth="repeat">
+      <a:schemeClr val="accent1">
+        <a:tint val="60000"/>
+      </a:schemeClr>
+    </dgm:fillClrLst>
+    <dgm:linClrLst meth="repeat">
+      <a:schemeClr val="accent1">
+        <a:tint val="60000"/>
+      </a:schemeClr>
+    </dgm:linClrLst>
+    <dgm:effectClrLst/>
+    <dgm:txLinClrLst/>
+    <dgm:txFillClrLst/>
+    <dgm:txEffectClrLst/>
+  </dgm:styleLbl>
+  <dgm:styleLbl name="lnNode1">
+    <dgm:fillClrLst meth="repeat">
+      <a:schemeClr val="accent1"/>
+    </dgm:fillClrLst>
+    <dgm:linClrLst meth="repeat">
+      <a:schemeClr val="lt1"/>
+    </dgm:linClrLst>
+    <dgm:effectClrLst/>
+    <dgm:txLinClrLst/>
+    <dgm:txFillClrLst/>
+    <dgm:txEffectClrLst/>
+  </dgm:styleLbl>
+  <dgm:styleLbl name="node0">
+    <dgm:fillClrLst meth="repeat">
+      <a:schemeClr val="accent1"/>
+    </dgm:fillClrLst>
+    <dgm:linClrLst meth="repeat">
+      <a:schemeClr val="lt1"/>
+    </dgm:linClrLst>
+    <dgm:effectClrLst/>
+    <dgm:txLinClrLst/>
+    <dgm:txFillClrLst/>
+    <dgm:txEffectClrLst/>
+  </dgm:styleLbl>
+  <dgm:styleLbl name="node1">
+    <dgm:fillClrLst meth="repeat">
+      <a:schemeClr val="accent1"/>
+    </dgm:fillClrLst>
+    <dgm:linClrLst meth="repeat">
+      <a:schemeClr val="lt1"/>
+    </dgm:linClrLst>
+    <dgm:effectClrLst/>
+    <dgm:txLinClrLst/>
+    <dgm:txFillClrLst/>
+    <dgm:txEffectClrLst/>
+  </dgm:styleLbl>
+  <dgm:styleLbl name="node2">
+    <dgm:fillClrLst meth="repeat">
+      <a:schemeClr val="accent1"/>
+    </dgm:fillClrLst>
+    <dgm:linClrLst meth="repeat">
+      <a:schemeClr val="lt1"/>
+    </dgm:linClrLst>
+    <dgm:effectClrLst/>
+    <dgm:txLinClrLst/>
+    <dgm:txFillClrLst/>
+    <dgm:txEffectClrLst/>
+  </dgm:styleLbl>
+  <dgm:styleLbl name="node3">
+    <dgm:fillClrLst meth="repeat">
+      <a:schemeClr val="accent1"/>
+    </dgm:fillClrLst>
+    <dgm:linClrLst meth="repeat">
+      <a:schemeClr val="lt1"/>
+    </dgm:linClrLst>
+    <dgm:effectClrLst/>
+    <dgm:txLinClrLst/>
+    <dgm:txFillClrLst/>
+    <dgm:txEffectClrLst/>
+  </dgm:styleLbl>
+  <dgm:styleLbl name="node4">
+    <dgm:fillClrLst meth="repeat">
+      <a:schemeClr val="accent1"/>
+    </dgm:fillClrLst>
+    <dgm:linClrLst meth="repeat">
+      <a:schemeClr val="lt1"/>
+    </dgm:linClrLst>
+    <dgm:effectClrLst/>
+    <dgm:txLinClrLst/>
+    <dgm:txFillClrLst/>
+    <dgm:txEffectClrLst/>
+  </dgm:styleLbl>
+  <dgm:styleLbl name="parChTrans1D1">
+    <dgm:fillClrLst meth="repeat">
+      <a:schemeClr val="accent1"/>
+    </dgm:fillClrLst>
+    <dgm:linClrLst meth="repeat">
+      <a:schemeClr val="accent1">
+        <a:shade val="60000"/>
+      </a:schemeClr>
+    </dgm:linClrLst>
+    <dgm:effectClrLst/>
+    <dgm:txLinClrLst/>
+    <dgm:txFillClrLst meth="repeat">
+      <a:schemeClr val="tx1"/>
+    </dgm:txFillClrLst>
+    <dgm:txEffectClrLst/>
+  </dgm:styleLbl>
+  <dgm:styleLbl name="parChTrans1D2">
+    <dgm:fillClrLst meth="repeat">
+      <a:schemeClr val="accent1"/>
+    </dgm:fillClrLst>
+    <dgm:linClrLst meth="repeat">
+      <a:schemeClr val="accent1">
+        <a:shade val="60000"/>
+      </a:schemeClr>
+    </dgm:linClrLst>
+    <dgm:effectClrLst/>
+    <dgm:txLinClrLst/>
+    <dgm:txFillClrLst meth="repeat">
+      <a:schemeClr val="tx1"/>
+    </dgm:txFillClrLst>
+    <dgm:txEffectClrLst/>
+  </dgm:styleLbl>
+  <dgm:styleLbl name="parChTrans1D3">
+    <dgm:fillClrLst meth="repeat">
+      <a:schemeClr val="accent1"/>
+    </dgm:fillClrLst>
+    <dgm:linClrLst meth="repeat">
+      <a:schemeClr val="accent1">
+        <a:shade val="80000"/>
+      </a:schemeClr>
+    </dgm:linClrLst>
+    <dgm:effectClrLst/>
+    <dgm:txLinClrLst/>
+    <dgm:txFillClrLst meth="repeat">
+      <a:schemeClr val="tx1"/>
+    </dgm:txFillClrLst>
+    <dgm:txEffectClrLst/>
+  </dgm:styleLbl>
+  <dgm:styleLbl name="parChTrans1D4">
+    <dgm:fillClrLst meth="repeat">
+      <a:schemeClr val="accent1"/>
+    </dgm:fillClrLst>
+    <dgm:linClrLst meth="repeat">
+      <a:schemeClr val="accent1">
+        <a:shade val="80000"/>
+      </a:schemeClr>
+    </dgm:linClrLst>
+    <dgm:effectClrLst/>
+    <dgm:txLinClrLst/>
+    <dgm:txFillClrLst meth="repeat">
+      <a:schemeClr val="tx1"/>
+    </dgm:txFillClrLst>
+    <dgm:txEffectClrLst/>
+  </dgm:styleLbl>
+  <dgm:styleLbl name="parChTrans2D1">
+    <dgm:fillClrLst meth="repeat">
+      <a:schemeClr val="accent1">
+        <a:tint val="60000"/>
+      </a:schemeClr>
+    </dgm:fillClrLst>
+    <dgm:linClrLst meth="repeat">
+      <a:schemeClr val="accent1">
+        <a:tint val="60000"/>
+      </a:schemeClr>
+    </dgm:linClrLst>
+    <dgm:effectClrLst/>
+    <dgm:txLinClrLst/>
+    <dgm:txFillClrLst meth="repeat">
+      <a:schemeClr val="lt1"/>
+    </dgm:txFillClrLst>
+    <dgm:txEffectClrLst/>
+  </dgm:styleLbl>
+  <dgm:styleLbl name="parChTrans2D2">
+    <dgm:fillClrLst meth="repeat">
+      <a:schemeClr val="accent1"/>
+    </dgm:fillClrLst>
+    <dgm:linClrLst meth="repeat">
+      <a:schemeClr val="accent1"/>
+    </dgm:linClrLst>
+    <dgm:effectClrLst/>
+    <dgm:txLinClrLst/>
+    <dgm:txFillClrLst meth="repeat">
+      <a:schemeClr val="lt1"/>
+    </dgm:txFillClrLst>
+    <dgm:txEffectClrLst/>
+  </dgm:styleLbl>
+  <dgm:styleLbl name="parChTrans2D3">
+    <dgm:fillClrLst meth="repeat">
+      <a:schemeClr val="accent1"/>
+    </dgm:fillClrLst>
+    <dgm:linClrLst meth="repeat">
+      <a:schemeClr val="accent1"/>
+    </dgm:linClrLst>
+    <dgm:effectClrLst/>
+    <dgm:txLinClrLst/>
+    <dgm:txFillClrLst meth="repeat">
+      <a:schemeClr val="lt1"/>
+    </dgm:txFillClrLst>
+    <dgm:txEffectClrLst/>
+  </dgm:styleLbl>
+  <dgm:styleLbl name="parChTrans2D4">
+    <dgm:fillClrLst meth="repeat">
+      <a:schemeClr val="accent1"/>
+    </dgm:fillClrLst>
+    <dgm:linClrLst meth="repeat">
+      <a:schemeClr val="accent1"/>
+    </dgm:linClrLst>
+    <dgm:effectClrLst/>
+    <dgm:txLinClrLst/>
+    <dgm:txFillClrLst meth="repeat">
+      <a:schemeClr val="lt1"/>
+    </dgm:txFillClrLst>
+    <dgm:txEffectClrLst/>
+  </dgm:styleLbl>
+  <dgm:styleLbl name="revTx">
+    <dgm:fillClrLst meth="repeat">
+      <a:schemeClr val="lt1">
+        <a:alpha val="0"/>
+      </a:schemeClr>
+    </dgm:fillClrLst>
+    <dgm:linClrLst meth="repeat">
+      <a:schemeClr val="dk1">
+        <a:alpha val="0"/>
+      </a:schemeClr>
+    </dgm:linClrLst>
+    <dgm:effectClrLst/>
+    <dgm:txLinClrLst/>
+    <dgm:txFillClrLst meth="repeat">
+      <a:schemeClr val="tx1"/>
+    </dgm:txFillClrLst>
+    <dgm:txEffectClrLst/>
+  </dgm:styleLbl>
+  <dgm:styleLbl name="sibTrans1D1">
+    <dgm:fillClrLst meth="repeat">
+      <a:schemeClr val="accent1"/>
+    </dgm:fillClrLst>
+    <dgm:linClrLst meth="repeat">
+      <a:schemeClr val="accent1"/>
+    </dgm:linClrLst>
+    <dgm:effectClrLst/>
+    <dgm:txLinClrLst/>
+    <dgm:txFillClrLst meth="repeat">
+      <a:schemeClr val="tx1"/>
+    </dgm:txFillClrLst>
+    <dgm:txEffectClrLst/>
+  </dgm:styleLbl>
+  <dgm:styleLbl name="sibTrans2D1">
+    <dgm:fillClrLst meth="repeat">
+      <a:schemeClr val="accent1">
+        <a:tint val="60000"/>
+      </a:schemeClr>
+    </dgm:fillClrLst>
+    <dgm:linClrLst meth="repeat">
+      <a:schemeClr val="accent1">
+        <a:tint val="60000"/>
+      </a:schemeClr>
+    </dgm:linClrLst>
+    <dgm:effectClrLst/>
+    <dgm:txLinClrLst/>
+    <dgm:txFillClrLst/>
+    <dgm:txEffectClrLst/>
+  </dgm:styleLbl>
+  <dgm:styleLbl name="solidAlignAcc1">
+    <dgm:fillClrLst meth="repeat">
+      <a:schemeClr val="lt1"/>
+    </dgm:fillClrLst>
+    <dgm:linClrLst meth="repeat">
+      <a:schemeClr val="accent1"/>
+    </dgm:linClrLst>
+    <dgm:effectClrLst/>
+    <dgm:txLinClrLst/>
+    <dgm:txFillClrLst meth="repeat">
+      <a:schemeClr val="dk1"/>
+    </dgm:txFillClrLst>
+    <dgm:txEffectClrLst/>
+  </dgm:styleLbl>
+  <dgm:styleLbl name="solidBgAcc1">
+    <dgm:fillClrLst meth="repeat">
+      <a:schemeClr val="lt1"/>
+    </dgm:fillClrLst>
+    <dgm:linClrLst meth="repeat">
+      <a:schemeClr val="accent1"/>
+    </dgm:linClrLst>
+    <dgm:effectClrLst/>
+    <dgm:txLinClrLst/>
+    <dgm:txFillClrLst meth="repeat">
+      <a:schemeClr val="dk1"/>
+    </dgm:txFillClrLst>
+    <dgm:txEffectClrLst/>
+  </dgm:styleLbl>
+  <dgm:styleLbl name="solidFgAcc1">
+    <dgm:fillClrLst meth="repeat">
+      <a:schemeClr val="lt1"/>
+    </dgm:fillClrLst>
+    <dgm:linClrLst meth="repeat">
+      <a:schemeClr val="accent1"/>
+    </dgm:linClrLst>
+    <dgm:effectClrLst/>
+    <dgm:txLinClrLst/>
+    <dgm:txFillClrLst meth="repeat">
+      <a:schemeClr val="dk1"/>
+    </dgm:txFillClrLst>
+    <dgm:txEffectClrLst/>
+  </dgm:styleLbl>
+  <dgm:styleLbl name="trAlignAcc1">
+    <dgm:fillClrLst meth="repeat">
+      <a:schemeClr val="lt1">
+        <a:alpha val="40000"/>
+      </a:schemeClr>
+    </dgm:fillClrLst>
+    <dgm:linClrLst meth="repeat">
+      <a:schemeClr val="accent1"/>
+    </dgm:linClrLst>
+    <dgm:effectClrLst/>
+    <dgm:txLinClrLst/>
+    <dgm:txFillClrLst meth="repeat">
+      <a:schemeClr val="dk1"/>
+    </dgm:txFillClrLst>
+    <dgm:txEffectClrLst/>
+  </dgm:styleLbl>
+  <dgm:styleLbl name="trBgShp">
+    <dgm:fillClrLst meth="repeat">
+      <a:schemeClr val="accent1">
+        <a:tint val="50000"/>
+        <a:alpha val="40000"/>
+      </a:schemeClr>
+    </dgm:fillClrLst>
+    <dgm:linClrLst meth="repeat">
+      <a:schemeClr val="accent1"/>
+    </dgm:linClrLst>
+    <dgm:effectClrLst/>
+    <dgm:txLinClrLst/>
+    <dgm:txFillClrLst meth="repeat">
+      <a:schemeClr val="lt1"/>
+    </dgm:txFillClrLst>
+    <dgm:txEffectClrLst/>
+  </dgm:styleLbl>
+  <dgm:styleLbl name="vennNode1">
+    <dgm:fillClrLst meth="repeat">
+      <a:schemeClr val="accent1">
+        <a:alpha val="50000"/>
+      </a:schemeClr>
+    </dgm:fillClrLst>
+    <dgm:linClrLst meth="repeat">
+      <a:schemeClr val="lt1"/>
+    </dgm:linClrLst>
+    <dgm:effectClrLst/>
+    <dgm:txLinClrLst/>
+    <dgm:txFillClrLst/>
+    <dgm:txEffectClrLst/>
+  </dgm:styleLbl>
+</dgm:colorsDef>
+</file>
+
+<file path=ppt/diagrams/data1.xml><?xml version="1.0" encoding="utf-8"?>
+<dgm:dataModel xmlns:dgm="http://schemas.openxmlformats.org/drawingml/2006/diagram" xmlns:a="http://schemas.openxmlformats.org/drawingml/2006/main">
+  <dgm:ptLst>
+    <dgm:pt modelId="{D9DBEC0D-3228-4D94-B6A9-7DC29421F586}" type="doc">
+      <dgm:prSet loTypeId="process" loCatId="process" qsTypeId="urn:microsoft.com/office/officeart/2005/8/quickstyle/simple1" qsCatId="simple" csTypeId="urn:microsoft.com/office/officeart/2005/8/colors/accent1_2" csCatId="accent1" phldr="0"/>
+      <dgm:spPr/>
+    </dgm:pt>
+    <dgm:pt modelId="{5E14B514-13A8-41E1-AABB-D87B52F0F7A7}">
+      <dgm:prSet phldrT="[Text]" phldr="0" custT="0"/>
+      <dgm:spPr/>
+      <dgm:t>
+        <a:bodyPr vert="horz" wrap="square"/>
+        <a:p>
+          <a:pPr>
+            <a:lnSpc>
+              <a:spcPct val="100000"/>
+            </a:lnSpc>
+            <a:spcBef>
+              <a:spcPct val="0"/>
+            </a:spcBef>
+            <a:spcAft>
+              <a:spcPct val="35000"/>
+            </a:spcAft>
+          </a:pPr>
+          <a:r>
+            <a:rPr lang="en-US"/>
+            <a:t>First</a:t>
+          </a:r>
+          <a:endParaRPr lang="en-US"/>
+        </a:p>
+      </dgm:t>
+    </dgm:pt>
+    <dgm:pt modelId="{D5D91FC0-0661-4826-8DB4-BD3CA46365AD}" cxnId="{D7A8BD52-0683-4838-B004-042B48A0C1AA}" type="parTrans">
+      <dgm:prSet/>
+      <dgm:spPr/>
+    </dgm:pt>
+    <dgm:pt modelId="{352F5739-0E5F-4077-AB9E-377BD3FB7247}" cxnId="{D7A8BD52-0683-4838-B004-042B48A0C1AA}" type="sibTrans">
+      <dgm:prSet/>
+      <dgm:spPr/>
+    </dgm:pt>
+    <dgm:pt modelId="{37AA553D-5AF8-4B2D-8913-3825508AE9DC}">
+      <dgm:prSet phldrT="[Text]" phldr="0" custT="0"/>
+      <dgm:spPr/>
+      <dgm:t>
+        <a:bodyPr vert="horz" wrap="square"/>
+        <a:p>
+          <a:pPr>
+            <a:lnSpc>
+              <a:spcPct val="100000"/>
+            </a:lnSpc>
+            <a:spcBef>
+              <a:spcPct val="0"/>
+            </a:spcBef>
+            <a:spcAft>
+              <a:spcPct val="35000"/>
+            </a:spcAft>
+          </a:pPr>
+          <a:r>
+            <a:rPr lang="en-US"/>
+            <a:t>Second</a:t>
+          </a:r>
+          <a:endParaRPr lang="en-US"/>
+        </a:p>
+      </dgm:t>
+    </dgm:pt>
+    <dgm:pt modelId="{BAA72A6A-3294-49F8-B4A2-7E9277C9B889}" cxnId="{0006EB61-123E-475F-9C90-B15735E89F53}" type="parTrans">
+      <dgm:prSet/>
+      <dgm:spPr/>
+    </dgm:pt>
+    <dgm:pt modelId="{68432C35-8F5A-451F-B499-B48A6EBEBD6C}" cxnId="{0006EB61-123E-475F-9C90-B15735E89F53}" type="sibTrans">
+      <dgm:prSet/>
+      <dgm:spPr/>
+    </dgm:pt>
+    <dgm:pt modelId="{F5C0C213-BCEA-4C9C-AB32-A08FA3EBB066}">
+      <dgm:prSet phldrT="[Text]" phldr="0" custT="0"/>
+      <dgm:spPr/>
+      <dgm:t>
+        <a:bodyPr vert="horz" wrap="square"/>
+        <a:p>
+          <a:pPr>
+            <a:lnSpc>
+              <a:spcPct val="100000"/>
+            </a:lnSpc>
+            <a:spcBef>
+              <a:spcPct val="0"/>
+            </a:spcBef>
+            <a:spcAft>
+              <a:spcPct val="35000"/>
+            </a:spcAft>
+          </a:pPr>
+          <a:r>
+            <a:rPr lang="en-US"/>
+            <a:t>Third</a:t>
+          </a:r>
+          <a:r>
+            <a:rPr lang="en-US"/>
+            <a:t/>
+          </a:r>
+          <a:endParaRPr lang="en-US"/>
+        </a:p>
+      </dgm:t>
+    </dgm:pt>
+    <dgm:pt modelId="{6E4AC384-5EE6-4911-B9B1-DA79B719BDC0}" cxnId="{312E95FA-B4DD-47E4-BEA6-C2A93B279879}" type="parTrans">
+      <dgm:prSet/>
+      <dgm:spPr/>
+    </dgm:pt>
+    <dgm:pt modelId="{1E5D234C-F179-4E4F-BAE9-B81F3FCC8813}" cxnId="{312E95FA-B4DD-47E4-BEA6-C2A93B279879}" type="sibTrans">
+      <dgm:prSet/>
+      <dgm:spPr/>
+    </dgm:pt>
+    <dgm:pt modelId="{9A3FCB0A-4CCC-43D3-94CF-93AE13B1B8CC}" type="pres">
+      <dgm:prSet presAssocID="{D9DBEC0D-3228-4D94-B6A9-7DC29421F586}" presName="Name0" presStyleCnt="0">
+        <dgm:presLayoutVars>
+          <dgm:dir/>
+          <dgm:animLvl val="lvl"/>
+          <dgm:resizeHandles val="exact"/>
+        </dgm:presLayoutVars>
+      </dgm:prSet>
+      <dgm:spPr/>
+    </dgm:pt>
+    <dgm:pt modelId="{70D47F91-7FB2-4CD8-9A24-A43456964789}" type="pres">
+      <dgm:prSet presAssocID="{D9DBEC0D-3228-4D94-B6A9-7DC29421F586}" presName="dummy" presStyleCnt="0"/>
+      <dgm:spPr/>
+    </dgm:pt>
+    <dgm:pt modelId="{AEB5B7CB-ACC5-4FD0-A6CB-9E4450DCC121}" type="pres">
+      <dgm:prSet presAssocID="{D9DBEC0D-3228-4D94-B6A9-7DC29421F586}" presName="linH" presStyleCnt="0"/>
+      <dgm:spPr/>
+    </dgm:pt>
+    <dgm:pt modelId="{6079EE43-7223-4044-88AF-4F6AC0469A7D}" type="pres">
+      <dgm:prSet presAssocID="{D9DBEC0D-3228-4D94-B6A9-7DC29421F586}" presName="padding1" presStyleCnt="0"/>
+      <dgm:spPr/>
+    </dgm:pt>
+    <dgm:pt modelId="{B84BDF4C-85B7-468C-A98E-AC98CA661420}" type="pres">
+      <dgm:prSet presAssocID="{5E14B514-13A8-41E1-AABB-D87B52F0F7A7}" presName="linV" presStyleCnt="0"/>
+      <dgm:spPr/>
+    </dgm:pt>
+    <dgm:pt modelId="{98D3B755-23E2-43D3-802D-80CC92377972}" type="pres">
+      <dgm:prSet presAssocID="{5E14B514-13A8-41E1-AABB-D87B52F0F7A7}" presName="spVertical1" presStyleCnt="0"/>
+      <dgm:spPr/>
+    </dgm:pt>
+    <dgm:pt modelId="{FE8AC867-2966-4F3E-8B7C-683A8FC5320B}" type="pres">
+      <dgm:prSet presAssocID="{5E14B514-13A8-41E1-AABB-D87B52F0F7A7}" presName="parTx" presStyleLbl="revTx" presStyleIdx="0" presStyleCnt="3">
+        <dgm:presLayoutVars>
+          <dgm:chMax val="0"/>
+          <dgm:chPref val="0"/>
+          <dgm:bulletEnabled val="1"/>
+        </dgm:presLayoutVars>
+      </dgm:prSet>
+      <dgm:spPr/>
+    </dgm:pt>
+    <dgm:pt modelId="{3728B0B2-5243-4115-901E-68C845CD4A6B}" type="pres">
+      <dgm:prSet presAssocID="{5E14B514-13A8-41E1-AABB-D87B52F0F7A7}" presName="spVertical2" presStyleCnt="0"/>
+      <dgm:spPr/>
+    </dgm:pt>
+    <dgm:pt modelId="{28A411E3-BCF9-44E5-98F4-EE3D69B645B8}" type="pres">
+      <dgm:prSet presAssocID="{5E14B514-13A8-41E1-AABB-D87B52F0F7A7}" presName="spVertical3" presStyleCnt="0"/>
+      <dgm:spPr/>
+    </dgm:pt>
+    <dgm:pt modelId="{0DAD0539-32C2-411D-8DA6-7B3BDBFDA507}" type="pres">
+      <dgm:prSet presAssocID="{352F5739-0E5F-4077-AB9E-377BD3FB7247}" presName="space" presStyleCnt="0"/>
+      <dgm:spPr/>
+    </dgm:pt>
+    <dgm:pt modelId="{A14C14B9-9E54-43F6-BF13-BCF8B1368C72}" type="pres">
+      <dgm:prSet presAssocID="{37AA553D-5AF8-4B2D-8913-3825508AE9DC}" presName="linV" presStyleCnt="0"/>
+      <dgm:spPr/>
+    </dgm:pt>
+    <dgm:pt modelId="{75F67EC8-4D5D-44CE-ADD7-D127BD9B78F6}" type="pres">
+      <dgm:prSet presAssocID="{37AA553D-5AF8-4B2D-8913-3825508AE9DC}" presName="spVertical1" presStyleCnt="0"/>
+      <dgm:spPr/>
+    </dgm:pt>
+    <dgm:pt modelId="{8BE6CCA6-9959-410D-A7A8-E175C3CE561D}" type="pres">
+      <dgm:prSet presAssocID="{37AA553D-5AF8-4B2D-8913-3825508AE9DC}" presName="parTx" presStyleLbl="revTx" presStyleIdx="1" presStyleCnt="3">
+        <dgm:presLayoutVars>
+          <dgm:chMax val="0"/>
+          <dgm:chPref val="0"/>
+          <dgm:bulletEnabled val="1"/>
+        </dgm:presLayoutVars>
+      </dgm:prSet>
+      <dgm:spPr/>
+    </dgm:pt>
+    <dgm:pt modelId="{CBA31392-5C07-453D-80C7-BD4B54F5FAD3}" type="pres">
+      <dgm:prSet presAssocID="{37AA553D-5AF8-4B2D-8913-3825508AE9DC}" presName="spVertical2" presStyleCnt="0"/>
+      <dgm:spPr/>
+    </dgm:pt>
+    <dgm:pt modelId="{B1031554-6883-4A45-9EC9-4F5A60D279BF}" type="pres">
+      <dgm:prSet presAssocID="{37AA553D-5AF8-4B2D-8913-3825508AE9DC}" presName="spVertical3" presStyleCnt="0"/>
+      <dgm:spPr/>
+    </dgm:pt>
+    <dgm:pt modelId="{65A97C50-A67C-413B-80BB-C8546F33BA22}" type="pres">
+      <dgm:prSet presAssocID="{68432C35-8F5A-451F-B499-B48A6EBEBD6C}" presName="space" presStyleCnt="0"/>
+      <dgm:spPr/>
+    </dgm:pt>
+    <dgm:pt modelId="{AA72A2E9-EB5B-405D-BF18-F013FE88746B}" type="pres">
+      <dgm:prSet presAssocID="{F5C0C213-BCEA-4C9C-AB32-A08FA3EBB066}" presName="linV" presStyleCnt="0"/>
+      <dgm:spPr/>
+    </dgm:pt>
+    <dgm:pt modelId="{6EEB2E6A-ECA0-452F-8767-071AF00A9B45}" type="pres">
+      <dgm:prSet presAssocID="{F5C0C213-BCEA-4C9C-AB32-A08FA3EBB066}" presName="spVertical1" presStyleCnt="0"/>
+      <dgm:spPr/>
+    </dgm:pt>
+    <dgm:pt modelId="{B08FC8A3-E9C6-4C4D-BEB3-1402053317A0}" type="pres">
+      <dgm:prSet presAssocID="{F5C0C213-BCEA-4C9C-AB32-A08FA3EBB066}" presName="parTx" presStyleLbl="revTx" presStyleIdx="2" presStyleCnt="3">
+        <dgm:presLayoutVars>
+          <dgm:chMax val="0"/>
+          <dgm:chPref val="0"/>
+          <dgm:bulletEnabled val="1"/>
+        </dgm:presLayoutVars>
+      </dgm:prSet>
+      <dgm:spPr/>
+    </dgm:pt>
+    <dgm:pt modelId="{ACBB3A7B-444E-47E1-A619-CE9CEF6A2F00}" type="pres">
+      <dgm:prSet presAssocID="{F5C0C213-BCEA-4C9C-AB32-A08FA3EBB066}" presName="spVertical2" presStyleCnt="0"/>
+      <dgm:spPr/>
+    </dgm:pt>
+    <dgm:pt modelId="{6E2D2FBC-93D9-43A5-8A6A-386D687C0A6E}" type="pres">
+      <dgm:prSet presAssocID="{F5C0C213-BCEA-4C9C-AB32-A08FA3EBB066}" presName="spVertical3" presStyleCnt="0"/>
+      <dgm:spPr/>
+    </dgm:pt>
+    <dgm:pt modelId="{C6E6D5DA-2142-4311-B4A3-8853B3D395CE}" type="pres">
+      <dgm:prSet presAssocID="{D9DBEC0D-3228-4D94-B6A9-7DC29421F586}" presName="padding2" presStyleCnt="0"/>
+      <dgm:spPr/>
+    </dgm:pt>
+    <dgm:pt modelId="{A0B6043F-1DE0-4553-9FFF-75829C586A51}" type="pres">
+      <dgm:prSet presAssocID="{D9DBEC0D-3228-4D94-B6A9-7DC29421F586}" presName="negArrow" presStyleCnt="0"/>
+      <dgm:spPr/>
+    </dgm:pt>
+    <dgm:pt modelId="{BE4AC2E3-1CE5-4186-AE56-712663C7BBBF}" type="pres">
+      <dgm:prSet presAssocID="{D9DBEC0D-3228-4D94-B6A9-7DC29421F586}" presName="backgroundArrow" presStyleLbl="node1" presStyleIdx="0" presStyleCnt="1"/>
+      <dgm:spPr/>
+    </dgm:pt>
+  </dgm:ptLst>
+  <dgm:cxnLst>
+    <dgm:cxn modelId="{D7A8BD52-0683-4838-B004-042B48A0C1AA}" srcId="{D9DBEC0D-3228-4D94-B6A9-7DC29421F586}" destId="{5E14B514-13A8-41E1-AABB-D87B52F0F7A7}" srcOrd="0" destOrd="0" parTransId="{D5D91FC0-0661-4826-8DB4-BD3CA46365AD}" sibTransId="{352F5739-0E5F-4077-AB9E-377BD3FB7247}"/>
+    <dgm:cxn modelId="{0006EB61-123E-475F-9C90-B15735E89F53}" srcId="{D9DBEC0D-3228-4D94-B6A9-7DC29421F586}" destId="{37AA553D-5AF8-4B2D-8913-3825508AE9DC}" srcOrd="1" destOrd="0" parTransId="{BAA72A6A-3294-49F8-B4A2-7E9277C9B889}" sibTransId="{68432C35-8F5A-451F-B499-B48A6EBEBD6C}"/>
+    <dgm:cxn modelId="{312E95FA-B4DD-47E4-BEA6-C2A93B279879}" srcId="{D9DBEC0D-3228-4D94-B6A9-7DC29421F586}" destId="{F5C0C213-BCEA-4C9C-AB32-A08FA3EBB066}" srcOrd="2" destOrd="0" parTransId="{6E4AC384-5EE6-4911-B9B1-DA79B719BDC0}" sibTransId="{1E5D234C-F179-4E4F-BAE9-B81F3FCC8813}"/>
+    <dgm:cxn modelId="{91A901A5-4AAC-4A65-A549-9A081C54880A}" type="presOf" srcId="{D9DBEC0D-3228-4D94-B6A9-7DC29421F586}" destId="{9A3FCB0A-4CCC-43D3-94CF-93AE13B1B8CC}" srcOrd="0" destOrd="0" presId="urn:microsoft.com/office/officeart/2005/8/layout/hProcess3"/>
+    <dgm:cxn modelId="{B529829C-06EA-4895-A36F-FC6C5E735FBC}" type="presParOf" srcId="{9A3FCB0A-4CCC-43D3-94CF-93AE13B1B8CC}" destId="{70D47F91-7FB2-4CD8-9A24-A43456964789}" srcOrd="0" destOrd="0" presId="urn:microsoft.com/office/officeart/2005/8/layout/hProcess3"/>
+    <dgm:cxn modelId="{8818053F-3035-4F6E-8BE4-CDF8EC26A1D0}" type="presParOf" srcId="{9A3FCB0A-4CCC-43D3-94CF-93AE13B1B8CC}" destId="{AEB5B7CB-ACC5-4FD0-A6CB-9E4450DCC121}" srcOrd="1" destOrd="0" presId="urn:microsoft.com/office/officeart/2005/8/layout/hProcess3"/>
+    <dgm:cxn modelId="{333DD962-C505-498B-BF77-03F015B9ACCE}" type="presParOf" srcId="{AEB5B7CB-ACC5-4FD0-A6CB-9E4450DCC121}" destId="{6079EE43-7223-4044-88AF-4F6AC0469A7D}" srcOrd="0" destOrd="1" presId="urn:microsoft.com/office/officeart/2005/8/layout/hProcess3"/>
+    <dgm:cxn modelId="{CF8F12AB-13FE-4139-A869-1A2ECBC0B8EC}" type="presParOf" srcId="{AEB5B7CB-ACC5-4FD0-A6CB-9E4450DCC121}" destId="{B84BDF4C-85B7-468C-A98E-AC98CA661420}" srcOrd="1" destOrd="1" presId="urn:microsoft.com/office/officeart/2005/8/layout/hProcess3"/>
+    <dgm:cxn modelId="{E4971BC9-67CC-4DE5-911C-F4F703F369C1}" type="presParOf" srcId="{B84BDF4C-85B7-468C-A98E-AC98CA661420}" destId="{98D3B755-23E2-43D3-802D-80CC92377972}" srcOrd="0" destOrd="1" presId="urn:microsoft.com/office/officeart/2005/8/layout/hProcess3"/>
+    <dgm:cxn modelId="{58BC0C42-7E3F-4E86-9ABE-CBF5A8432112}" type="presParOf" srcId="{B84BDF4C-85B7-468C-A98E-AC98CA661420}" destId="{FE8AC867-2966-4F3E-8B7C-683A8FC5320B}" srcOrd="1" destOrd="1" presId="urn:microsoft.com/office/officeart/2005/8/layout/hProcess3"/>
+    <dgm:cxn modelId="{5E692C91-8820-4BB6-B5C7-0ED1FBC7167F}" type="presOf" srcId="{5E14B514-13A8-41E1-AABB-D87B52F0F7A7}" destId="{FE8AC867-2966-4F3E-8B7C-683A8FC5320B}" srcOrd="0" destOrd="0" presId="urn:microsoft.com/office/officeart/2005/8/layout/hProcess3"/>
+    <dgm:cxn modelId="{218E901F-2103-4E1F-9086-46937EB85826}" type="presParOf" srcId="{B84BDF4C-85B7-468C-A98E-AC98CA661420}" destId="{3728B0B2-5243-4115-901E-68C845CD4A6B}" srcOrd="2" destOrd="1" presId="urn:microsoft.com/office/officeart/2005/8/layout/hProcess3"/>
+    <dgm:cxn modelId="{C34B5AF2-A6F0-4DEF-92ED-5C976AFD2F23}" type="presParOf" srcId="{B84BDF4C-85B7-468C-A98E-AC98CA661420}" destId="{28A411E3-BCF9-44E5-98F4-EE3D69B645B8}" srcOrd="3" destOrd="1" presId="urn:microsoft.com/office/officeart/2005/8/layout/hProcess3"/>
+    <dgm:cxn modelId="{A2C632F5-92C2-4101-A171-D9F2890CFFE6}" type="presParOf" srcId="{AEB5B7CB-ACC5-4FD0-A6CB-9E4450DCC121}" destId="{0DAD0539-32C2-411D-8DA6-7B3BDBFDA507}" srcOrd="2" destOrd="1" presId="urn:microsoft.com/office/officeart/2005/8/layout/hProcess3"/>
+    <dgm:cxn modelId="{1E1B2D10-032D-4C85-AD59-AB936293D798}" type="presParOf" srcId="{AEB5B7CB-ACC5-4FD0-A6CB-9E4450DCC121}" destId="{A14C14B9-9E54-43F6-BF13-BCF8B1368C72}" srcOrd="3" destOrd="1" presId="urn:microsoft.com/office/officeart/2005/8/layout/hProcess3"/>
+    <dgm:cxn modelId="{4C995209-9965-44AC-8591-4311A050380D}" type="presParOf" srcId="{A14C14B9-9E54-43F6-BF13-BCF8B1368C72}" destId="{75F67EC8-4D5D-44CE-ADD7-D127BD9B78F6}" srcOrd="0" destOrd="3" presId="urn:microsoft.com/office/officeart/2005/8/layout/hProcess3"/>
+    <dgm:cxn modelId="{CD922E4A-37FA-42E2-AC07-B048109AD9C9}" type="presParOf" srcId="{A14C14B9-9E54-43F6-BF13-BCF8B1368C72}" destId="{8BE6CCA6-9959-410D-A7A8-E175C3CE561D}" srcOrd="1" destOrd="3" presId="urn:microsoft.com/office/officeart/2005/8/layout/hProcess3"/>
+    <dgm:cxn modelId="{4D5A0A10-56BF-4904-8613-3CE6F871852C}" type="presOf" srcId="{37AA553D-5AF8-4B2D-8913-3825508AE9DC}" destId="{8BE6CCA6-9959-410D-A7A8-E175C3CE561D}" srcOrd="0" destOrd="0" presId="urn:microsoft.com/office/officeart/2005/8/layout/hProcess3"/>
+    <dgm:cxn modelId="{6EFA666E-35C6-43BD-A850-C9A72450750F}" type="presParOf" srcId="{A14C14B9-9E54-43F6-BF13-BCF8B1368C72}" destId="{CBA31392-5C07-453D-80C7-BD4B54F5FAD3}" srcOrd="2" destOrd="3" presId="urn:microsoft.com/office/officeart/2005/8/layout/hProcess3"/>
+    <dgm:cxn modelId="{E8736E88-2135-4384-9744-E836B306072F}" type="presParOf" srcId="{A14C14B9-9E54-43F6-BF13-BCF8B1368C72}" destId="{B1031554-6883-4A45-9EC9-4F5A60D279BF}" srcOrd="3" destOrd="3" presId="urn:microsoft.com/office/officeart/2005/8/layout/hProcess3"/>
+    <dgm:cxn modelId="{C1E3F954-7EA3-484A-88DE-F2BCC0B26E6D}" type="presParOf" srcId="{AEB5B7CB-ACC5-4FD0-A6CB-9E4450DCC121}" destId="{65A97C50-A67C-413B-80BB-C8546F33BA22}" srcOrd="4" destOrd="1" presId="urn:microsoft.com/office/officeart/2005/8/layout/hProcess3"/>
+    <dgm:cxn modelId="{0BEA7EB7-2B99-4DD8-9E24-E44D00FDBC8A}" type="presParOf" srcId="{AEB5B7CB-ACC5-4FD0-A6CB-9E4450DCC121}" destId="{AA72A2E9-EB5B-405D-BF18-F013FE88746B}" srcOrd="5" destOrd="1" presId="urn:microsoft.com/office/officeart/2005/8/layout/hProcess3"/>
+    <dgm:cxn modelId="{CFA91AD7-F571-4802-BFA3-A86B23CFD96F}" type="presParOf" srcId="{AA72A2E9-EB5B-405D-BF18-F013FE88746B}" destId="{6EEB2E6A-ECA0-452F-8767-071AF00A9B45}" srcOrd="0" destOrd="5" presId="urn:microsoft.com/office/officeart/2005/8/layout/hProcess3"/>
+    <dgm:cxn modelId="{7F937DEF-A61C-48DF-B1D5-EB6197ED7B7A}" type="presParOf" srcId="{AA72A2E9-EB5B-405D-BF18-F013FE88746B}" destId="{B08FC8A3-E9C6-4C4D-BEB3-1402053317A0}" srcOrd="1" destOrd="5" presId="urn:microsoft.com/office/officeart/2005/8/layout/hProcess3"/>
+    <dgm:cxn modelId="{1ECD5E40-9F64-410E-807C-45ED88001E5E}" type="presOf" srcId="{F5C0C213-BCEA-4C9C-AB32-A08FA3EBB066}" destId="{B08FC8A3-E9C6-4C4D-BEB3-1402053317A0}" srcOrd="0" destOrd="0" presId="urn:microsoft.com/office/officeart/2005/8/layout/hProcess3"/>
+    <dgm:cxn modelId="{64B5DD73-10A3-46E2-BB0C-807596718475}" type="presParOf" srcId="{AA72A2E9-EB5B-405D-BF18-F013FE88746B}" destId="{ACBB3A7B-444E-47E1-A619-CE9CEF6A2F00}" srcOrd="2" destOrd="5" presId="urn:microsoft.com/office/officeart/2005/8/layout/hProcess3"/>
+    <dgm:cxn modelId="{386FC61A-3027-4D8D-B90B-833D8058880F}" type="presParOf" srcId="{AA72A2E9-EB5B-405D-BF18-F013FE88746B}" destId="{6E2D2FBC-93D9-43A5-8A6A-386D687C0A6E}" srcOrd="3" destOrd="5" presId="urn:microsoft.com/office/officeart/2005/8/layout/hProcess3"/>
+    <dgm:cxn modelId="{04E76025-51D7-4017-98D7-6B6BAC91FC78}" type="presParOf" srcId="{AEB5B7CB-ACC5-4FD0-A6CB-9E4450DCC121}" destId="{C6E6D5DA-2142-4311-B4A3-8853B3D395CE}" srcOrd="6" destOrd="1" presId="urn:microsoft.com/office/officeart/2005/8/layout/hProcess3"/>
+    <dgm:cxn modelId="{7B251285-F41E-4F3E-AC10-0D814204EF47}" type="presParOf" srcId="{AEB5B7CB-ACC5-4FD0-A6CB-9E4450DCC121}" destId="{A0B6043F-1DE0-4553-9FFF-75829C586A51}" srcOrd="7" destOrd="1" presId="urn:microsoft.com/office/officeart/2005/8/layout/hProcess3"/>
+    <dgm:cxn modelId="{4D9E1390-3F42-4A1F-849C-1020B9A52674}" type="presParOf" srcId="{AEB5B7CB-ACC5-4FD0-A6CB-9E4450DCC121}" destId="{BE4AC2E3-1CE5-4186-AE56-712663C7BBBF}" srcOrd="8" destOrd="1" presId="urn:microsoft.com/office/officeart/2005/8/layout/hProcess3"/>
+  </dgm:cxnLst>
+  <dgm:bg/>
+  <dgm:whole/>
+  <dgm:extLst>
+    <a:ext uri="http://schemas.microsoft.com/office/drawing/2008/diagram">
+      <dsp:dataModelExt xmlns:dsp="http://schemas.microsoft.com/office/drawing/2008/diagram" relId="rId7" minVer="http://schemas.openxmlformats.org/drawingml/2006/diagram"/>
+    </a:ext>
+  </dgm:extLst>
+</dgm:dataModel>
+</file>
+
+<file path=ppt/diagrams/drawing1.xml><?xml version="1.0" encoding="utf-8"?>
+<dsp:drawing xmlns:dgm="http://schemas.openxmlformats.org/drawingml/2006/diagram" xmlns:dsp="http://schemas.microsoft.com/office/drawing/2008/diagram" xmlns:a="http://schemas.openxmlformats.org/drawingml/2006/main" xmlns:r="http://schemas.openxmlformats.org/officeDocument/2006/relationships">
+  <dsp:spTree>
+    <dsp:nvGrpSpPr>
+      <dsp:cNvPr id="2" name="Group 1"/>
+      <dsp:cNvGrpSpPr/>
+    </dsp:nvGrpSpPr>
+    <dsp:grpSpPr>
+      <a:xfrm>
+        <a:off x="0" y="0"/>
+        <a:ext cx="3150870" cy="1308100"/>
+        <a:chOff x="0" y="0"/>
+        <a:chExt cx="3150870" cy="1308100"/>
+      </a:xfrm>
+    </dsp:grpSpPr>
+    <dsp:sp modelId="{BE4AC2E3-1CE5-4186-AE56-712663C7BBBF}">
+      <dsp:nvSpPr>
+        <dsp:cNvPr id="6" name="Right Arrow 5"/>
+        <dsp:cNvSpPr/>
+      </dsp:nvSpPr>
+      <dsp:spPr bwMode="white">
+        <a:xfrm>
+          <a:off x="0" y="6050"/>
+          <a:ext cx="3150870" cy="1296000"/>
+        </a:xfrm>
+        <a:prstGeom prst="rightArrow">
+          <a:avLst/>
+        </a:prstGeom>
+      </dsp:spPr>
+      <dsp:style>
+        <a:lnRef idx="2">
+          <a:schemeClr val="lt1"/>
+        </a:lnRef>
+        <a:fillRef idx="1">
+          <a:schemeClr val="accent1"/>
+        </a:fillRef>
+        <a:effectRef idx="0">
+          <a:scrgbClr r="0" g="0" b="0"/>
+        </a:effectRef>
+        <a:fontRef idx="minor">
+          <a:schemeClr val="lt1"/>
+        </a:fontRef>
+      </dsp:style>
+      <dsp:txXfrm>
+        <a:off x="0" y="6050"/>
+        <a:ext cx="3150870" cy="1296000"/>
+      </dsp:txXfrm>
+    </dsp:sp>
+    <dsp:sp modelId="{FE8AC867-2966-4F3E-8B7C-683A8FC5320B}">
+      <dsp:nvSpPr>
+        <dsp:cNvPr id="3" name="Rectangle 2"/>
+        <dsp:cNvSpPr/>
+      </dsp:nvSpPr>
+      <dsp:spPr bwMode="white">
+        <a:xfrm>
+          <a:off x="252070" y="330050"/>
+          <a:ext cx="759916" cy="648000"/>
+        </a:xfrm>
+        <a:prstGeom prst="rect">
+          <a:avLst/>
+        </a:prstGeom>
+      </dsp:spPr>
+      <dsp:style>
+        <a:lnRef idx="0">
+          <a:schemeClr val="dk1">
+            <a:alpha val="0"/>
+          </a:schemeClr>
+        </a:lnRef>
+        <a:fillRef idx="0">
+          <a:schemeClr val="lt1">
+            <a:alpha val="0"/>
+          </a:schemeClr>
+        </a:fillRef>
+        <a:effectRef idx="0">
+          <a:scrgbClr r="0" g="0" b="0"/>
+        </a:effectRef>
+        <a:fontRef idx="minor"/>
+      </dsp:style>
+      <dsp:txBody>
+        <a:bodyPr vert="horz" wrap="square" lIns="0" tIns="182880" rIns="0" bIns="182880" anchor="ctr"/>
+        <a:lstStyle>
+          <a:lvl1pPr algn="ctr">
+            <a:defRPr sz="1800"/>
+          </a:lvl1pPr>
+          <a:lvl2pPr marL="114300" indent="-114300" algn="ctr">
+            <a:defRPr sz="1400"/>
+          </a:lvl2pPr>
+          <a:lvl3pPr marL="228600" indent="-114300" algn="ctr">
+            <a:defRPr sz="1400"/>
+          </a:lvl3pPr>
+          <a:lvl4pPr marL="342900" indent="-114300" algn="ctr">
+            <a:defRPr sz="1400"/>
+          </a:lvl4pPr>
+          <a:lvl5pPr marL="457200" indent="-114300" algn="ctr">
+            <a:defRPr sz="1400"/>
+          </a:lvl5pPr>
+          <a:lvl6pPr marL="571500" indent="-114300" algn="ctr">
+            <a:defRPr sz="1400"/>
+          </a:lvl6pPr>
+          <a:lvl7pPr marL="685800" indent="-114300" algn="ctr">
+            <a:defRPr sz="1400"/>
+          </a:lvl7pPr>
+          <a:lvl8pPr marL="800100" indent="-114300" algn="ctr">
+            <a:defRPr sz="1400"/>
+          </a:lvl8pPr>
+          <a:lvl9pPr marL="914400" indent="-114300" algn="ctr">
+            <a:defRPr sz="1400"/>
+          </a:lvl9pPr>
+        </a:lstStyle>
+        <a:p>
+          <a:pPr lvl="0">
+            <a:lnSpc>
+              <a:spcPct val="100000"/>
+            </a:lnSpc>
+            <a:spcBef>
+              <a:spcPct val="0"/>
+            </a:spcBef>
+            <a:spcAft>
+              <a:spcPct val="35000"/>
+            </a:spcAft>
+          </a:pPr>
+          <a:r>
+            <a:rPr lang="en-US">
+              <a:solidFill>
+                <a:schemeClr val="tx1"/>
+              </a:solidFill>
+            </a:rPr>
+            <a:t>First</a:t>
+          </a:r>
+          <a:endParaRPr lang="en-US">
+            <a:solidFill>
+              <a:schemeClr val="tx1"/>
+            </a:solidFill>
+          </a:endParaRPr>
+        </a:p>
+      </dsp:txBody>
+      <dsp:txXfrm>
+        <a:off x="252070" y="330050"/>
+        <a:ext cx="759916" cy="648000"/>
+      </dsp:txXfrm>
+    </dsp:sp>
+    <dsp:sp modelId="{8BE6CCA6-9959-410D-A7A8-E175C3CE561D}">
+      <dsp:nvSpPr>
+        <dsp:cNvPr id="4" name="Rectangle 3"/>
+        <dsp:cNvSpPr/>
+      </dsp:nvSpPr>
+      <dsp:spPr bwMode="white">
+        <a:xfrm>
+          <a:off x="1163968" y="330050"/>
+          <a:ext cx="759916" cy="648000"/>
+        </a:xfrm>
+        <a:prstGeom prst="rect">
+          <a:avLst/>
+        </a:prstGeom>
+      </dsp:spPr>
+      <dsp:style>
+        <a:lnRef idx="0">
+          <a:schemeClr val="dk1">
+            <a:alpha val="0"/>
+          </a:schemeClr>
+        </a:lnRef>
+        <a:fillRef idx="0">
+          <a:schemeClr val="lt1">
+            <a:alpha val="0"/>
+          </a:schemeClr>
+        </a:fillRef>
+        <a:effectRef idx="0">
+          <a:scrgbClr r="0" g="0" b="0"/>
+        </a:effectRef>
+        <a:fontRef idx="minor"/>
+      </dsp:style>
+      <dsp:txBody>
+        <a:bodyPr vert="horz" wrap="square" lIns="0" tIns="182880" rIns="0" bIns="182880" anchor="ctr"/>
+        <a:lstStyle>
+          <a:lvl1pPr algn="ctr">
+            <a:defRPr sz="1800"/>
+          </a:lvl1pPr>
+          <a:lvl2pPr marL="114300" indent="-114300" algn="ctr">
+            <a:defRPr sz="1400"/>
+          </a:lvl2pPr>
+          <a:lvl3pPr marL="228600" indent="-114300" algn="ctr">
+            <a:defRPr sz="1400"/>
+          </a:lvl3pPr>
+          <a:lvl4pPr marL="342900" indent="-114300" algn="ctr">
+            <a:defRPr sz="1400"/>
+          </a:lvl4pPr>
+          <a:lvl5pPr marL="457200" indent="-114300" algn="ctr">
+            <a:defRPr sz="1400"/>
+          </a:lvl5pPr>
+          <a:lvl6pPr marL="571500" indent="-114300" algn="ctr">
+            <a:defRPr sz="1400"/>
+          </a:lvl6pPr>
+          <a:lvl7pPr marL="685800" indent="-114300" algn="ctr">
+            <a:defRPr sz="1400"/>
+          </a:lvl7pPr>
+          <a:lvl8pPr marL="800100" indent="-114300" algn="ctr">
+            <a:defRPr sz="1400"/>
+          </a:lvl8pPr>
+          <a:lvl9pPr marL="914400" indent="-114300" algn="ctr">
+            <a:defRPr sz="1400"/>
+          </a:lvl9pPr>
+        </a:lstStyle>
+        <a:p>
+          <a:pPr lvl="0">
+            <a:lnSpc>
+              <a:spcPct val="100000"/>
+            </a:lnSpc>
+            <a:spcBef>
+              <a:spcPct val="0"/>
+            </a:spcBef>
+            <a:spcAft>
+              <a:spcPct val="35000"/>
+            </a:spcAft>
+          </a:pPr>
+          <a:r>
+            <a:rPr lang="en-US">
+              <a:solidFill>
+                <a:schemeClr val="tx1"/>
+              </a:solidFill>
+            </a:rPr>
+            <a:t>Second</a:t>
+          </a:r>
+          <a:endParaRPr lang="en-US">
+            <a:solidFill>
+              <a:schemeClr val="tx1"/>
+            </a:solidFill>
+          </a:endParaRPr>
+        </a:p>
+      </dsp:txBody>
+      <dsp:txXfrm>
+        <a:off x="1163968" y="330050"/>
+        <a:ext cx="759916" cy="648000"/>
+      </dsp:txXfrm>
+    </dsp:sp>
+    <dsp:sp modelId="{B08FC8A3-E9C6-4C4D-BEB3-1402053317A0}">
+      <dsp:nvSpPr>
+        <dsp:cNvPr id="5" name="Rectangle 4"/>
+        <dsp:cNvSpPr/>
+      </dsp:nvSpPr>
+      <dsp:spPr bwMode="white">
+        <a:xfrm>
+          <a:off x="2075867" y="330050"/>
+          <a:ext cx="759916" cy="648000"/>
+        </a:xfrm>
+        <a:prstGeom prst="rect">
+          <a:avLst/>
+        </a:prstGeom>
+      </dsp:spPr>
+      <dsp:style>
+        <a:lnRef idx="0">
+          <a:schemeClr val="dk1">
+            <a:alpha val="0"/>
+          </a:schemeClr>
+        </a:lnRef>
+        <a:fillRef idx="0">
+          <a:schemeClr val="lt1">
+            <a:alpha val="0"/>
+          </a:schemeClr>
+        </a:fillRef>
+        <a:effectRef idx="0">
+          <a:scrgbClr r="0" g="0" b="0"/>
+        </a:effectRef>
+        <a:fontRef idx="minor"/>
+      </dsp:style>
+      <dsp:txBody>
+        <a:bodyPr vert="horz" wrap="square" lIns="0" tIns="182880" rIns="0" bIns="182880" anchor="ctr"/>
+        <a:lstStyle>
+          <a:lvl1pPr algn="ctr">
+            <a:defRPr sz="1800"/>
+          </a:lvl1pPr>
+          <a:lvl2pPr marL="114300" indent="-114300" algn="ctr">
+            <a:defRPr sz="1400"/>
+          </a:lvl2pPr>
+          <a:lvl3pPr marL="228600" indent="-114300" algn="ctr">
+            <a:defRPr sz="1400"/>
+          </a:lvl3pPr>
+          <a:lvl4pPr marL="342900" indent="-114300" algn="ctr">
+            <a:defRPr sz="1400"/>
+          </a:lvl4pPr>
+          <a:lvl5pPr marL="457200" indent="-114300" algn="ctr">
+            <a:defRPr sz="1400"/>
+          </a:lvl5pPr>
+          <a:lvl6pPr marL="571500" indent="-114300" algn="ctr">
+            <a:defRPr sz="1400"/>
+          </a:lvl6pPr>
+          <a:lvl7pPr marL="685800" indent="-114300" algn="ctr">
+            <a:defRPr sz="1400"/>
+          </a:lvl7pPr>
+          <a:lvl8pPr marL="800100" indent="-114300" algn="ctr">
+            <a:defRPr sz="1400"/>
+          </a:lvl8pPr>
+          <a:lvl9pPr marL="914400" indent="-114300" algn="ctr">
+            <a:defRPr sz="1400"/>
+          </a:lvl9pPr>
+        </a:lstStyle>
+        <a:p>
+          <a:pPr lvl="0">
+            <a:lnSpc>
+              <a:spcPct val="100000"/>
+            </a:lnSpc>
+            <a:spcBef>
+              <a:spcPct val="0"/>
+            </a:spcBef>
+            <a:spcAft>
+              <a:spcPct val="35000"/>
+            </a:spcAft>
+          </a:pPr>
+          <a:r>
+            <a:rPr lang="en-US">
+              <a:solidFill>
+                <a:schemeClr val="tx1"/>
+              </a:solidFill>
+            </a:rPr>
+            <a:t>Third</a:t>
+          </a:r>
+          <a:endParaRPr lang="en-US">
+            <a:solidFill>
+              <a:schemeClr val="tx1"/>
+            </a:solidFill>
+          </a:endParaRPr>
+        </a:p>
+      </dsp:txBody>
+      <dsp:txXfrm>
+        <a:off x="2075867" y="330050"/>
+        <a:ext cx="759916" cy="648000"/>
+      </dsp:txXfrm>
+    </dsp:sp>
+  </dsp:spTree>
+</dsp:drawing>
+</file>
+
+<file path=ppt/diagrams/layout1.xml><?xml version="1.0" encoding="utf-8"?>
+<dgm:layoutDef xmlns:dgm="http://schemas.openxmlformats.org/drawingml/2006/diagram" xmlns:a="http://schemas.openxmlformats.org/drawingml/2006/main" uniqueId="urn:microsoft.com/office/officeart/2005/8/layout/hProcess3">
+  <dgm:title val=""/>
+  <dgm:desc val=""/>
+  <dgm:catLst>
+    <dgm:cat type="process" pri="6000"/>
+  </dgm:catLst>
+  <dgm:sampData useDef="1">
+    <dgm:dataModel>
+      <dgm:ptLst/>
+      <dgm:bg/>
+      <dgm:whole/>
+    </dgm:dataModel>
+  </dgm:sampData>
+  <dgm:styleData>
+    <dgm:dataModel>
+      <dgm:ptLst>
+        <dgm:pt modelId="0" type="doc">
+          <dgm:prSet qsTypeId="urn:microsoft.com/office/officeart/2005/8/quickstyle/simple5"/>
+        </dgm:pt>
+        <dgm:pt modelId="1"/>
+        <dgm:pt modelId="2"/>
+      </dgm:ptLst>
+      <dgm:cxnLst>
+        <dgm:cxn modelId="3" srcId="0" destId="1" srcOrd="0" destOrd="0"/>
+        <dgm:cxn modelId="4" srcId="0" destId="2" srcOrd="1" destOrd="0"/>
+      </dgm:cxnLst>
+      <dgm:bg/>
+      <dgm:whole/>
+    </dgm:dataModel>
+  </dgm:styleData>
+  <dgm:clrData>
+    <dgm:dataModel>
+      <dgm:ptLst>
+        <dgm:pt modelId="0" type="doc"/>
+        <dgm:pt modelId="1"/>
+        <dgm:pt modelId="2"/>
+        <dgm:pt modelId="3"/>
+        <dgm:pt modelId="4"/>
+      </dgm:ptLst>
+      <dgm:cxnLst>
+        <dgm:cxn modelId="5" srcId="0" destId="1" srcOrd="0" destOrd="0"/>
+        <dgm:cxn modelId="6" srcId="0" destId="2" srcOrd="1" destOrd="0"/>
+        <dgm:cxn modelId="7" srcId="0" destId="3" srcOrd="2" destOrd="0"/>
+        <dgm:cxn modelId="8" srcId="0" destId="4" srcOrd="3" destOrd="0"/>
+      </dgm:cxnLst>
+      <dgm:bg/>
+      <dgm:whole/>
+    </dgm:dataModel>
+  </dgm:clrData>
+  <dgm:layoutNode name="Name0" chOrder="t">
+    <dgm:varLst>
+      <dgm:dir/>
+      <dgm:animLvl val="lvl"/>
+      <dgm:resizeHandles val="exact"/>
+    </dgm:varLst>
+    <dgm:alg type="composite"/>
+    <dgm:shape xmlns:r="http://schemas.openxmlformats.org/officeDocument/2006/relationships" r:blip="">
+      <dgm:adjLst/>
+    </dgm:shape>
+    <dgm:presOf/>
+    <dgm:constrLst>
+      <dgm:constr type="w" for="ch" forName="dummy" refType="w"/>
+      <dgm:constr type="h" for="ch" forName="dummy" refType="h"/>
+      <dgm:constr type="h" for="ch" forName="dummy" refType="w" refFor="ch" refForName="dummy" op="lte" fact="0.4"/>
+      <dgm:constr type="ctrX" for="ch" forName="dummy" refType="w" fact="0.5"/>
+      <dgm:constr type="ctrY" for="ch" forName="dummy" refType="h" fact="0.5"/>
+      <dgm:constr type="w" for="ch" forName="linH" refType="w"/>
+      <dgm:constr type="h" for="ch" forName="linH" refType="h"/>
+      <dgm:constr type="ctrX" for="ch" forName="linH" refType="w" fact="0.5"/>
+      <dgm:constr type="ctrY" for="ch" forName="linH" refType="h" fact="0.5"/>
+      <dgm:constr type="userP" for="ch" forName="linH" refType="h" refFor="ch" refForName="dummy" fact="0.25"/>
+      <dgm:constr type="userT" for="des" forName="parTx" refType="w" refFor="ch" refForName="dummy" fact="0.2"/>
+    </dgm:constrLst>
+    <dgm:ruleLst/>
+    <dgm:layoutNode name="dummy">
+      <dgm:alg type="sp"/>
+      <dgm:shape xmlns:r="http://schemas.openxmlformats.org/officeDocument/2006/relationships" r:blip="">
+        <dgm:adjLst/>
+      </dgm:shape>
+      <dgm:presOf/>
+      <dgm:constrLst/>
+      <dgm:ruleLst/>
+    </dgm:layoutNode>
+    <dgm:layoutNode name="linH">
+      <dgm:choose name="Name1">
+        <dgm:if name="Name2" func="var" arg="dir" op="equ" val="norm">
+          <dgm:alg type="lin">
+            <dgm:param type="linDir" val="fromL"/>
+            <dgm:param type="nodeVertAlign" val="t"/>
+          </dgm:alg>
+        </dgm:if>
+        <dgm:else name="Name3">
+          <dgm:alg type="lin">
+            <dgm:param type="linDir" val="fromR"/>
+            <dgm:param type="nodeVertAlign" val="t"/>
+          </dgm:alg>
+        </dgm:else>
+      </dgm:choose>
+      <dgm:shape xmlns:r="http://schemas.openxmlformats.org/officeDocument/2006/relationships" r:blip="">
+        <dgm:adjLst/>
+      </dgm:shape>
+      <dgm:presOf/>
+      <dgm:constrLst>
+        <dgm:constr type="primFontSz" for="des" forName="parTx" val="65"/>
+        <dgm:constr type="primFontSz" for="des" forName="desTx" refType="primFontSz" refFor="des" refForName="parTx" op="equ"/>
+        <dgm:constr type="h" for="des" forName="parTx" refType="primFontSz" refFor="des" refForName="parTx"/>
+        <dgm:constr type="h" for="des" forName="desTx" refType="primFontSz" refFor="des" refForName="parTx" fact="0.5"/>
+        <dgm:constr type="h" for="des" forName="parTx" op="equ"/>
+        <dgm:constr type="h" for="des" forName="desTx" op="equ"/>
+        <dgm:constr type="h" for="ch" forName="backgroundArrow" refType="primFontSz" refFor="des" refForName="parTx" fact="2"/>
+        <dgm:constr type="h" for="ch" forName="backgroundArrow" refType="h" refFor="des" refForName="parTx" op="lte" fact="2"/>
+        <dgm:constr type="h" for="ch" forName="backgroundArrow" refType="h" refFor="des" refForName="parTx" op="gte" fact="2"/>
+        <dgm:constr type="h" for="des" forName="spVertical1" refType="primFontSz" refFor="des" refForName="parTx" fact="0.5"/>
+        <dgm:constr type="h" for="des" forName="spVertical1" refType="h" refFor="des" refForName="parTx" op="lte" fact="0.5"/>
+        <dgm:constr type="h" for="des" forName="spVertical1" refType="h" refFor="des" refForName="parTx" op="gte" fact="0.5"/>
+        <dgm:constr type="h" for="des" forName="spVertical2" refType="primFontSz" refFor="des" refForName="parTx" fact="0.5"/>
+        <dgm:constr type="h" for="des" forName="spVertical2" refType="h" refFor="des" refForName="parTx" op="lte" fact="0.5"/>
+        <dgm:constr type="h" for="des" forName="spVertical2" refType="h" refFor="des" refForName="parTx" op="gte" fact="0.5"/>
+        <dgm:constr type="h" for="des" forName="spVertical3" refType="primFontSz" refFor="des" refForName="parTx" fact="-0.4"/>
+        <dgm:constr type="h" for="des" forName="spVertical3" refType="h" refFor="des" refForName="parTx" op="lte" fact="-0.4"/>
+        <dgm:constr type="h" for="des" forName="spVertical3" refType="h" refFor="des" refForName="parTx" op="gte" fact="-0.4"/>
+        <dgm:constr type="w" for="ch" forName="backgroundArrow" refType="w"/>
+        <dgm:constr type="w" for="ch" forName="negArrow" refType="w" fact="-1"/>
+        <dgm:constr type="w" for="ch" forName="linV" refType="w"/>
+        <dgm:constr type="w" for="ch" forName="space" refType="w" refFor="ch" refForName="linV" fact="0.2"/>
+        <dgm:constr type="w" for="ch" forName="padding1" refType="w" fact="0.08"/>
+        <dgm:constr type="userP"/>
+        <dgm:constr type="w" for="ch" forName="padding2" refType="userP"/>
+      </dgm:constrLst>
+      <dgm:ruleLst>
+        <dgm:rule type="w" for="ch" forName="linV" val="0" fact="NaN" max="NaN"/>
+        <dgm:rule type="primFontSz" for="des" forName="parTx" val="5" fact="NaN" max="NaN"/>
+      </dgm:ruleLst>
+      <dgm:layoutNode name="padding1">
+        <dgm:alg type="sp"/>
+        <dgm:shape xmlns:r="http://schemas.openxmlformats.org/officeDocument/2006/relationships" r:blip="">
+          <dgm:adjLst/>
+        </dgm:shape>
+        <dgm:presOf/>
+        <dgm:constrLst/>
+        <dgm:ruleLst/>
+      </dgm:layoutNode>
+      <dgm:forEach name="Name4" axis="ch" ptType="node">
+        <dgm:layoutNode name="linV">
+          <dgm:alg type="lin">
+            <dgm:param type="linDir" val="fromT"/>
+          </dgm:alg>
+          <dgm:shape xmlns:r="http://schemas.openxmlformats.org/officeDocument/2006/relationships" r:blip="">
+            <dgm:adjLst/>
+          </dgm:shape>
+          <dgm:presOf/>
+          <dgm:constrLst>
+            <dgm:constr type="w" for="ch" forName="spVertical1" refType="w"/>
+            <dgm:constr type="w" for="ch" forName="parTx" refType="w"/>
+            <dgm:constr type="w" for="ch" forName="spVertical2" refType="w"/>
+            <dgm:constr type="w" for="ch" forName="spVertical3" refType="w"/>
+            <dgm:constr type="w" for="ch" forName="desTx" refType="w"/>
+          </dgm:constrLst>
+          <dgm:ruleLst/>
+          <dgm:layoutNode name="spVertical1">
+            <dgm:alg type="sp"/>
+            <dgm:shape xmlns:r="http://schemas.openxmlformats.org/officeDocument/2006/relationships" r:blip="">
+              <dgm:adjLst/>
+            </dgm:shape>
+            <dgm:presOf/>
+            <dgm:constrLst/>
+            <dgm:ruleLst/>
+          </dgm:layoutNode>
+          <dgm:layoutNode name="parTx" styleLbl="revTx">
+            <dgm:varLst>
+              <dgm:chMax val="0"/>
+              <dgm:chPref val="0"/>
+              <dgm:bulletEnabled val="1"/>
+            </dgm:varLst>
+            <dgm:choose name="Name5">
+              <dgm:if name="Name6" axis="root des" ptType="all node" func="maxDepth" op="gt" val="1">
+                <dgm:alg type="tx">
+                  <dgm:param type="parTxLTRAlign" val="l"/>
+                  <dgm:param type="parTxRTLAlign" val="r"/>
+                </dgm:alg>
+              </dgm:if>
+              <dgm:else name="Name7">
+                <dgm:alg type="tx">
+                  <dgm:param type="parTxLTRAlign" val="ctr"/>
+                  <dgm:param type="parTxRTLAlign" val="ctr"/>
+                </dgm:alg>
+              </dgm:else>
+            </dgm:choose>
+            <dgm:shape xmlns:r="http://schemas.openxmlformats.org/officeDocument/2006/relationships" type="rect" r:blip="">
+              <dgm:adjLst/>
+            </dgm:shape>
+            <dgm:presOf axis="self" ptType="node"/>
+            <dgm:choose name="Name8">
+              <dgm:if name="Name9" func="var" arg="dir" op="equ" val="norm">
+                <dgm:constrLst>
+                  <dgm:constr type="userT"/>
+                  <dgm:constr type="h" refType="userT" op="lte"/>
+                  <dgm:constr type="tMarg" refType="primFontSz" fact="0.8"/>
+                  <dgm:constr type="bMarg" refType="tMarg"/>
+                  <dgm:constr type="lMarg"/>
+                  <dgm:constr type="rMarg"/>
+                </dgm:constrLst>
+              </dgm:if>
+              <dgm:else name="Name10">
+                <dgm:constrLst>
+                  <dgm:constr type="userT"/>
+                  <dgm:constr type="h" refType="userT" op="lte"/>
+                  <dgm:constr type="tMarg" refType="primFontSz" fact="0.8"/>
+                  <dgm:constr type="bMarg" refType="tMarg"/>
+                  <dgm:constr type="lMarg"/>
+                  <dgm:constr type="rMarg"/>
+                </dgm:constrLst>
+              </dgm:else>
+            </dgm:choose>
+            <dgm:ruleLst>
+              <dgm:rule type="h" val="INF" fact="NaN" max="NaN"/>
+            </dgm:ruleLst>
+          </dgm:layoutNode>
+          <dgm:layoutNode name="spVertical2">
+            <dgm:alg type="sp"/>
+            <dgm:shape xmlns:r="http://schemas.openxmlformats.org/officeDocument/2006/relationships" r:blip="">
+              <dgm:adjLst/>
+            </dgm:shape>
+            <dgm:presOf/>
+            <dgm:constrLst/>
+            <dgm:ruleLst/>
+          </dgm:layoutNode>
+          <dgm:layoutNode name="spVertical3">
+            <dgm:alg type="sp"/>
+            <dgm:shape xmlns:r="http://schemas.openxmlformats.org/officeDocument/2006/relationships" r:blip="">
+              <dgm:adjLst/>
+            </dgm:shape>
+            <dgm:presOf/>
+            <dgm:constrLst/>
+            <dgm:ruleLst/>
+          </dgm:layoutNode>
+          <dgm:choose name="Name11">
+            <dgm:if name="Name12" axis="ch" ptType="node" func="cnt" op="gte" val="1">
+              <dgm:layoutNode name="desTx" styleLbl="revTx">
+                <dgm:varLst>
+                  <dgm:bulletEnabled val="1"/>
+                </dgm:varLst>
+                <dgm:alg type="tx">
+                  <dgm:param type="stBulletLvl" val="1"/>
+                </dgm:alg>
+                <dgm:shape xmlns:r="http://schemas.openxmlformats.org/officeDocument/2006/relationships" type="rect" r:blip="">
+                  <dgm:adjLst/>
+                </dgm:shape>
+                <dgm:presOf axis="des" ptType="node"/>
+                <dgm:constrLst>
+                  <dgm:constr type="tMarg"/>
+                  <dgm:constr type="bMarg"/>
+                  <dgm:constr type="rMarg"/>
+                  <dgm:constr type="lMarg"/>
+                </dgm:constrLst>
+                <dgm:ruleLst>
+                  <dgm:rule type="h" val="INF" fact="NaN" max="NaN"/>
+                </dgm:ruleLst>
+              </dgm:layoutNode>
+            </dgm:if>
+            <dgm:else name="Name13"/>
+          </dgm:choose>
+        </dgm:layoutNode>
+        <dgm:forEach name="Name14" axis="followSib" ptType="sibTrans" cnt="1">
+          <dgm:layoutNode name="space">
+            <dgm:alg type="sp"/>
+            <dgm:shape xmlns:r="http://schemas.openxmlformats.org/officeDocument/2006/relationships" r:blip="">
+              <dgm:adjLst/>
+            </dgm:shape>
+            <dgm:presOf/>
+            <dgm:constrLst/>
+            <dgm:ruleLst/>
+          </dgm:layoutNode>
+        </dgm:forEach>
+      </dgm:forEach>
+      <dgm:layoutNode name="padding2">
+        <dgm:alg type="sp"/>
+        <dgm:shape xmlns:r="http://schemas.openxmlformats.org/officeDocument/2006/relationships" r:blip="">
+          <dgm:adjLst/>
+        </dgm:shape>
+        <dgm:presOf/>
+        <dgm:constrLst/>
+        <dgm:ruleLst/>
+      </dgm:layoutNode>
+      <dgm:layoutNode name="negArrow">
+        <dgm:alg type="sp"/>
+        <dgm:shape xmlns:r="http://schemas.openxmlformats.org/officeDocument/2006/relationships" r:blip="">
+          <dgm:adjLst/>
+        </dgm:shape>
+        <dgm:presOf/>
+        <dgm:constrLst/>
+        <dgm:ruleLst/>
+      </dgm:layoutNode>
+      <dgm:layoutNode name="backgroundArrow" styleLbl="node1">
+        <dgm:alg type="sp"/>
+        <dgm:choose name="Name15">
+          <dgm:if name="Name16" func="var" arg="dir" op="equ" val="norm">
+            <dgm:shape xmlns:r="http://schemas.openxmlformats.org/officeDocument/2006/relationships" type="rightArrow" r:blip="">
+              <dgm:adjLst/>
+            </dgm:shape>
+          </dgm:if>
+          <dgm:else name="Name17">
+            <dgm:shape xmlns:r="http://schemas.openxmlformats.org/officeDocument/2006/relationships" type="leftArrow" r:blip="">
+              <dgm:adjLst/>
+            </dgm:shape>
+          </dgm:else>
+        </dgm:choose>
+        <dgm:presOf/>
+        <dgm:constrLst/>
+        <dgm:ruleLst/>
+      </dgm:layoutNode>
+    </dgm:layoutNode>
+  </dgm:layoutNode>
+</dgm:layoutDef>
+</file>
+
+<file path=ppt/diagrams/quickStyle1.xml><?xml version="1.0" encoding="utf-8"?>
+<dgm:styleDef xmlns:dgm="http://schemas.openxmlformats.org/drawingml/2006/diagram" xmlns:a="http://schemas.openxmlformats.org/drawingml/2006/main" uniqueId="urn:microsoft.com/office/officeart/2005/8/quickstyle/simple1">
+  <dgm:title val=""/>
+  <dgm:desc val=""/>
+  <dgm:catLst>
+    <dgm:cat type="simple" pri="10100"/>
+  </dgm:catLst>
+  <dgm:scene3d>
+    <a:camera prst="orthographicFront"/>
+    <a:lightRig rig="threePt" dir="t"/>
+  </dgm:scene3d>
+  <dgm:styleLbl name="alignAcc1">
+    <dgm:scene3d>
+      <a:camera prst="orthographicFront"/>
+      <a:lightRig rig="threePt" dir="t"/>
+    </dgm:scene3d>
+    <dgm:txPr/>
+    <dgm:style>
+      <a:lnRef idx="2">
+        <a:scrgbClr r="0" g="0" b="0"/>
+      </a:lnRef>
+      <a:fillRef idx="1">
+        <a:scrgbClr r="0" g="0" b="0"/>
+      </a:fillRef>
+      <a:effectRef idx="0">
+        <a:scrgbClr r="0" g="0" b="0"/>
+      </a:effectRef>
+      <a:fontRef idx="minor"/>
+    </dgm:style>
+  </dgm:styleLbl>
+  <dgm:styleLbl name="alignAccFollowNode1">
+    <dgm:scene3d>
+      <a:camera prst="orthographicFront"/>
+      <a:lightRig rig="threePt" dir="t"/>
+    </dgm:scene3d>
+    <dgm:txPr/>
+    <dgm:style>
+      <a:lnRef idx="2">
+        <a:scrgbClr r="0" g="0" b="0"/>
+      </a:lnRef>
+      <a:fillRef idx="1">
+        <a:scrgbClr r="0" g="0" b="0"/>
+      </a:fillRef>
+      <a:effectRef idx="0">
+        <a:scrgbClr r="0" g="0" b="0"/>
+      </a:effectRef>
+      <a:fontRef idx="minor"/>
+    </dgm:style>
+  </dgm:styleLbl>
+  <dgm:styleLbl name="alignImgPlace1">
+    <dgm:scene3d>
+      <a:camera prst="orthographicFront"/>
+      <a:lightRig rig="threePt" dir="t"/>
+    </dgm:scene3d>
+    <dgm:txPr/>
+    <dgm:style>
+      <a:lnRef idx="2">
+        <a:scrgbClr r="0" g="0" b="0"/>
+      </a:lnRef>
+      <a:fillRef idx="1">
+        <a:scrgbClr r="0" g="0" b="0"/>
+      </a:fillRef>
+      <a:effectRef idx="0">
+        <a:scrgbClr r="0" g="0" b="0"/>
+      </a:effectRef>
+      <a:fontRef idx="minor"/>
+    </dgm:style>
+  </dgm:styleLbl>
+  <dgm:styleLbl name="alignNode1">
+    <dgm:scene3d>
+      <a:camera prst="orthographicFront"/>
+      <a:lightRig rig="threePt" dir="t"/>
+    </dgm:scene3d>
+    <dgm:txPr/>
+    <dgm:style>
+      <a:lnRef idx="2">
+        <a:scrgbClr r="0" g="0" b="0"/>
+      </a:lnRef>
+      <a:fillRef idx="1">
+        <a:scrgbClr r="0" g="0" b="0"/>
+      </a:fillRef>
+      <a:effectRef idx="0">
+        <a:scrgbClr r="0" g="0" b="0"/>
+      </a:effectRef>
+      <a:fontRef idx="minor">
+        <a:schemeClr val="lt1"/>
+      </a:fontRef>
+    </dgm:style>
+  </dgm:styleLbl>
+  <dgm:styleLbl name="asst0">
+    <dgm:scene3d>
+      <a:camera prst="orthographicFront"/>
+      <a:lightRig rig="threePt" dir="t"/>
+    </dgm:scene3d>
+    <dgm:txPr/>
+    <dgm:style>
+      <a:lnRef idx="2">
+        <a:scrgbClr r="0" g="0" b="0"/>
+      </a:lnRef>
+      <a:fillRef idx="1">
+        <a:scrgbClr r="0" g="0" b="0"/>
+      </a:fillRef>
+      <a:effectRef idx="0">
+        <a:scrgbClr r="0" g="0" b="0"/>
+      </a:effectRef>
+      <a:fontRef idx="minor">
+        <a:schemeClr val="lt1"/>
+      </a:fontRef>
+    </dgm:style>
+  </dgm:styleLbl>
+  <dgm:styleLbl name="asst1">
+    <dgm:scene3d>
+      <a:camera prst="orthographicFront"/>
+      <a:lightRig rig="threePt" dir="t"/>
+    </dgm:scene3d>
+    <dgm:txPr/>
+    <dgm:style>
+      <a:lnRef idx="2">
+        <a:scrgbClr r="0" g="0" b="0"/>
+      </a:lnRef>
+      <a:fillRef idx="1">
+        <a:scrgbClr r="0" g="0" b="0"/>
+      </a:fillRef>
+      <a:effectRef idx="0">
+        <a:scrgbClr r="0" g="0" b="0"/>
+      </a:effectRef>
+      <a:fontRef idx="minor">
+        <a:schemeClr val="lt1"/>
+      </a:fontRef>
+    </dgm:style>
+  </dgm:styleLbl>
+  <dgm:styleLbl name="asst2">
+    <dgm:scene3d>
+      <a:camera prst="orthographicFront"/>
+      <a:lightRig rig="threePt" dir="t"/>
+    </dgm:scene3d>
+    <dgm:txPr/>
+    <dgm:style>
+      <a:lnRef idx="2">
+        <a:scrgbClr r="0" g="0" b="0"/>
+      </a:lnRef>
+      <a:fillRef idx="1">
+        <a:scrgbClr r="0" g="0" b="0"/>
+      </a:fillRef>
+      <a:effectRef idx="0">
+        <a:scrgbClr r="0" g="0" b="0"/>
+      </a:effectRef>
+      <a:fontRef idx="minor">
+        <a:schemeClr val="lt1"/>
+      </a:fontRef>
+    </dgm:style>
+  </dgm:styleLbl>
+  <dgm:styleLbl name="asst3">
+    <dgm:scene3d>
+      <a:camera prst="orthographicFront"/>
+      <a:lightRig rig="threePt" dir="t"/>
+    </dgm:scene3d>
+    <dgm:txPr/>
+    <dgm:style>
+      <a:lnRef idx="2">
+        <a:scrgbClr r="0" g="0" b="0"/>
+      </a:lnRef>
+      <a:fillRef idx="1">
+        <a:scrgbClr r="0" g="0" b="0"/>
+      </a:fillRef>
+      <a:effectRef idx="0">
+        <a:scrgbClr r="0" g="0" b="0"/>
+      </a:effectRef>
+      <a:fontRef idx="minor">
+        <a:schemeClr val="lt1"/>
+      </a:fontRef>
+    </dgm:style>
+  </dgm:styleLbl>
+  <dgm:styleLbl name="asst4">
+    <dgm:scene3d>
+      <a:camera prst="orthographicFront"/>
+      <a:lightRig rig="threePt" dir="t"/>
+    </dgm:scene3d>
+    <dgm:txPr/>
+    <dgm:style>
+      <a:lnRef idx="2">
+        <a:scrgbClr r="0" g="0" b="0"/>
+      </a:lnRef>
+      <a:fillRef idx="1">
+        <a:scrgbClr r="0" g="0" b="0"/>
+      </a:fillRef>
+      <a:effectRef idx="0">
+        <a:scrgbClr r="0" g="0" b="0"/>
+      </a:effectRef>
+      <a:fontRef idx="minor">
+        <a:schemeClr val="lt1"/>
+      </a:fontRef>
+    </dgm:style>
+  </dgm:styleLbl>
+  <dgm:styleLbl name="bgAcc1">
+    <dgm:scene3d>
+      <a:camera prst="orthographicFront"/>
+      <a:lightRig rig="threePt" dir="t"/>
+    </dgm:scene3d>
+    <dgm:txPr/>
+    <dgm:style>
+      <a:lnRef idx="2">
+        <a:scrgbClr r="0" g="0" b="0"/>
+      </a:lnRef>
+      <a:fillRef idx="1">
+        <a:scrgbClr r="0" g="0" b="0"/>
+      </a:fillRef>
+      <a:effectRef idx="0">
+        <a:scrgbClr r="0" g="0" b="0"/>
+      </a:effectRef>
+      <a:fontRef idx="minor"/>
+    </dgm:style>
+  </dgm:styleLbl>
+  <dgm:styleLbl name="bgAccFollowNode1">
+    <dgm:scene3d>
+      <a:camera prst="orthographicFront"/>
+      <a:lightRig rig="threePt" dir="t"/>
+    </dgm:scene3d>
+    <dgm:txPr/>
+    <dgm:style>
+      <a:lnRef idx="2">
+        <a:scrgbClr r="0" g="0" b="0"/>
+      </a:lnRef>
+      <a:fillRef idx="1">
+        <a:scrgbClr r="0" g="0" b="0"/>
+      </a:fillRef>
+      <a:effectRef idx="0">
+        <a:scrgbClr r="0" g="0" b="0"/>
+      </a:effectRef>
+      <a:fontRef idx="minor"/>
+    </dgm:style>
+  </dgm:styleLbl>
+  <dgm:styleLbl name="bgImgPlace1">
+    <dgm:scene3d>
+      <a:camera prst="orthographicFront"/>
+      <a:lightRig rig="threePt" dir="t"/>
+    </dgm:scene3d>
+    <dgm:txPr/>
+    <dgm:style>
+      <a:lnRef idx="2">
+        <a:scrgbClr r="0" g="0" b="0"/>
+      </a:lnRef>
+      <a:fillRef idx="1">
+        <a:scrgbClr r="0" g="0" b="0"/>
+      </a:fillRef>
+      <a:effectRef idx="0">
+        <a:scrgbClr r="0" g="0" b="0"/>
+      </a:effectRef>
+      <a:fontRef idx="minor"/>
+    </dgm:style>
+  </dgm:styleLbl>
+  <dgm:styleLbl name="bgShp">
+    <dgm:scene3d>
+      <a:camera prst="orthographicFront"/>
+      <a:lightRig rig="threePt" dir="t"/>
+    </dgm:scene3d>
+    <dgm:txPr/>
+    <dgm:style>
+      <a:lnRef idx="0">
+        <a:scrgbClr r="0" g="0" b="0"/>
+      </a:lnRef>
+      <a:fillRef idx="1">
+        <a:scrgbClr r="0" g="0" b="0"/>
+      </a:fillRef>
+      <a:effectRef idx="0">
+        <a:scrgbClr r="0" g="0" b="0"/>
+      </a:effectRef>
+      <a:fontRef idx="minor"/>
+    </dgm:style>
+  </dgm:styleLbl>
+  <dgm:styleLbl name="bgSibTrans2D1">
+    <dgm:scene3d>
+      <a:camera prst="orthographicFront"/>
+      <a:lightRig rig="threePt" dir="t"/>
+    </dgm:scene3d>
+    <dgm:txPr/>
+    <dgm:style>
+      <a:lnRef idx="0">
+        <a:scrgbClr r="0" g="0" b="0"/>
+      </a:lnRef>
+      <a:fillRef idx="1">
+        <a:scrgbClr r="0" g="0" b="0"/>
+      </a:fillRef>
+      <a:effectRef idx="0">
+        <a:scrgbClr r="0" g="0" b="0"/>
+      </a:effectRef>
+      <a:fontRef idx="minor">
+        <a:schemeClr val="lt1"/>
+      </a:fontRef>
+    </dgm:style>
+  </dgm:styleLbl>
+  <dgm:styleLbl name="callout">
+    <dgm:scene3d>
+      <a:camera prst="orthographicFront"/>
+      <a:lightRig rig="threePt" dir="t"/>
+    </dgm:scene3d>
+    <dgm:txPr/>
+    <dgm:style>
+      <a:lnRef idx="2">
+        <a:scrgbClr r="0" g="0" b="0"/>
+      </a:lnRef>
+      <a:fillRef idx="1">
+        <a:scrgbClr r="0" g="0" b="0"/>
+      </a:fillRef>
+      <a:effectRef idx="0">
+        <a:scrgbClr r="0" g="0" b="0"/>
+      </a:effectRef>
+      <a:fontRef idx="minor"/>
+    </dgm:style>
+  </dgm:styleLbl>
+  <dgm:styleLbl name="conFgAcc1">
+    <dgm:scene3d>
+      <a:camera prst="orthographicFront"/>
+      <a:lightRig rig="threePt" dir="t"/>
+    </dgm:scene3d>
+    <dgm:txPr/>
+    <dgm:style>
+      <a:lnRef idx="2">
+        <a:scrgbClr r="0" g="0" b="0"/>
+      </a:lnRef>
+      <a:fillRef idx="1">
+        <a:scrgbClr r="0" g="0" b="0"/>
+      </a:fillRef>
+      <a:effectRef idx="0">
+        <a:scrgbClr r="0" g="0" b="0"/>
+      </a:effectRef>
+      <a:fontRef idx="minor"/>
+    </dgm:style>
+  </dgm:styleLbl>
+  <dgm:styleLbl name="dkBgShp">
+    <dgm:scene3d>
+      <a:camera prst="orthographicFront"/>
+      <a:lightRig rig="threePt" dir="t"/>
+    </dgm:scene3d>
+    <dgm:txPr/>
+    <dgm:style>
+      <a:lnRef idx="0">
+        <a:scrgbClr r="0" g="0" b="0"/>
+      </a:lnRef>
+      <a:fillRef idx="1">
+        <a:scrgbClr r="0" g="0" b="0"/>
+      </a:fillRef>
+      <a:effectRef idx="0">
+        <a:scrgbClr r="0" g="0" b="0"/>
+      </a:effectRef>
+      <a:fontRef idx="minor"/>
+    </dgm:style>
+  </dgm:styleLbl>
+  <dgm:styleLbl name="fgAcc0">
+    <dgm:scene3d>
+      <a:camera prst="orthographicFront"/>
+      <a:lightRig rig="threePt" dir="t"/>
+    </dgm:scene3d>
+    <dgm:txPr/>
+    <dgm:style>
+      <a:lnRef idx="2">
+        <a:scrgbClr r="0" g="0" b="0"/>
+      </a:lnRef>
+      <a:fillRef idx="1">
+        <a:scrgbClr r="0" g="0" b="0"/>
+      </a:fillRef>
+      <a:effectRef idx="0">
+        <a:scrgbClr r="0" g="0" b="0"/>
+      </a:effectRef>
+      <a:fontRef idx="minor"/>
+    </dgm:style>
+  </dgm:styleLbl>
+  <dgm:styleLbl name="fgAcc1">
+    <dgm:scene3d>
+      <a:camera prst="orthographicFront"/>
+      <a:lightRig rig="threePt" dir="t"/>
+    </dgm:scene3d>
+    <dgm:txPr/>
+    <dgm:style>
+      <a:lnRef idx="2">
+        <a:scrgbClr r="0" g="0" b="0"/>
+      </a:lnRef>
+      <a:fillRef idx="1">
+        <a:scrgbClr r="0" g="0" b="0"/>
+      </a:fillRef>
+      <a:effectRef idx="0">
+        <a:scrgbClr r="0" g="0" b="0"/>
+      </a:effectRef>
+      <a:fontRef idx="minor"/>
+    </dgm:style>
+  </dgm:styleLbl>
+  <dgm:styleLbl name="fgAcc2">
+    <dgm:scene3d>
+      <a:camera prst="orthographicFront"/>
+      <a:lightRig rig="threePt" dir="t"/>
+    </dgm:scene3d>
+    <dgm:txPr/>
+    <dgm:style>
+      <a:lnRef idx="2">
+        <a:scrgbClr r="0" g="0" b="0"/>
+      </a:lnRef>
+      <a:fillRef idx="1">
+        <a:scrgbClr r="0" g="0" b="0"/>
+      </a:fillRef>
+      <a:effectRef idx="0">
+        <a:scrgbClr r="0" g="0" b="0"/>
+      </a:effectRef>
+      <a:fontRef idx="minor"/>
+    </dgm:style>
+  </dgm:styleLbl>
+  <dgm:styleLbl name="fgAcc3">
+    <dgm:scene3d>
+      <a:camera prst="orthographicFront"/>
+      <a:lightRig rig="threePt" dir="t"/>
+    </dgm:scene3d>
+    <dgm:txPr/>
+    <dgm:style>
+      <a:lnRef idx="2">
+        <a:scrgbClr r="0" g="0" b="0"/>
+      </a:lnRef>
+      <a:fillRef idx="1">
+        <a:scrgbClr r="0" g="0" b="0"/>
+      </a:fillRef>
+      <a:effectRef idx="0">
+        <a:scrgbClr r="0" g="0" b="0"/>
+      </a:effectRef>
+      <a:fontRef idx="minor"/>
+    </dgm:style>
+  </dgm:styleLbl>
+  <dgm:styleLbl name="fgAcc4">
+    <dgm:scene3d>
+      <a:camera prst="orthographicFront"/>
+      <a:lightRig rig="threePt" dir="t"/>
+    </dgm:scene3d>
+    <dgm:txPr/>
+    <dgm:style>
+      <a:lnRef idx="2">
+        <a:scrgbClr r="0" g="0" b="0"/>
+      </a:lnRef>
+      <a:fillRef idx="1">
+        <a:scrgbClr r="0" g="0" b="0"/>
+      </a:fillRef>
+      <a:effectRef idx="0">
+        <a:scrgbClr r="0" g="0" b="0"/>
+      </a:effectRef>
+      <a:fontRef idx="minor"/>
+    </dgm:style>
+  </dgm:styleLbl>
+  <dgm:styleLbl name="fgAccFollowNode1">
+    <dgm:scene3d>
+      <a:camera prst="orthographicFront"/>
+      <a:lightRig rig="threePt" dir="t"/>
+    </dgm:scene3d>
+    <dgm:txPr/>
+    <dgm:style>
+      <a:lnRef idx="2">
+        <a:scrgbClr r="0" g="0" b="0"/>
+      </a:lnRef>
+      <a:fillRef idx="1">
+        <a:scrgbClr r="0" g="0" b="0"/>
+      </a:fillRef>
+      <a:effectRef idx="0">
+        <a:scrgbClr r="0" g="0" b="0"/>
+      </a:effectRef>
+      <a:fontRef idx="minor"/>
+    </dgm:style>
+  </dgm:styleLbl>
+  <dgm:styleLbl name="fgImgPlace1">
+    <dgm:scene3d>
+      <a:camera prst="orthographicFront"/>
+      <a:lightRig rig="threePt" dir="t"/>
+    </dgm:scene3d>
+    <dgm:txPr/>
+    <dgm:style>
+      <a:lnRef idx="2">
+        <a:scrgbClr r="0" g="0" b="0"/>
+      </a:lnRef>
+      <a:fillRef idx="1">
+        <a:scrgbClr r="0" g="0" b="0"/>
+      </a:fillRef>
+      <a:effectRef idx="0">
+        <a:scrgbClr r="0" g="0" b="0"/>
+      </a:effectRef>
+      <a:fontRef idx="minor"/>
+    </dgm:style>
+  </dgm:styleLbl>
+  <dgm:styleLbl name="fgShp">
+    <dgm:scene3d>
+      <a:camera prst="orthographicFront"/>
+      <a:lightRig rig="threePt" dir="t"/>
+    </dgm:scene3d>
+    <dgm:txPr/>
+    <dgm:style>
+      <a:lnRef idx="2">
+        <a:scrgbClr r="0" g="0" b="0"/>
+      </a:lnRef>
+      <a:fillRef idx="1">
+        <a:scrgbClr r="0" g="0" b="0"/>
+      </a:fillRef>
+      <a:effectRef idx="0">
+        <a:scrgbClr r="0" g="0" b="0"/>
+      </a:effectRef>
+      <a:fontRef idx="minor"/>
+    </dgm:style>
+  </dgm:styleLbl>
+  <dgm:styleLbl name="fgSibTrans2D1">
+    <dgm:scene3d>
+      <a:camera prst="orthographicFront"/>
+      <a:lightRig rig="threePt" dir="t"/>
+    </dgm:scene3d>
+    <dgm:txPr/>
+    <dgm:style>
+      <a:lnRef idx="0">
+        <a:scrgbClr r="0" g="0" b="0"/>
+      </a:lnRef>
+      <a:fillRef idx="1">
+        <a:scrgbClr r="0" g="0" b="0"/>
+      </a:fillRef>
+      <a:effectRef idx="0">
+        <a:scrgbClr r="0" g="0" b="0"/>
+      </a:effectRef>
+      <a:fontRef idx="minor">
+        <a:schemeClr val="lt1"/>
+      </a:fontRef>
+    </dgm:style>
+  </dgm:styleLbl>
+  <dgm:styleLbl name="lnNode1">
+    <dgm:scene3d>
+      <a:camera prst="orthographicFront"/>
+      <a:lightRig rig="threePt" dir="t"/>
+    </dgm:scene3d>
+    <dgm:txPr/>
+    <dgm:style>
+      <a:lnRef idx="2">
+        <a:scrgbClr r="0" g="0" b="0"/>
+      </a:lnRef>
+      <a:fillRef idx="1">
+        <a:scrgbClr r="0" g="0" b="0"/>
+      </a:fillRef>
+      <a:effectRef idx="0">
+        <a:scrgbClr r="0" g="0" b="0"/>
+      </a:effectRef>
+      <a:fontRef idx="minor">
+        <a:schemeClr val="lt1"/>
+      </a:fontRef>
+    </dgm:style>
+  </dgm:styleLbl>
+  <dgm:styleLbl name="node0">
+    <dgm:scene3d>
+      <a:camera prst="orthographicFront"/>
+      <a:lightRig rig="threePt" dir="t"/>
+    </dgm:scene3d>
+    <dgm:txPr/>
+    <dgm:style>
+      <a:lnRef idx="2">
+        <a:scrgbClr r="0" g="0" b="0"/>
+      </a:lnRef>
+      <a:fillRef idx="1">
+        <a:scrgbClr r="0" g="0" b="0"/>
+      </a:fillRef>
+      <a:effectRef idx="0">
+        <a:scrgbClr r="0" g="0" b="0"/>
+      </a:effectRef>
+      <a:fontRef idx="minor">
+        <a:schemeClr val="lt1"/>
+      </a:fontRef>
+    </dgm:style>
+  </dgm:styleLbl>
+  <dgm:styleLbl name="node1">
+    <dgm:scene3d>
+      <a:camera prst="orthographicFront"/>
+      <a:lightRig rig="threePt" dir="t"/>
+    </dgm:scene3d>
+    <dgm:txPr/>
+    <dgm:style>
+      <a:lnRef idx="2">
+        <a:scrgbClr r="0" g="0" b="0"/>
+      </a:lnRef>
+      <a:fillRef idx="1">
+        <a:scrgbClr r="0" g="0" b="0"/>
+      </a:fillRef>
+      <a:effectRef idx="0">
+        <a:scrgbClr r="0" g="0" b="0"/>
+      </a:effectRef>
+      <a:fontRef idx="minor">
+        <a:schemeClr val="lt1"/>
+      </a:fontRef>
+    </dgm:style>
+  </dgm:styleLbl>
+  <dgm:styleLbl name="node2">
+    <dgm:scene3d>
+      <a:camera prst="orthographicFront"/>
+      <a:lightRig rig="threePt" dir="t"/>
+    </dgm:scene3d>
+    <dgm:txPr/>
+    <dgm:style>
+      <a:lnRef idx="2">
+        <a:scrgbClr r="0" g="0" b="0"/>
+      </a:lnRef>
+      <a:fillRef idx="1">
+        <a:scrgbClr r="0" g="0" b="0"/>
+      </a:fillRef>
+      <a:effectRef idx="0">
+        <a:scrgbClr r="0" g="0" b="0"/>
+      </a:effectRef>
+      <a:fontRef idx="minor">
+        <a:schemeClr val="lt1"/>
+      </a:fontRef>
+    </dgm:style>
+  </dgm:styleLbl>
+  <dgm:styleLbl name="node3">
+    <dgm:scene3d>
+      <a:camera prst="orthographicFront"/>
+      <a:lightRig rig="threePt" dir="t"/>
+    </dgm:scene3d>
+    <dgm:txPr/>
+    <dgm:style>
+      <a:lnRef idx="2">
+        <a:scrgbClr r="0" g="0" b="0"/>
+      </a:lnRef>
+      <a:fillRef idx="1">
+        <a:scrgbClr r="0" g="0" b="0"/>
+      </a:fillRef>
+      <a:effectRef idx="0">
+        <a:scrgbClr r="0" g="0" b="0"/>
+      </a:effectRef>
+      <a:fontRef idx="minor">
+        <a:schemeClr val="lt1"/>
+      </a:fontRef>
+    </dgm:style>
+  </dgm:styleLbl>
+  <dgm:styleLbl name="node4">
+    <dgm:scene3d>
+      <a:camera prst="orthographicFront"/>
+      <a:lightRig rig="threePt" dir="t"/>
+    </dgm:scene3d>
+    <dgm:txPr/>
+    <dgm:style>
+      <a:lnRef idx="2">
+        <a:scrgbClr r="0" g="0" b="0"/>
+      </a:lnRef>
+      <a:fillRef idx="1">
+        <a:scrgbClr r="0" g="0" b="0"/>
+      </a:fillRef>
+      <a:effectRef idx="0">
+        <a:scrgbClr r="0" g="0" b="0"/>
+      </a:effectRef>
+      <a:fontRef idx="minor">
+        <a:schemeClr val="lt1"/>
+      </a:fontRef>
+    </dgm:style>
+  </dgm:styleLbl>
+  <dgm:styleLbl name="parChTrans1D1">
+    <dgm:scene3d>
+      <a:camera prst="orthographicFront"/>
+      <a:lightRig rig="threePt" dir="t"/>
+    </dgm:scene3d>
+    <dgm:txPr/>
+    <dgm:style>
+      <a:lnRef idx="2">
+        <a:scrgbClr r="0" g="0" b="0"/>
+      </a:lnRef>
+      <a:fillRef idx="0">
+        <a:scrgbClr r="0" g="0" b="0"/>
+      </a:fillRef>
+      <a:effectRef idx="0">
+        <a:scrgbClr r="0" g="0" b="0"/>
+      </a:effectRef>
+      <a:fontRef idx="minor"/>
+    </dgm:style>
+  </dgm:styleLbl>
+  <dgm:styleLbl name="parChTrans1D2">
+    <dgm:scene3d>
+      <a:camera prst="orthographicFront"/>
+      <a:lightRig rig="threePt" dir="t"/>
+    </dgm:scene3d>
+    <dgm:txPr/>
+    <dgm:style>
+      <a:lnRef idx="2">
+        <a:scrgbClr r="0" g="0" b="0"/>
+      </a:lnRef>
+      <a:fillRef idx="0">
+        <a:scrgbClr r="0" g="0" b="0"/>
+      </a:fillRef>
+      <a:effectRef idx="0">
+        <a:scrgbClr r="0" g="0" b="0"/>
+      </a:effectRef>
+      <a:fontRef idx="minor"/>
+    </dgm:style>
+  </dgm:styleLbl>
+  <dgm:styleLbl name="parChTrans1D3">
+    <dgm:scene3d>
+      <a:camera prst="orthographicFront"/>
+      <a:lightRig rig="threePt" dir="t"/>
+    </dgm:scene3d>
+    <dgm:txPr/>
+    <dgm:style>
+      <a:lnRef idx="2">
+        <a:scrgbClr r="0" g="0" b="0"/>
+      </a:lnRef>
+      <a:fillRef idx="0">
+        <a:scrgbClr r="0" g="0" b="0"/>
+      </a:fillRef>
+      <a:effectRef idx="0">
+        <a:scrgbClr r="0" g="0" b="0"/>
+      </a:effectRef>
+      <a:fontRef idx="minor"/>
+    </dgm:style>
+  </dgm:styleLbl>
+  <dgm:styleLbl name="parChTrans1D4">
+    <dgm:scene3d>
+      <a:camera prst="orthographicFront"/>
+      <a:lightRig rig="threePt" dir="t"/>
+    </dgm:scene3d>
+    <dgm:txPr/>
+    <dgm:style>
+      <a:lnRef idx="2">
+        <a:scrgbClr r="0" g="0" b="0"/>
+      </a:lnRef>
+      <a:fillRef idx="0">
+        <a:scrgbClr r="0" g="0" b="0"/>
+      </a:fillRef>
+      <a:effectRef idx="0">
+        <a:scrgbClr r="0" g="0" b="0"/>
+      </a:effectRef>
+      <a:fontRef idx="minor"/>
+    </dgm:style>
+  </dgm:styleLbl>
+  <dgm:styleLbl name="parChTrans2D1">
+    <dgm:scene3d>
+      <a:camera prst="orthographicFront"/>
+      <a:lightRig rig="threePt" dir="t"/>
+    </dgm:scene3d>
+    <dgm:txPr/>
+    <dgm:style>
+      <a:lnRef idx="2">
+        <a:scrgbClr r="0" g="0" b="0"/>
+      </a:lnRef>
+      <a:fillRef idx="1">
+        <a:scrgbClr r="0" g="0" b="0"/>
+      </a:fillRef>
+      <a:effectRef idx="0">
+        <a:scrgbClr r="0" g="0" b="0"/>
+      </a:effectRef>
+      <a:fontRef idx="minor">
+        <a:schemeClr val="lt1"/>
+      </a:fontRef>
+    </dgm:style>
+  </dgm:styleLbl>
+  <dgm:styleLbl name="parChTrans2D2">
+    <dgm:scene3d>
+      <a:camera prst="orthographicFront"/>
+      <a:lightRig rig="threePt" dir="t"/>
+    </dgm:scene3d>
+    <dgm:txPr/>
+    <dgm:style>
+      <a:lnRef idx="2">
+        <a:scrgbClr r="0" g="0" b="0"/>
+      </a:lnRef>
+      <a:fillRef idx="1">
+        <a:scrgbClr r="0" g="0" b="0"/>
+      </a:fillRef>
+      <a:effectRef idx="0">
+        <a:scrgbClr r="0" g="0" b="0"/>
+      </a:effectRef>
+      <a:fontRef idx="minor">
+        <a:schemeClr val="lt1"/>
+      </a:fontRef>
+    </dgm:style>
+  </dgm:styleLbl>
+  <dgm:styleLbl name="parChTrans2D3">
+    <dgm:scene3d>
+      <a:camera prst="orthographicFront"/>
+      <a:lightRig rig="threePt" dir="t"/>
+    </dgm:scene3d>
+    <dgm:txPr/>
+    <dgm:style>
+      <a:lnRef idx="2">
+        <a:scrgbClr r="0" g="0" b="0"/>
+      </a:lnRef>
+      <a:fillRef idx="1">
+        <a:scrgbClr r="0" g="0" b="0"/>
+      </a:fillRef>
+      <a:effectRef idx="0">
+        <a:scrgbClr r="0" g="0" b="0"/>
+      </a:effectRef>
+      <a:fontRef idx="minor">
+        <a:schemeClr val="lt1"/>
+      </a:fontRef>
+    </dgm:style>
+  </dgm:styleLbl>
+  <dgm:styleLbl name="parChTrans2D4">
+    <dgm:scene3d>
+      <a:camera prst="orthographicFront"/>
+      <a:lightRig rig="threePt" dir="t"/>
+    </dgm:scene3d>
+    <dgm:txPr/>
+    <dgm:style>
+      <a:lnRef idx="2">
+        <a:scrgbClr r="0" g="0" b="0"/>
+      </a:lnRef>
+      <a:fillRef idx="1">
+        <a:scrgbClr r="0" g="0" b="0"/>
+      </a:fillRef>
+      <a:effectRef idx="0">
+        <a:scrgbClr r="0" g="0" b="0"/>
+      </a:effectRef>
+      <a:fontRef idx="minor">
+        <a:schemeClr val="lt1"/>
+      </a:fontRef>
+    </dgm:style>
+  </dgm:styleLbl>
+  <dgm:styleLbl name="revTx">
+    <dgm:scene3d>
+      <a:camera prst="orthographicFront"/>
+      <a:lightRig rig="threePt" dir="t"/>
+    </dgm:scene3d>
+    <dgm:txPr/>
+    <dgm:style>
+      <a:lnRef idx="0">
+        <a:scrgbClr r="0" g="0" b="0"/>
+      </a:lnRef>
+      <a:fillRef idx="0">
+        <a:scrgbClr r="0" g="0" b="0"/>
+      </a:fillRef>
+      <a:effectRef idx="0">
+        <a:scrgbClr r="0" g="0" b="0"/>
+      </a:effectRef>
+      <a:fontRef idx="minor"/>
+    </dgm:style>
+  </dgm:styleLbl>
+  <dgm:styleLbl name="sibTrans1D1">
+    <dgm:scene3d>
+      <a:camera prst="orthographicFront"/>
+      <a:lightRig rig="threePt" dir="t"/>
+    </dgm:scene3d>
+    <dgm:txPr/>
+    <dgm:style>
+      <a:lnRef idx="1">
+        <a:scrgbClr r="0" g="0" b="0"/>
+      </a:lnRef>
+      <a:fillRef idx="0">
+        <a:scrgbClr r="0" g="0" b="0"/>
+      </a:fillRef>
+      <a:effectRef idx="0">
+        <a:scrgbClr r="0" g="0" b="0"/>
+      </a:effectRef>
+      <a:fontRef idx="minor"/>
+    </dgm:style>
+  </dgm:styleLbl>
+  <dgm:styleLbl name="sibTrans2D1">
+    <dgm:scene3d>
+      <a:camera prst="orthographicFront"/>
+      <a:lightRig rig="threePt" dir="t"/>
+    </dgm:scene3d>
+    <dgm:txPr/>
+    <dgm:style>
+      <a:lnRef idx="0">
+        <a:scrgbClr r="0" g="0" b="0"/>
+      </a:lnRef>
+      <a:fillRef idx="1">
+        <a:scrgbClr r="0" g="0" b="0"/>
+      </a:fillRef>
+      <a:effectRef idx="0">
+        <a:scrgbClr r="0" g="0" b="0"/>
+      </a:effectRef>
+      <a:fontRef idx="minor">
+        <a:schemeClr val="lt1"/>
+      </a:fontRef>
+    </dgm:style>
+  </dgm:styleLbl>
+  <dgm:styleLbl name="solidAlignAcc1">
+    <dgm:scene3d>
+      <a:camera prst="orthographicFront"/>
+      <a:lightRig rig="threePt" dir="t"/>
+    </dgm:scene3d>
+    <dgm:txPr/>
+    <dgm:style>
+      <a:lnRef idx="2">
+        <a:scrgbClr r="0" g="0" b="0"/>
+      </a:lnRef>
+      <a:fillRef idx="1">
+        <a:scrgbClr r="0" g="0" b="0"/>
+      </a:fillRef>
+      <a:effectRef idx="0">
+        <a:scrgbClr r="0" g="0" b="0"/>
+      </a:effectRef>
+      <a:fontRef idx="minor"/>
+    </dgm:style>
+  </dgm:styleLbl>
+  <dgm:styleLbl name="solidBgAcc1">
+    <dgm:scene3d>
+      <a:camera prst="orthographicFront"/>
+      <a:lightRig rig="threePt" dir="t"/>
+    </dgm:scene3d>
+    <dgm:txPr/>
+    <dgm:style>
+      <a:lnRef idx="2">
+        <a:scrgbClr r="0" g="0" b="0"/>
+      </a:lnRef>
+      <a:fillRef idx="1">
+        <a:scrgbClr r="0" g="0" b="0"/>
+      </a:fillRef>
+      <a:effectRef idx="0">
+        <a:scrgbClr r="0" g="0" b="0"/>
+      </a:effectRef>
+      <a:fontRef idx="minor"/>
+    </dgm:style>
+  </dgm:styleLbl>
+  <dgm:styleLbl name="solidFgAcc1">
+    <dgm:scene3d>
+      <a:camera prst="orthographicFront"/>
+      <a:lightRig rig="threePt" dir="t"/>
+    </dgm:scene3d>
+    <dgm:txPr/>
+    <dgm:style>
+      <a:lnRef idx="2">
+        <a:scrgbClr r="0" g="0" b="0"/>
+      </a:lnRef>
+      <a:fillRef idx="1">
+        <a:scrgbClr r="0" g="0" b="0"/>
+      </a:fillRef>
+      <a:effectRef idx="0">
+        <a:scrgbClr r="0" g="0" b="0"/>
+      </a:effectRef>
+      <a:fontRef idx="minor"/>
+    </dgm:style>
+  </dgm:styleLbl>
+  <dgm:styleLbl name="trAlignAcc1">
+    <dgm:scene3d>
+      <a:camera prst="orthographicFront"/>
+      <a:lightRig rig="threePt" dir="t"/>
+    </dgm:scene3d>
+    <dgm:txPr/>
+    <dgm:style>
+      <a:lnRef idx="1">
+        <a:scrgbClr r="0" g="0" b="0"/>
+      </a:lnRef>
+      <a:fillRef idx="1">
+        <a:scrgbClr r="0" g="0" b="0"/>
+      </a:fillRef>
+      <a:effectRef idx="0">
+        <a:scrgbClr r="0" g="0" b="0"/>
+      </a:effectRef>
+      <a:fontRef idx="minor"/>
+    </dgm:style>
+  </dgm:styleLbl>
+  <dgm:styleLbl name="trBgShp">
+    <dgm:scene3d>
+      <a:camera prst="orthographicFront"/>
+      <a:lightRig rig="threePt" dir="t"/>
+    </dgm:scene3d>
+    <dgm:txPr/>
+    <dgm:style>
+      <a:lnRef idx="0">
+        <a:scrgbClr r="0" g="0" b="0"/>
+      </a:lnRef>
+      <a:fillRef idx="1">
+        <a:scrgbClr r="0" g="0" b="0"/>
+      </a:fillRef>
+      <a:effectRef idx="0">
+        <a:scrgbClr r="0" g="0" b="0"/>
+      </a:effectRef>
+      <a:fontRef idx="minor"/>
+    </dgm:style>
+  </dgm:styleLbl>
+  <dgm:styleLbl name="vennNode1">
+    <dgm:scene3d>
+      <a:camera prst="orthographicFront"/>
+      <a:lightRig rig="threePt" dir="t"/>
+    </dgm:scene3d>
+    <dgm:txPr/>
+    <dgm:style>
+      <a:lnRef idx="2">
+        <a:scrgbClr r="0" g="0" b="0"/>
+      </a:lnRef>
+      <a:fillRef idx="1">
+        <a:scrgbClr r="0" g="0" b="0"/>
+      </a:fillRef>
+      <a:effectRef idx="0">
+        <a:scrgbClr r="0" g="0" b="0"/>
+      </a:effectRef>
+      <a:fontRef idx="minor">
+        <a:schemeClr val="tx1"/>
+      </a:fontRef>
+    </dgm:style>
+  </dgm:styleLbl>
+</dgm:styleDef>
+</file>
+
 <file path=ppt/notesMasters/notesMaster1.xml><?xml version="1.0" encoding="utf-8"?>
 <p:notesMaster xmlns:a="http://schemas.openxmlformats.org/drawingml/2006/main" xmlns:r="http://schemas.openxmlformats.org/officeDocument/2006/relationships" xmlns:p="http://schemas.openxmlformats.org/presentationml/2006/main">
   <p:cSld>
@@ -4426,7 +7079,7 @@
         </p:blipFill>
         <p:spPr>
           <a:xfrm>
-            <a:off x="2456815" y="3029585"/>
+            <a:off x="4362450" y="1920875"/>
             <a:ext cx="1943100" cy="1943100"/>
           </a:xfrm>
           <a:prstGeom prst="rect">
@@ -4443,8 +7096,8 @@
           </p:nvPr>
         </p:nvGraphicFramePr>
         <p:xfrm>
-          <a:off x="6172200" y="1825625"/>
-          <a:ext cx="5181600" cy="4351338"/>
+          <a:off x="7123430" y="1825625"/>
+          <a:ext cx="4230370" cy="4229735"/>
         </p:xfrm>
         <a:graphic>
           <a:graphicData uri="http://schemas.openxmlformats.org/drawingml/2006/chart">
@@ -4452,11 +7105,416 @@
           </a:graphicData>
         </a:graphic>
       </p:graphicFrame>
+      <p:graphicFrame>
+        <p:nvGraphicFramePr>
+          <p:cNvPr id="2" name="Diagram 1"/>
+          <p:cNvGraphicFramePr/>
+          <p:nvPr/>
+        </p:nvGraphicFramePr>
+        <p:xfrm>
+          <a:off x="652145" y="1564005"/>
+          <a:ext cx="3150870" cy="1308100"/>
+        </p:xfrm>
+        <a:graphic>
+          <a:graphicData uri="http://schemas.openxmlformats.org/drawingml/2006/diagram">
+            <dgm:relIds xmlns:dgm="http://schemas.openxmlformats.org/drawingml/2006/diagram" xmlns:r="http://schemas.openxmlformats.org/officeDocument/2006/relationships" r:dm="rId3" r:lo="rId4" r:qs="rId5" r:cs="rId6"/>
+          </a:graphicData>
+        </a:graphic>
+      </p:graphicFrame>
+      <p:graphicFrame>
+        <p:nvGraphicFramePr>
+          <p:cNvPr id="3" name="Table 2"/>
+          <p:cNvGraphicFramePr/>
+          <p:nvPr/>
+        </p:nvGraphicFramePr>
+        <p:xfrm>
+          <a:off x="574040" y="3117215"/>
+          <a:ext cx="3228975" cy="1645920"/>
+        </p:xfrm>
+        <a:graphic>
+          <a:graphicData uri="http://schemas.openxmlformats.org/drawingml/2006/table">
+            <a:tbl>
+              <a:tblPr firstRow="1" bandRow="1">
+                <a:tableStyleId>{5C22544A-7EE6-4342-B048-85BDC9FD1C3A}</a:tableStyleId>
+              </a:tblPr>
+              <a:tblGrid>
+                <a:gridCol w="1076325"/>
+                <a:gridCol w="1076325"/>
+                <a:gridCol w="1076325"/>
+              </a:tblGrid>
+              <a:tr h="822960">
+                <a:tc>
+                  <a:txBody>
+                    <a:bodyPr/>
+                    <a:p>
+                      <a:pPr>
+                        <a:buNone/>
+                      </a:pPr>
+                      <a:r>
+                        <a:rPr lang="en-US"/>
+                        <a:t>First</a:t>
+                      </a:r>
+                      <a:endParaRPr lang="en-US"/>
+                    </a:p>
+                  </a:txBody>
+                  <a:tcPr/>
+                </a:tc>
+                <a:tc>
+                  <a:txBody>
+                    <a:bodyPr/>
+                    <a:p>
+                      <a:pPr>
+                        <a:buNone/>
+                      </a:pPr>
+                      <a:r>
+                        <a:rPr lang="en-US"/>
+                        <a:t>Second</a:t>
+                      </a:r>
+                      <a:endParaRPr lang="en-US"/>
+                    </a:p>
+                  </a:txBody>
+                  <a:tcPr/>
+                </a:tc>
+                <a:tc>
+                  <a:txBody>
+                    <a:bodyPr/>
+                    <a:p>
+                      <a:pPr>
+                        <a:buNone/>
+                      </a:pPr>
+                      <a:r>
+                        <a:rPr lang="en-US"/>
+                        <a:t>Third</a:t>
+                      </a:r>
+                      <a:endParaRPr lang="en-US"/>
+                    </a:p>
+                  </a:txBody>
+                  <a:tcPr/>
+                </a:tc>
+              </a:tr>
+              <a:tr h="822960">
+                <a:tc>
+                  <a:txBody>
+                    <a:bodyPr/>
+                    <a:p>
+                      <a:pPr>
+                        <a:buNone/>
+                      </a:pPr>
+                      <a:endParaRPr lang="en-US"/>
+                    </a:p>
+                  </a:txBody>
+                  <a:tcPr/>
+                </a:tc>
+                <a:tc>
+                  <a:txBody>
+                    <a:bodyPr/>
+                    <a:p>
+                      <a:pPr>
+                        <a:buNone/>
+                      </a:pPr>
+                      <a:endParaRPr lang="en-US"/>
+                    </a:p>
+                  </a:txBody>
+                  <a:tcPr/>
+                </a:tc>
+                <a:tc>
+                  <a:txBody>
+                    <a:bodyPr/>
+                    <a:p>
+                      <a:pPr>
+                        <a:buNone/>
+                      </a:pPr>
+                      <a:endParaRPr lang="en-US"/>
+                    </a:p>
+                  </a:txBody>
+                  <a:tcPr/>
+                </a:tc>
+              </a:tr>
+            </a:tbl>
+          </a:graphicData>
+        </a:graphic>
+      </p:graphicFrame>
+      <p:sp>
+        <p:nvSpPr>
+          <p:cNvPr id="5" name="Rectangle 4"/>
+          <p:cNvSpPr/>
+          <p:nvPr/>
+        </p:nvSpPr>
+        <p:spPr>
+          <a:xfrm>
+            <a:off x="5439093" y="365125"/>
+            <a:ext cx="3467735" cy="1198880"/>
+          </a:xfrm>
+          <a:prstGeom prst="rect">
+            <a:avLst/>
+          </a:prstGeom>
+          <a:noFill/>
+          <a:ln>
+            <a:noFill/>
+          </a:ln>
+        </p:spPr>
+        <p:txBody>
+          <a:bodyPr wrap="none" rtlCol="0" anchor="t">
+            <a:spAutoFit/>
+          </a:bodyPr>
+          <a:p>
+            <a:pPr algn="ctr"/>
+            <a:r>
+              <a:rPr lang="en-US" altLang="zh-CN" sz="7200" b="1">
+                <a:ln w="22225">
+                  <a:solidFill>
+                    <a:schemeClr val="accent2"/>
+                  </a:solidFill>
+                  <a:prstDash val="solid"/>
+                </a:ln>
+                <a:solidFill>
+                  <a:schemeClr val="accent2">
+                    <a:lumMod val="40000"/>
+                    <a:lumOff val="60000"/>
+                  </a:schemeClr>
+                </a:solidFill>
+                <a:effectLst/>
+              </a:rPr>
+              <a:t>WordArt</a:t>
+            </a:r>
+            <a:endParaRPr lang="en-US" altLang="zh-CN" sz="7200" b="1">
+              <a:ln w="22225">
+                <a:solidFill>
+                  <a:schemeClr val="accent2"/>
+                </a:solidFill>
+                <a:prstDash val="solid"/>
+              </a:ln>
+              <a:solidFill>
+                <a:schemeClr val="accent2">
+                  <a:lumMod val="40000"/>
+                  <a:lumOff val="60000"/>
+                </a:schemeClr>
+              </a:solidFill>
+              <a:effectLst/>
+            </a:endParaRPr>
+          </a:p>
+        </p:txBody>
+      </p:sp>
+      <p:sp>
+        <p:nvSpPr>
+          <p:cNvPr id="6" name="Sun 5"/>
+          <p:cNvSpPr/>
+          <p:nvPr/>
+        </p:nvSpPr>
+        <p:spPr>
+          <a:xfrm>
+            <a:off x="9399905" y="54610"/>
+            <a:ext cx="1518285" cy="1257300"/>
+          </a:xfrm>
+          <a:prstGeom prst="sun">
+            <a:avLst/>
+          </a:prstGeom>
+        </p:spPr>
+        <p:style>
+          <a:lnRef idx="2">
+            <a:schemeClr val="accent4">
+              <a:shade val="50000"/>
+            </a:schemeClr>
+          </a:lnRef>
+          <a:fillRef idx="1">
+            <a:schemeClr val="accent4"/>
+          </a:fillRef>
+          <a:effectRef idx="0">
+            <a:schemeClr val="accent4"/>
+          </a:effectRef>
+          <a:fontRef idx="minor">
+            <a:schemeClr val="lt1"/>
+          </a:fontRef>
+        </p:style>
+        <p:txBody>
+          <a:bodyPr rtlCol="0" anchor="ctr"/>
+          <a:p>
+            <a:pPr algn="ctr"/>
+            <a:endParaRPr lang="en-US"/>
+          </a:p>
+        </p:txBody>
+      </p:sp>
+      <p:graphicFrame>
+        <p:nvGraphicFramePr>
+          <p:cNvPr id="9" name="Object 8">
+            <a:hlinkClick r:id="" action="ppaction://ole?verb="/>
+          </p:cNvPr>
+          <p:cNvGraphicFramePr>
+            <a:graphicFrameLocks noChangeAspect="1"/>
+          </p:cNvGraphicFramePr>
+          <p:nvPr/>
+        </p:nvGraphicFramePr>
+        <p:xfrm>
+          <a:off x="5708015" y="4407535"/>
+          <a:ext cx="1415415" cy="1458595"/>
+        </p:xfrm>
+        <a:graphic>
+          <a:graphicData uri="http://schemas.openxmlformats.org/presentationml/2006/ole">
+            <mc:AlternateContent xmlns:mc="http://schemas.openxmlformats.org/markup-compatibility/2006">
+              <mc:Choice xmlns:v="urn:schemas-microsoft-com:vml" Requires="v">
+                <p:oleObj spid="_x0000_s1025" name="" r:id="rId8" imgW="419100" imgH="431800" progId="Equation.KSEE3">
+                  <p:embed/>
+                </p:oleObj>
+              </mc:Choice>
+              <mc:Fallback>
+                <p:oleObj name="" r:id="rId8" imgW="419100" imgH="431800" progId="Equation.KSEE3">
+                  <p:embed/>
+                  <p:pic>
+                    <p:nvPicPr>
+                      <p:cNvPr id="0" name="Picture 1024"/>
+                      <p:cNvPicPr/>
+                      <p:nvPr/>
+                    </p:nvPicPr>
+                    <p:blipFill>
+                      <a:blip r:embed="rId9"/>
+                      <a:stretch>
+                        <a:fillRect/>
+                      </a:stretch>
+                    </p:blipFill>
+                    <p:spPr>
+                      <a:xfrm>
+                        <a:off x="5708015" y="4407535"/>
+                        <a:ext cx="1415415" cy="1458595"/>
+                      </a:xfrm>
+                      <a:prstGeom prst="rect">
+                        <a:avLst/>
+                      </a:prstGeom>
+                    </p:spPr>
+                  </p:pic>
+                </p:oleObj>
+              </mc:Fallback>
+            </mc:AlternateContent>
+          </a:graphicData>
+        </a:graphic>
+      </p:graphicFrame>
+      <p:pic>
+        <p:nvPicPr>
+          <p:cNvPr id="10" name="SampleVideo_1280x720_1mb">
+            <a:hlinkClick r:id="" action="ppaction://media"/>
+          </p:cNvPr>
+          <p:cNvPicPr/>
+          <p:nvPr>
+            <a:videoFile r:link="rId10"/>
+            <p:extLst>
+              <p:ext uri="{DAA4B4D4-6D71-4841-9C94-3DE7FCFB9230}">
+                <p14:media xmlns:p14="http://schemas.microsoft.com/office/powerpoint/2010/main" r:embed="rId11"/>
+              </p:ext>
+            </p:extLst>
+          </p:nvPr>
+        </p:nvPicPr>
+        <p:blipFill>
+          <a:blip r:embed="rId12"/>
+          <a:stretch>
+            <a:fillRect/>
+          </a:stretch>
+        </p:blipFill>
+        <p:spPr>
+          <a:xfrm>
+            <a:off x="652145" y="4885690"/>
+            <a:ext cx="2302510" cy="1657350"/>
+          </a:xfrm>
+          <a:prstGeom prst="rect">
+            <a:avLst/>
+          </a:prstGeom>
+        </p:spPr>
+      </p:pic>
     </p:spTree>
   </p:cSld>
   <p:clrMapOvr>
     <a:masterClrMapping/>
   </p:clrMapOvr>
+  <p:timing>
+    <p:tnLst>
+      <p:par>
+        <p:cTn id="1" dur="indefinite" restart="never" nodeType="tmRoot">
+          <p:childTnLst>
+            <p:video fullScrn="0">
+              <p:cMediaNode>
+                <p:cTn id="2" fill="hold" display="1">
+                  <p:stCondLst>
+                    <p:cond delay="indefinite"/>
+                  </p:stCondLst>
+                  <p:endCondLst>
+                    <p:cond evt="onNext">
+                      <p:tgtEl>
+                        <p:sldTgt/>
+                      </p:tgtEl>
+                    </p:cond>
+                    <p:cond evt="onPrev">
+                      <p:tgtEl>
+                        <p:sldTgt/>
+                      </p:tgtEl>
+                    </p:cond>
+                  </p:endCondLst>
+                </p:cTn>
+                <p:tgtEl>
+                  <p:spTgt spid="10"/>
+                </p:tgtEl>
+              </p:cMediaNode>
+            </p:video>
+            <p:seq concurrent="1" nextAc="seek">
+              <p:cTn id="3" restart="whenNotActive" fill="hold" evtFilter="cancelBubble" nodeType="interactiveSeq">
+                <p:stCondLst>
+                  <p:cond evt="onClick" delay="0">
+                    <p:tgtEl>
+                      <p:spTgt spid="10"/>
+                    </p:tgtEl>
+                  </p:cond>
+                </p:stCondLst>
+                <p:endSync evt="end" delay="0">
+                  <p:rtn val="all"/>
+                </p:endSync>
+                <p:childTnLst>
+                  <p:par>
+                    <p:cTn id="4" fill="hold">
+                      <p:stCondLst>
+                        <p:cond delay="0"/>
+                      </p:stCondLst>
+                      <p:childTnLst>
+                        <p:par>
+                          <p:cTn id="5" fill="hold">
+                            <p:stCondLst>
+                              <p:cond delay="0"/>
+                            </p:stCondLst>
+                            <p:childTnLst>
+                              <p:par>
+                                <p:cTn id="6" presetID="2" presetClass="mediacall" presetSubtype="0" fill="hold" nodeType="clickEffect">
+                                  <p:stCondLst>
+                                    <p:cond delay="0"/>
+                                  </p:stCondLst>
+                                  <p:childTnLst>
+                                    <p:cmd type="call" cmd="togglePause">
+                                      <p:cBhvr additive="base">
+                                        <p:cTn id="7" dur="1" fill="hold"/>
+                                        <p:tgtEl>
+                                          <p:spTgt spid="10"/>
+                                        </p:tgtEl>
+                                      </p:cBhvr>
+                                    </p:cmd>
+                                  </p:childTnLst>
+                                </p:cTn>
+                              </p:par>
+                            </p:childTnLst>
+                          </p:cTn>
+                        </p:par>
+                      </p:childTnLst>
+                    </p:cTn>
+                  </p:par>
+                </p:childTnLst>
+              </p:cTn>
+              <p:nextCondLst>
+                <p:cond evt="onClick" delay="0">
+                  <p:tgtEl>
+                    <p:spTgt spid="10"/>
+                  </p:tgtEl>
+                </p:cond>
+              </p:nextCondLst>
+            </p:seq>
+          </p:childTnLst>
+        </p:cTn>
+      </p:par>
+    </p:tnLst>
+  </p:timing>
 </p:sld>
 </file>
 

</xml_diff>